<commit_message>
Figures and methods updated
</commit_message>
<xml_diff>
--- a/fig/Biological_Response.pptx
+++ b/fig/Biological_Response.pptx
@@ -6,15 +6,17 @@
   </p:sldMasterIdLst>
   <p:sldIdLst>
     <p:sldId id="256" r:id="rId2"/>
+    <p:sldId id="257" r:id="rId3"/>
+    <p:sldId id="258" r:id="rId4"/>
   </p:sldIdLst>
-  <p:sldSz cx="9144000" cy="6858000" type="screen4x3"/>
-  <p:notesSz cx="6858000" cy="9144000"/>
+  <p:sldSz cx="2879725" cy="2879725"/>
+  <p:notesSz cx="7315200" cy="9601200"/>
   <p:defaultTextStyle>
     <a:defPPr>
       <a:defRPr lang="en-US"/>
     </a:defPPr>
-    <a:lvl1pPr marL="0" algn="l" defTabSz="914400" rtl="0" eaLnBrk="1" latinLnBrk="0" hangingPunct="1">
-      <a:defRPr sz="1800" kern="1200">
+    <a:lvl1pPr marL="0" algn="l" defTabSz="329021" rtl="0" eaLnBrk="1" latinLnBrk="0" hangingPunct="1">
+      <a:defRPr sz="600" kern="1200">
         <a:solidFill>
           <a:schemeClr val="tx1"/>
         </a:solidFill>
@@ -23,8 +25,8 @@
         <a:cs typeface="+mn-cs"/>
       </a:defRPr>
     </a:lvl1pPr>
-    <a:lvl2pPr marL="457200" algn="l" defTabSz="914400" rtl="0" eaLnBrk="1" latinLnBrk="0" hangingPunct="1">
-      <a:defRPr sz="1800" kern="1200">
+    <a:lvl2pPr marL="164511" algn="l" defTabSz="329021" rtl="0" eaLnBrk="1" latinLnBrk="0" hangingPunct="1">
+      <a:defRPr sz="600" kern="1200">
         <a:solidFill>
           <a:schemeClr val="tx1"/>
         </a:solidFill>
@@ -33,8 +35,8 @@
         <a:cs typeface="+mn-cs"/>
       </a:defRPr>
     </a:lvl2pPr>
-    <a:lvl3pPr marL="914400" algn="l" defTabSz="914400" rtl="0" eaLnBrk="1" latinLnBrk="0" hangingPunct="1">
-      <a:defRPr sz="1800" kern="1200">
+    <a:lvl3pPr marL="329021" algn="l" defTabSz="329021" rtl="0" eaLnBrk="1" latinLnBrk="0" hangingPunct="1">
+      <a:defRPr sz="600" kern="1200">
         <a:solidFill>
           <a:schemeClr val="tx1"/>
         </a:solidFill>
@@ -43,8 +45,8 @@
         <a:cs typeface="+mn-cs"/>
       </a:defRPr>
     </a:lvl3pPr>
-    <a:lvl4pPr marL="1371600" algn="l" defTabSz="914400" rtl="0" eaLnBrk="1" latinLnBrk="0" hangingPunct="1">
-      <a:defRPr sz="1800" kern="1200">
+    <a:lvl4pPr marL="493532" algn="l" defTabSz="329021" rtl="0" eaLnBrk="1" latinLnBrk="0" hangingPunct="1">
+      <a:defRPr sz="600" kern="1200">
         <a:solidFill>
           <a:schemeClr val="tx1"/>
         </a:solidFill>
@@ -53,8 +55,8 @@
         <a:cs typeface="+mn-cs"/>
       </a:defRPr>
     </a:lvl4pPr>
-    <a:lvl5pPr marL="1828800" algn="l" defTabSz="914400" rtl="0" eaLnBrk="1" latinLnBrk="0" hangingPunct="1">
-      <a:defRPr sz="1800" kern="1200">
+    <a:lvl5pPr marL="658043" algn="l" defTabSz="329021" rtl="0" eaLnBrk="1" latinLnBrk="0" hangingPunct="1">
+      <a:defRPr sz="600" kern="1200">
         <a:solidFill>
           <a:schemeClr val="tx1"/>
         </a:solidFill>
@@ -63,8 +65,8 @@
         <a:cs typeface="+mn-cs"/>
       </a:defRPr>
     </a:lvl5pPr>
-    <a:lvl6pPr marL="2286000" algn="l" defTabSz="914400" rtl="0" eaLnBrk="1" latinLnBrk="0" hangingPunct="1">
-      <a:defRPr sz="1800" kern="1200">
+    <a:lvl6pPr marL="822553" algn="l" defTabSz="329021" rtl="0" eaLnBrk="1" latinLnBrk="0" hangingPunct="1">
+      <a:defRPr sz="600" kern="1200">
         <a:solidFill>
           <a:schemeClr val="tx1"/>
         </a:solidFill>
@@ -73,8 +75,8 @@
         <a:cs typeface="+mn-cs"/>
       </a:defRPr>
     </a:lvl6pPr>
-    <a:lvl7pPr marL="2743200" algn="l" defTabSz="914400" rtl="0" eaLnBrk="1" latinLnBrk="0" hangingPunct="1">
-      <a:defRPr sz="1800" kern="1200">
+    <a:lvl7pPr marL="987064" algn="l" defTabSz="329021" rtl="0" eaLnBrk="1" latinLnBrk="0" hangingPunct="1">
+      <a:defRPr sz="600" kern="1200">
         <a:solidFill>
           <a:schemeClr val="tx1"/>
         </a:solidFill>
@@ -83,8 +85,8 @@
         <a:cs typeface="+mn-cs"/>
       </a:defRPr>
     </a:lvl7pPr>
-    <a:lvl8pPr marL="3200400" algn="l" defTabSz="914400" rtl="0" eaLnBrk="1" latinLnBrk="0" hangingPunct="1">
-      <a:defRPr sz="1800" kern="1200">
+    <a:lvl8pPr marL="1151575" algn="l" defTabSz="329021" rtl="0" eaLnBrk="1" latinLnBrk="0" hangingPunct="1">
+      <a:defRPr sz="600" kern="1200">
         <a:solidFill>
           <a:schemeClr val="tx1"/>
         </a:solidFill>
@@ -93,8 +95,8 @@
         <a:cs typeface="+mn-cs"/>
       </a:defRPr>
     </a:lvl8pPr>
-    <a:lvl9pPr marL="3657600" algn="l" defTabSz="914400" rtl="0" eaLnBrk="1" latinLnBrk="0" hangingPunct="1">
-      <a:defRPr sz="1800" kern="1200">
+    <a:lvl9pPr marL="1316086" algn="l" defTabSz="329021" rtl="0" eaLnBrk="1" latinLnBrk="0" hangingPunct="1">
+      <a:defRPr sz="600" kern="1200">
         <a:solidFill>
           <a:schemeClr val="tx1"/>
         </a:solidFill>
@@ -136,8 +138,8 @@
         </p:nvSpPr>
         <p:spPr>
           <a:xfrm>
-            <a:off x="685800" y="2130425"/>
-            <a:ext cx="7772400" cy="1470025"/>
+            <a:off x="215980" y="894582"/>
+            <a:ext cx="2447767" cy="617274"/>
           </a:xfrm>
         </p:spPr>
         <p:txBody>
@@ -164,8 +166,8 @@
         </p:nvSpPr>
         <p:spPr>
           <a:xfrm>
-            <a:off x="1371600" y="3886200"/>
-            <a:ext cx="6400800" cy="1752600"/>
+            <a:off x="431960" y="1631844"/>
+            <a:ext cx="2015808" cy="735930"/>
           </a:xfrm>
         </p:spPr>
         <p:txBody>
@@ -181,7 +183,7 @@
                 </a:solidFill>
               </a:defRPr>
             </a:lvl1pPr>
-            <a:lvl2pPr marL="457200" indent="0" algn="ctr">
+            <a:lvl2pPr marL="164511" indent="0" algn="ctr">
               <a:buNone/>
               <a:defRPr>
                 <a:solidFill>
@@ -191,7 +193,7 @@
                 </a:solidFill>
               </a:defRPr>
             </a:lvl2pPr>
-            <a:lvl3pPr marL="914400" indent="0" algn="ctr">
+            <a:lvl3pPr marL="329021" indent="0" algn="ctr">
               <a:buNone/>
               <a:defRPr>
                 <a:solidFill>
@@ -201,7 +203,7 @@
                 </a:solidFill>
               </a:defRPr>
             </a:lvl3pPr>
-            <a:lvl4pPr marL="1371600" indent="0" algn="ctr">
+            <a:lvl4pPr marL="493532" indent="0" algn="ctr">
               <a:buNone/>
               <a:defRPr>
                 <a:solidFill>
@@ -211,7 +213,7 @@
                 </a:solidFill>
               </a:defRPr>
             </a:lvl4pPr>
-            <a:lvl5pPr marL="1828800" indent="0" algn="ctr">
+            <a:lvl5pPr marL="658043" indent="0" algn="ctr">
               <a:buNone/>
               <a:defRPr>
                 <a:solidFill>
@@ -221,7 +223,7 @@
                 </a:solidFill>
               </a:defRPr>
             </a:lvl5pPr>
-            <a:lvl6pPr marL="2286000" indent="0" algn="ctr">
+            <a:lvl6pPr marL="822553" indent="0" algn="ctr">
               <a:buNone/>
               <a:defRPr>
                 <a:solidFill>
@@ -231,7 +233,7 @@
                 </a:solidFill>
               </a:defRPr>
             </a:lvl6pPr>
-            <a:lvl7pPr marL="2743200" indent="0" algn="ctr">
+            <a:lvl7pPr marL="987064" indent="0" algn="ctr">
               <a:buNone/>
               <a:defRPr>
                 <a:solidFill>
@@ -241,7 +243,7 @@
                 </a:solidFill>
               </a:defRPr>
             </a:lvl7pPr>
-            <a:lvl8pPr marL="3200400" indent="0" algn="ctr">
+            <a:lvl8pPr marL="1151575" indent="0" algn="ctr">
               <a:buNone/>
               <a:defRPr>
                 <a:solidFill>
@@ -251,7 +253,7 @@
                 </a:solidFill>
               </a:defRPr>
             </a:lvl8pPr>
-            <a:lvl9pPr marL="3657600" indent="0" algn="ctr">
+            <a:lvl9pPr marL="1316086" indent="0" algn="ctr">
               <a:buNone/>
               <a:defRPr>
                 <a:solidFill>
@@ -288,7 +290,8 @@
           <a:p>
             <a:fld id="{51B8AED7-6190-4D28-B91A-55C6DFF6AA70}" type="datetimeFigureOut">
               <a:rPr lang="en-AU" smtClean="0"/>
-              <a:t>16/09/2013</a:t>
+              <a:pPr/>
+              <a:t>17/09/2013</a:t>
             </a:fld>
             <a:endParaRPr lang="en-AU"/>
           </a:p>
@@ -330,6 +333,7 @@
           <a:p>
             <a:fld id="{EF7DD38E-AE8B-4C62-8EAE-3769809908FA}" type="slidenum">
               <a:rPr lang="en-AU" smtClean="0"/>
+              <a:pPr/>
               <a:t>‹#›</a:t>
             </a:fld>
             <a:endParaRPr lang="en-AU"/>
@@ -339,7 +343,7 @@
     </p:spTree>
     <p:extLst>
       <p:ext uri="{BB962C8B-B14F-4D97-AF65-F5344CB8AC3E}">
-        <p14:creationId xmlns:p14="http://schemas.microsoft.com/office/powerpoint/2010/main" val="2894942220"/>
+        <p14:creationId xmlns="" xmlns:p14="http://schemas.microsoft.com/office/powerpoint/2010/main" val="2894942220"/>
       </p:ext>
     </p:extLst>
   </p:cSld>
@@ -458,7 +462,8 @@
           <a:p>
             <a:fld id="{51B8AED7-6190-4D28-B91A-55C6DFF6AA70}" type="datetimeFigureOut">
               <a:rPr lang="en-AU" smtClean="0"/>
-              <a:t>16/09/2013</a:t>
+              <a:pPr/>
+              <a:t>17/09/2013</a:t>
             </a:fld>
             <a:endParaRPr lang="en-AU"/>
           </a:p>
@@ -500,6 +505,7 @@
           <a:p>
             <a:fld id="{EF7DD38E-AE8B-4C62-8EAE-3769809908FA}" type="slidenum">
               <a:rPr lang="en-AU" smtClean="0"/>
+              <a:pPr/>
               <a:t>‹#›</a:t>
             </a:fld>
             <a:endParaRPr lang="en-AU"/>
@@ -509,7 +515,7 @@
     </p:spTree>
     <p:extLst>
       <p:ext uri="{BB962C8B-B14F-4D97-AF65-F5344CB8AC3E}">
-        <p14:creationId xmlns:p14="http://schemas.microsoft.com/office/powerpoint/2010/main" val="1892426091"/>
+        <p14:creationId xmlns="" xmlns:p14="http://schemas.microsoft.com/office/powerpoint/2010/main" val="1892426091"/>
       </p:ext>
     </p:extLst>
   </p:cSld>
@@ -548,8 +554,8 @@
         </p:nvSpPr>
         <p:spPr>
           <a:xfrm>
-            <a:off x="6629400" y="274638"/>
-            <a:ext cx="2057400" cy="5851525"/>
+            <a:off x="2087803" y="115323"/>
+            <a:ext cx="647938" cy="2457099"/>
           </a:xfrm>
         </p:spPr>
         <p:txBody>
@@ -576,8 +582,8 @@
         </p:nvSpPr>
         <p:spPr>
           <a:xfrm>
-            <a:off x="457200" y="274638"/>
-            <a:ext cx="6019800" cy="5851525"/>
+            <a:off x="143988" y="115323"/>
+            <a:ext cx="1895819" cy="2457099"/>
           </a:xfrm>
         </p:spPr>
         <p:txBody>
@@ -638,7 +644,8 @@
           <a:p>
             <a:fld id="{51B8AED7-6190-4D28-B91A-55C6DFF6AA70}" type="datetimeFigureOut">
               <a:rPr lang="en-AU" smtClean="0"/>
-              <a:t>16/09/2013</a:t>
+              <a:pPr/>
+              <a:t>17/09/2013</a:t>
             </a:fld>
             <a:endParaRPr lang="en-AU"/>
           </a:p>
@@ -680,6 +687,7 @@
           <a:p>
             <a:fld id="{EF7DD38E-AE8B-4C62-8EAE-3769809908FA}" type="slidenum">
               <a:rPr lang="en-AU" smtClean="0"/>
+              <a:pPr/>
               <a:t>‹#›</a:t>
             </a:fld>
             <a:endParaRPr lang="en-AU"/>
@@ -689,7 +697,7 @@
     </p:spTree>
     <p:extLst>
       <p:ext uri="{BB962C8B-B14F-4D97-AF65-F5344CB8AC3E}">
-        <p14:creationId xmlns:p14="http://schemas.microsoft.com/office/powerpoint/2010/main" val="2673325322"/>
+        <p14:creationId xmlns="" xmlns:p14="http://schemas.microsoft.com/office/powerpoint/2010/main" val="2673325322"/>
       </p:ext>
     </p:extLst>
   </p:cSld>
@@ -808,7 +816,8 @@
           <a:p>
             <a:fld id="{51B8AED7-6190-4D28-B91A-55C6DFF6AA70}" type="datetimeFigureOut">
               <a:rPr lang="en-AU" smtClean="0"/>
-              <a:t>16/09/2013</a:t>
+              <a:pPr/>
+              <a:t>17/09/2013</a:t>
             </a:fld>
             <a:endParaRPr lang="en-AU"/>
           </a:p>
@@ -850,6 +859,7 @@
           <a:p>
             <a:fld id="{EF7DD38E-AE8B-4C62-8EAE-3769809908FA}" type="slidenum">
               <a:rPr lang="en-AU" smtClean="0"/>
+              <a:pPr/>
               <a:t>‹#›</a:t>
             </a:fld>
             <a:endParaRPr lang="en-AU"/>
@@ -859,7 +869,7 @@
     </p:spTree>
     <p:extLst>
       <p:ext uri="{BB962C8B-B14F-4D97-AF65-F5344CB8AC3E}">
-        <p14:creationId xmlns:p14="http://schemas.microsoft.com/office/powerpoint/2010/main" val="2899241216"/>
+        <p14:creationId xmlns="" xmlns:p14="http://schemas.microsoft.com/office/powerpoint/2010/main" val="2899241216"/>
       </p:ext>
     </p:extLst>
   </p:cSld>
@@ -898,15 +908,15 @@
         </p:nvSpPr>
         <p:spPr>
           <a:xfrm>
-            <a:off x="722313" y="4406900"/>
-            <a:ext cx="7772400" cy="1362075"/>
+            <a:off x="227479" y="1850492"/>
+            <a:ext cx="2447767" cy="571945"/>
           </a:xfrm>
         </p:spPr>
         <p:txBody>
           <a:bodyPr anchor="t"/>
           <a:lstStyle>
             <a:lvl1pPr algn="l">
-              <a:defRPr sz="4000" b="1" cap="all"/>
+              <a:defRPr sz="1500" b="1" cap="all"/>
             </a:lvl1pPr>
           </a:lstStyle>
           <a:p>
@@ -930,8 +940,8 @@
         </p:nvSpPr>
         <p:spPr>
           <a:xfrm>
-            <a:off x="722313" y="2906713"/>
-            <a:ext cx="7772400" cy="1500187"/>
+            <a:off x="227479" y="1220550"/>
+            <a:ext cx="2447767" cy="629940"/>
           </a:xfrm>
         </p:spPr>
         <p:txBody>
@@ -939,7 +949,7 @@
           <a:lstStyle>
             <a:lvl1pPr marL="0" indent="0">
               <a:buNone/>
-              <a:defRPr sz="2000">
+              <a:defRPr sz="700">
                 <a:solidFill>
                   <a:schemeClr val="tx1">
                     <a:tint val="75000"/>
@@ -947,9 +957,9 @@
                 </a:solidFill>
               </a:defRPr>
             </a:lvl1pPr>
-            <a:lvl2pPr marL="457200" indent="0">
-              <a:buNone/>
-              <a:defRPr sz="1800">
+            <a:lvl2pPr marL="164511" indent="0">
+              <a:buNone/>
+              <a:defRPr sz="600">
                 <a:solidFill>
                   <a:schemeClr val="tx1">
                     <a:tint val="75000"/>
@@ -957,9 +967,9 @@
                 </a:solidFill>
               </a:defRPr>
             </a:lvl2pPr>
-            <a:lvl3pPr marL="914400" indent="0">
-              <a:buNone/>
-              <a:defRPr sz="1600">
+            <a:lvl3pPr marL="329021" indent="0">
+              <a:buNone/>
+              <a:defRPr sz="500">
                 <a:solidFill>
                   <a:schemeClr val="tx1">
                     <a:tint val="75000"/>
@@ -967,9 +977,9 @@
                 </a:solidFill>
               </a:defRPr>
             </a:lvl3pPr>
-            <a:lvl4pPr marL="1371600" indent="0">
-              <a:buNone/>
-              <a:defRPr sz="1400">
+            <a:lvl4pPr marL="493532" indent="0">
+              <a:buNone/>
+              <a:defRPr sz="500">
                 <a:solidFill>
                   <a:schemeClr val="tx1">
                     <a:tint val="75000"/>
@@ -977,9 +987,9 @@
                 </a:solidFill>
               </a:defRPr>
             </a:lvl4pPr>
-            <a:lvl5pPr marL="1828800" indent="0">
-              <a:buNone/>
-              <a:defRPr sz="1400">
+            <a:lvl5pPr marL="658043" indent="0">
+              <a:buNone/>
+              <a:defRPr sz="500">
                 <a:solidFill>
                   <a:schemeClr val="tx1">
                     <a:tint val="75000"/>
@@ -987,9 +997,9 @@
                 </a:solidFill>
               </a:defRPr>
             </a:lvl5pPr>
-            <a:lvl6pPr marL="2286000" indent="0">
-              <a:buNone/>
-              <a:defRPr sz="1400">
+            <a:lvl6pPr marL="822553" indent="0">
+              <a:buNone/>
+              <a:defRPr sz="500">
                 <a:solidFill>
                   <a:schemeClr val="tx1">
                     <a:tint val="75000"/>
@@ -997,9 +1007,9 @@
                 </a:solidFill>
               </a:defRPr>
             </a:lvl6pPr>
-            <a:lvl7pPr marL="2743200" indent="0">
-              <a:buNone/>
-              <a:defRPr sz="1400">
+            <a:lvl7pPr marL="987064" indent="0">
+              <a:buNone/>
+              <a:defRPr sz="500">
                 <a:solidFill>
                   <a:schemeClr val="tx1">
                     <a:tint val="75000"/>
@@ -1007,9 +1017,9 @@
                 </a:solidFill>
               </a:defRPr>
             </a:lvl7pPr>
-            <a:lvl8pPr marL="3200400" indent="0">
-              <a:buNone/>
-              <a:defRPr sz="1400">
+            <a:lvl8pPr marL="1151575" indent="0">
+              <a:buNone/>
+              <a:defRPr sz="500">
                 <a:solidFill>
                   <a:schemeClr val="tx1">
                     <a:tint val="75000"/>
@@ -1017,9 +1027,9 @@
                 </a:solidFill>
               </a:defRPr>
             </a:lvl8pPr>
-            <a:lvl9pPr marL="3657600" indent="0">
-              <a:buNone/>
-              <a:defRPr sz="1400">
+            <a:lvl9pPr marL="1316086" indent="0">
+              <a:buNone/>
+              <a:defRPr sz="500">
                 <a:solidFill>
                   <a:schemeClr val="tx1">
                     <a:tint val="75000"/>
@@ -1054,7 +1064,8 @@
           <a:p>
             <a:fld id="{51B8AED7-6190-4D28-B91A-55C6DFF6AA70}" type="datetimeFigureOut">
               <a:rPr lang="en-AU" smtClean="0"/>
-              <a:t>16/09/2013</a:t>
+              <a:pPr/>
+              <a:t>17/09/2013</a:t>
             </a:fld>
             <a:endParaRPr lang="en-AU"/>
           </a:p>
@@ -1096,6 +1107,7 @@
           <a:p>
             <a:fld id="{EF7DD38E-AE8B-4C62-8EAE-3769809908FA}" type="slidenum">
               <a:rPr lang="en-AU" smtClean="0"/>
+              <a:pPr/>
               <a:t>‹#›</a:t>
             </a:fld>
             <a:endParaRPr lang="en-AU"/>
@@ -1105,7 +1117,7 @@
     </p:spTree>
     <p:extLst>
       <p:ext uri="{BB962C8B-B14F-4D97-AF65-F5344CB8AC3E}">
-        <p14:creationId xmlns:p14="http://schemas.microsoft.com/office/powerpoint/2010/main" val="788024222"/>
+        <p14:creationId xmlns="" xmlns:p14="http://schemas.microsoft.com/office/powerpoint/2010/main" val="788024222"/>
       </p:ext>
     </p:extLst>
   </p:cSld>
@@ -1167,39 +1179,39 @@
         </p:nvSpPr>
         <p:spPr>
           <a:xfrm>
-            <a:off x="457200" y="1600200"/>
-            <a:ext cx="4038600" cy="4525963"/>
+            <a:off x="143987" y="671937"/>
+            <a:ext cx="1271879" cy="1900485"/>
           </a:xfrm>
         </p:spPr>
         <p:txBody>
           <a:bodyPr/>
           <a:lstStyle>
             <a:lvl1pPr>
-              <a:defRPr sz="2800"/>
+              <a:defRPr sz="1000"/>
             </a:lvl1pPr>
             <a:lvl2pPr>
-              <a:defRPr sz="2400"/>
+              <a:defRPr sz="800"/>
             </a:lvl2pPr>
             <a:lvl3pPr>
-              <a:defRPr sz="2000"/>
+              <a:defRPr sz="700"/>
             </a:lvl3pPr>
             <a:lvl4pPr>
-              <a:defRPr sz="1800"/>
+              <a:defRPr sz="600"/>
             </a:lvl4pPr>
             <a:lvl5pPr>
-              <a:defRPr sz="1800"/>
+              <a:defRPr sz="600"/>
             </a:lvl5pPr>
             <a:lvl6pPr>
-              <a:defRPr sz="1800"/>
+              <a:defRPr sz="600"/>
             </a:lvl6pPr>
             <a:lvl7pPr>
-              <a:defRPr sz="1800"/>
+              <a:defRPr sz="600"/>
             </a:lvl7pPr>
             <a:lvl8pPr>
-              <a:defRPr sz="1800"/>
+              <a:defRPr sz="600"/>
             </a:lvl8pPr>
             <a:lvl9pPr>
-              <a:defRPr sz="1800"/>
+              <a:defRPr sz="600"/>
             </a:lvl9pPr>
           </a:lstStyle>
           <a:p>
@@ -1252,39 +1264,39 @@
         </p:nvSpPr>
         <p:spPr>
           <a:xfrm>
-            <a:off x="4648200" y="1600200"/>
-            <a:ext cx="4038600" cy="4525963"/>
+            <a:off x="1463860" y="671937"/>
+            <a:ext cx="1271879" cy="1900485"/>
           </a:xfrm>
         </p:spPr>
         <p:txBody>
           <a:bodyPr/>
           <a:lstStyle>
             <a:lvl1pPr>
-              <a:defRPr sz="2800"/>
+              <a:defRPr sz="1000"/>
             </a:lvl1pPr>
             <a:lvl2pPr>
-              <a:defRPr sz="2400"/>
+              <a:defRPr sz="800"/>
             </a:lvl2pPr>
             <a:lvl3pPr>
-              <a:defRPr sz="2000"/>
+              <a:defRPr sz="700"/>
             </a:lvl3pPr>
             <a:lvl4pPr>
-              <a:defRPr sz="1800"/>
+              <a:defRPr sz="600"/>
             </a:lvl4pPr>
             <a:lvl5pPr>
-              <a:defRPr sz="1800"/>
+              <a:defRPr sz="600"/>
             </a:lvl5pPr>
             <a:lvl6pPr>
-              <a:defRPr sz="1800"/>
+              <a:defRPr sz="600"/>
             </a:lvl6pPr>
             <a:lvl7pPr>
-              <a:defRPr sz="1800"/>
+              <a:defRPr sz="600"/>
             </a:lvl7pPr>
             <a:lvl8pPr>
-              <a:defRPr sz="1800"/>
+              <a:defRPr sz="600"/>
             </a:lvl8pPr>
             <a:lvl9pPr>
-              <a:defRPr sz="1800"/>
+              <a:defRPr sz="600"/>
             </a:lvl9pPr>
           </a:lstStyle>
           <a:p>
@@ -1342,7 +1354,8 @@
           <a:p>
             <a:fld id="{51B8AED7-6190-4D28-B91A-55C6DFF6AA70}" type="datetimeFigureOut">
               <a:rPr lang="en-AU" smtClean="0"/>
-              <a:t>16/09/2013</a:t>
+              <a:pPr/>
+              <a:t>17/09/2013</a:t>
             </a:fld>
             <a:endParaRPr lang="en-AU"/>
           </a:p>
@@ -1384,6 +1397,7 @@
           <a:p>
             <a:fld id="{EF7DD38E-AE8B-4C62-8EAE-3769809908FA}" type="slidenum">
               <a:rPr lang="en-AU" smtClean="0"/>
+              <a:pPr/>
               <a:t>‹#›</a:t>
             </a:fld>
             <a:endParaRPr lang="en-AU"/>
@@ -1393,7 +1407,7 @@
     </p:spTree>
     <p:extLst>
       <p:ext uri="{BB962C8B-B14F-4D97-AF65-F5344CB8AC3E}">
-        <p14:creationId xmlns:p14="http://schemas.microsoft.com/office/powerpoint/2010/main" val="2257451198"/>
+        <p14:creationId xmlns="" xmlns:p14="http://schemas.microsoft.com/office/powerpoint/2010/main" val="2257451198"/>
       </p:ext>
     </p:extLst>
   </p:cSld>
@@ -1459,8 +1473,8 @@
         </p:nvSpPr>
         <p:spPr>
           <a:xfrm>
-            <a:off x="457200" y="1535113"/>
-            <a:ext cx="4040188" cy="639762"/>
+            <a:off x="143987" y="644606"/>
+            <a:ext cx="1272379" cy="268641"/>
           </a:xfrm>
         </p:spPr>
         <p:txBody>
@@ -1468,39 +1482,39 @@
           <a:lstStyle>
             <a:lvl1pPr marL="0" indent="0">
               <a:buNone/>
-              <a:defRPr sz="2400" b="1"/>
+              <a:defRPr sz="800" b="1"/>
             </a:lvl1pPr>
-            <a:lvl2pPr marL="457200" indent="0">
-              <a:buNone/>
-              <a:defRPr sz="2000" b="1"/>
+            <a:lvl2pPr marL="164511" indent="0">
+              <a:buNone/>
+              <a:defRPr sz="700" b="1"/>
             </a:lvl2pPr>
-            <a:lvl3pPr marL="914400" indent="0">
-              <a:buNone/>
-              <a:defRPr sz="1800" b="1"/>
+            <a:lvl3pPr marL="329021" indent="0">
+              <a:buNone/>
+              <a:defRPr sz="600" b="1"/>
             </a:lvl3pPr>
-            <a:lvl4pPr marL="1371600" indent="0">
-              <a:buNone/>
-              <a:defRPr sz="1600" b="1"/>
+            <a:lvl4pPr marL="493532" indent="0">
+              <a:buNone/>
+              <a:defRPr sz="500" b="1"/>
             </a:lvl4pPr>
-            <a:lvl5pPr marL="1828800" indent="0">
-              <a:buNone/>
-              <a:defRPr sz="1600" b="1"/>
+            <a:lvl5pPr marL="658043" indent="0">
+              <a:buNone/>
+              <a:defRPr sz="500" b="1"/>
             </a:lvl5pPr>
-            <a:lvl6pPr marL="2286000" indent="0">
-              <a:buNone/>
-              <a:defRPr sz="1600" b="1"/>
+            <a:lvl6pPr marL="822553" indent="0">
+              <a:buNone/>
+              <a:defRPr sz="500" b="1"/>
             </a:lvl6pPr>
-            <a:lvl7pPr marL="2743200" indent="0">
-              <a:buNone/>
-              <a:defRPr sz="1600" b="1"/>
+            <a:lvl7pPr marL="987064" indent="0">
+              <a:buNone/>
+              <a:defRPr sz="500" b="1"/>
             </a:lvl7pPr>
-            <a:lvl8pPr marL="3200400" indent="0">
-              <a:buNone/>
-              <a:defRPr sz="1600" b="1"/>
+            <a:lvl8pPr marL="1151575" indent="0">
+              <a:buNone/>
+              <a:defRPr sz="500" b="1"/>
             </a:lvl8pPr>
-            <a:lvl9pPr marL="3657600" indent="0">
-              <a:buNone/>
-              <a:defRPr sz="1600" b="1"/>
+            <a:lvl9pPr marL="1316086" indent="0">
+              <a:buNone/>
+              <a:defRPr sz="500" b="1"/>
             </a:lvl9pPr>
           </a:lstStyle>
           <a:p>
@@ -1524,39 +1538,39 @@
         </p:nvSpPr>
         <p:spPr>
           <a:xfrm>
-            <a:off x="457200" y="2174875"/>
-            <a:ext cx="4040188" cy="3951288"/>
+            <a:off x="143987" y="913247"/>
+            <a:ext cx="1272379" cy="1659175"/>
           </a:xfrm>
         </p:spPr>
         <p:txBody>
           <a:bodyPr/>
           <a:lstStyle>
             <a:lvl1pPr>
-              <a:defRPr sz="2400"/>
+              <a:defRPr sz="800"/>
             </a:lvl1pPr>
             <a:lvl2pPr>
-              <a:defRPr sz="2000"/>
+              <a:defRPr sz="700"/>
             </a:lvl2pPr>
             <a:lvl3pPr>
-              <a:defRPr sz="1800"/>
+              <a:defRPr sz="600"/>
             </a:lvl3pPr>
             <a:lvl4pPr>
-              <a:defRPr sz="1600"/>
+              <a:defRPr sz="500"/>
             </a:lvl4pPr>
             <a:lvl5pPr>
-              <a:defRPr sz="1600"/>
+              <a:defRPr sz="500"/>
             </a:lvl5pPr>
             <a:lvl6pPr>
-              <a:defRPr sz="1600"/>
+              <a:defRPr sz="500"/>
             </a:lvl6pPr>
             <a:lvl7pPr>
-              <a:defRPr sz="1600"/>
+              <a:defRPr sz="500"/>
             </a:lvl7pPr>
             <a:lvl8pPr>
-              <a:defRPr sz="1600"/>
+              <a:defRPr sz="500"/>
             </a:lvl8pPr>
             <a:lvl9pPr>
-              <a:defRPr sz="1600"/>
+              <a:defRPr sz="500"/>
             </a:lvl9pPr>
           </a:lstStyle>
           <a:p>
@@ -1609,8 +1623,8 @@
         </p:nvSpPr>
         <p:spPr>
           <a:xfrm>
-            <a:off x="4645025" y="1535113"/>
-            <a:ext cx="4041775" cy="639762"/>
+            <a:off x="1462862" y="644606"/>
+            <a:ext cx="1272878" cy="268641"/>
           </a:xfrm>
         </p:spPr>
         <p:txBody>
@@ -1618,39 +1632,39 @@
           <a:lstStyle>
             <a:lvl1pPr marL="0" indent="0">
               <a:buNone/>
-              <a:defRPr sz="2400" b="1"/>
+              <a:defRPr sz="800" b="1"/>
             </a:lvl1pPr>
-            <a:lvl2pPr marL="457200" indent="0">
-              <a:buNone/>
-              <a:defRPr sz="2000" b="1"/>
+            <a:lvl2pPr marL="164511" indent="0">
+              <a:buNone/>
+              <a:defRPr sz="700" b="1"/>
             </a:lvl2pPr>
-            <a:lvl3pPr marL="914400" indent="0">
-              <a:buNone/>
-              <a:defRPr sz="1800" b="1"/>
+            <a:lvl3pPr marL="329021" indent="0">
+              <a:buNone/>
+              <a:defRPr sz="600" b="1"/>
             </a:lvl3pPr>
-            <a:lvl4pPr marL="1371600" indent="0">
-              <a:buNone/>
-              <a:defRPr sz="1600" b="1"/>
+            <a:lvl4pPr marL="493532" indent="0">
+              <a:buNone/>
+              <a:defRPr sz="500" b="1"/>
             </a:lvl4pPr>
-            <a:lvl5pPr marL="1828800" indent="0">
-              <a:buNone/>
-              <a:defRPr sz="1600" b="1"/>
+            <a:lvl5pPr marL="658043" indent="0">
+              <a:buNone/>
+              <a:defRPr sz="500" b="1"/>
             </a:lvl5pPr>
-            <a:lvl6pPr marL="2286000" indent="0">
-              <a:buNone/>
-              <a:defRPr sz="1600" b="1"/>
+            <a:lvl6pPr marL="822553" indent="0">
+              <a:buNone/>
+              <a:defRPr sz="500" b="1"/>
             </a:lvl6pPr>
-            <a:lvl7pPr marL="2743200" indent="0">
-              <a:buNone/>
-              <a:defRPr sz="1600" b="1"/>
+            <a:lvl7pPr marL="987064" indent="0">
+              <a:buNone/>
+              <a:defRPr sz="500" b="1"/>
             </a:lvl7pPr>
-            <a:lvl8pPr marL="3200400" indent="0">
-              <a:buNone/>
-              <a:defRPr sz="1600" b="1"/>
+            <a:lvl8pPr marL="1151575" indent="0">
+              <a:buNone/>
+              <a:defRPr sz="500" b="1"/>
             </a:lvl8pPr>
-            <a:lvl9pPr marL="3657600" indent="0">
-              <a:buNone/>
-              <a:defRPr sz="1600" b="1"/>
+            <a:lvl9pPr marL="1316086" indent="0">
+              <a:buNone/>
+              <a:defRPr sz="500" b="1"/>
             </a:lvl9pPr>
           </a:lstStyle>
           <a:p>
@@ -1674,39 +1688,39 @@
         </p:nvSpPr>
         <p:spPr>
           <a:xfrm>
-            <a:off x="4645025" y="2174875"/>
-            <a:ext cx="4041775" cy="3951288"/>
+            <a:off x="1462862" y="913247"/>
+            <a:ext cx="1272878" cy="1659175"/>
           </a:xfrm>
         </p:spPr>
         <p:txBody>
           <a:bodyPr/>
           <a:lstStyle>
             <a:lvl1pPr>
-              <a:defRPr sz="2400"/>
+              <a:defRPr sz="800"/>
             </a:lvl1pPr>
             <a:lvl2pPr>
-              <a:defRPr sz="2000"/>
+              <a:defRPr sz="700"/>
             </a:lvl2pPr>
             <a:lvl3pPr>
-              <a:defRPr sz="1800"/>
+              <a:defRPr sz="600"/>
             </a:lvl3pPr>
             <a:lvl4pPr>
-              <a:defRPr sz="1600"/>
+              <a:defRPr sz="500"/>
             </a:lvl4pPr>
             <a:lvl5pPr>
-              <a:defRPr sz="1600"/>
+              <a:defRPr sz="500"/>
             </a:lvl5pPr>
             <a:lvl6pPr>
-              <a:defRPr sz="1600"/>
+              <a:defRPr sz="500"/>
             </a:lvl6pPr>
             <a:lvl7pPr>
-              <a:defRPr sz="1600"/>
+              <a:defRPr sz="500"/>
             </a:lvl7pPr>
             <a:lvl8pPr>
-              <a:defRPr sz="1600"/>
+              <a:defRPr sz="500"/>
             </a:lvl8pPr>
             <a:lvl9pPr>
-              <a:defRPr sz="1600"/>
+              <a:defRPr sz="500"/>
             </a:lvl9pPr>
           </a:lstStyle>
           <a:p>
@@ -1764,7 +1778,8 @@
           <a:p>
             <a:fld id="{51B8AED7-6190-4D28-B91A-55C6DFF6AA70}" type="datetimeFigureOut">
               <a:rPr lang="en-AU" smtClean="0"/>
-              <a:t>16/09/2013</a:t>
+              <a:pPr/>
+              <a:t>17/09/2013</a:t>
             </a:fld>
             <a:endParaRPr lang="en-AU"/>
           </a:p>
@@ -1806,6 +1821,7 @@
           <a:p>
             <a:fld id="{EF7DD38E-AE8B-4C62-8EAE-3769809908FA}" type="slidenum">
               <a:rPr lang="en-AU" smtClean="0"/>
+              <a:pPr/>
               <a:t>‹#›</a:t>
             </a:fld>
             <a:endParaRPr lang="en-AU"/>
@@ -1815,7 +1831,7 @@
     </p:spTree>
     <p:extLst>
       <p:ext uri="{BB962C8B-B14F-4D97-AF65-F5344CB8AC3E}">
-        <p14:creationId xmlns:p14="http://schemas.microsoft.com/office/powerpoint/2010/main" val="3452154003"/>
+        <p14:creationId xmlns="" xmlns:p14="http://schemas.microsoft.com/office/powerpoint/2010/main" val="3452154003"/>
       </p:ext>
     </p:extLst>
   </p:cSld>
@@ -1882,7 +1898,8 @@
           <a:p>
             <a:fld id="{51B8AED7-6190-4D28-B91A-55C6DFF6AA70}" type="datetimeFigureOut">
               <a:rPr lang="en-AU" smtClean="0"/>
-              <a:t>16/09/2013</a:t>
+              <a:pPr/>
+              <a:t>17/09/2013</a:t>
             </a:fld>
             <a:endParaRPr lang="en-AU"/>
           </a:p>
@@ -1924,6 +1941,7 @@
           <a:p>
             <a:fld id="{EF7DD38E-AE8B-4C62-8EAE-3769809908FA}" type="slidenum">
               <a:rPr lang="en-AU" smtClean="0"/>
+              <a:pPr/>
               <a:t>‹#›</a:t>
             </a:fld>
             <a:endParaRPr lang="en-AU"/>
@@ -1933,7 +1951,7 @@
     </p:spTree>
     <p:extLst>
       <p:ext uri="{BB962C8B-B14F-4D97-AF65-F5344CB8AC3E}">
-        <p14:creationId xmlns:p14="http://schemas.microsoft.com/office/powerpoint/2010/main" val="2646042487"/>
+        <p14:creationId xmlns="" xmlns:p14="http://schemas.microsoft.com/office/powerpoint/2010/main" val="2646042487"/>
       </p:ext>
     </p:extLst>
   </p:cSld>
@@ -1977,7 +1995,8 @@
           <a:p>
             <a:fld id="{51B8AED7-6190-4D28-B91A-55C6DFF6AA70}" type="datetimeFigureOut">
               <a:rPr lang="en-AU" smtClean="0"/>
-              <a:t>16/09/2013</a:t>
+              <a:pPr/>
+              <a:t>17/09/2013</a:t>
             </a:fld>
             <a:endParaRPr lang="en-AU"/>
           </a:p>
@@ -2019,6 +2038,7 @@
           <a:p>
             <a:fld id="{EF7DD38E-AE8B-4C62-8EAE-3769809908FA}" type="slidenum">
               <a:rPr lang="en-AU" smtClean="0"/>
+              <a:pPr/>
               <a:t>‹#›</a:t>
             </a:fld>
             <a:endParaRPr lang="en-AU"/>
@@ -2028,7 +2048,7 @@
     </p:spTree>
     <p:extLst>
       <p:ext uri="{BB962C8B-B14F-4D97-AF65-F5344CB8AC3E}">
-        <p14:creationId xmlns:p14="http://schemas.microsoft.com/office/powerpoint/2010/main" val="2031956758"/>
+        <p14:creationId xmlns="" xmlns:p14="http://schemas.microsoft.com/office/powerpoint/2010/main" val="2031956758"/>
       </p:ext>
     </p:extLst>
   </p:cSld>
@@ -2067,15 +2087,15 @@
         </p:nvSpPr>
         <p:spPr>
           <a:xfrm>
-            <a:off x="457200" y="273050"/>
-            <a:ext cx="3008313" cy="1162050"/>
+            <a:off x="143986" y="114657"/>
+            <a:ext cx="947410" cy="487953"/>
           </a:xfrm>
         </p:spPr>
         <p:txBody>
           <a:bodyPr anchor="b"/>
           <a:lstStyle>
             <a:lvl1pPr algn="l">
-              <a:defRPr sz="2000" b="1"/>
+              <a:defRPr sz="700" b="1"/>
             </a:lvl1pPr>
           </a:lstStyle>
           <a:p>
@@ -2099,39 +2119,39 @@
         </p:nvSpPr>
         <p:spPr>
           <a:xfrm>
-            <a:off x="3575050" y="273050"/>
-            <a:ext cx="5111750" cy="5853113"/>
+            <a:off x="1125894" y="114657"/>
+            <a:ext cx="1609847" cy="2457766"/>
           </a:xfrm>
         </p:spPr>
         <p:txBody>
           <a:bodyPr/>
           <a:lstStyle>
             <a:lvl1pPr>
-              <a:defRPr sz="3200"/>
+              <a:defRPr sz="1200"/>
             </a:lvl1pPr>
             <a:lvl2pPr>
-              <a:defRPr sz="2800"/>
+              <a:defRPr sz="1000"/>
             </a:lvl2pPr>
             <a:lvl3pPr>
-              <a:defRPr sz="2400"/>
+              <a:defRPr sz="800"/>
             </a:lvl3pPr>
             <a:lvl4pPr>
-              <a:defRPr sz="2000"/>
+              <a:defRPr sz="700"/>
             </a:lvl4pPr>
             <a:lvl5pPr>
-              <a:defRPr sz="2000"/>
+              <a:defRPr sz="700"/>
             </a:lvl5pPr>
             <a:lvl6pPr>
-              <a:defRPr sz="2000"/>
+              <a:defRPr sz="700"/>
             </a:lvl6pPr>
             <a:lvl7pPr>
-              <a:defRPr sz="2000"/>
+              <a:defRPr sz="700"/>
             </a:lvl7pPr>
             <a:lvl8pPr>
-              <a:defRPr sz="2000"/>
+              <a:defRPr sz="700"/>
             </a:lvl8pPr>
             <a:lvl9pPr>
-              <a:defRPr sz="2000"/>
+              <a:defRPr sz="700"/>
             </a:lvl9pPr>
           </a:lstStyle>
           <a:p>
@@ -2184,8 +2204,8 @@
         </p:nvSpPr>
         <p:spPr>
           <a:xfrm>
-            <a:off x="457200" y="1435100"/>
-            <a:ext cx="3008313" cy="4691063"/>
+            <a:off x="143986" y="602611"/>
+            <a:ext cx="947410" cy="1969812"/>
           </a:xfrm>
         </p:spPr>
         <p:txBody>
@@ -2193,39 +2213,39 @@
           <a:lstStyle>
             <a:lvl1pPr marL="0" indent="0">
               <a:buNone/>
-              <a:defRPr sz="1400"/>
+              <a:defRPr sz="500"/>
             </a:lvl1pPr>
-            <a:lvl2pPr marL="457200" indent="0">
-              <a:buNone/>
-              <a:defRPr sz="1200"/>
+            <a:lvl2pPr marL="164511" indent="0">
+              <a:buNone/>
+              <a:defRPr sz="400"/>
             </a:lvl2pPr>
-            <a:lvl3pPr marL="914400" indent="0">
-              <a:buNone/>
-              <a:defRPr sz="1000"/>
+            <a:lvl3pPr marL="329021" indent="0">
+              <a:buNone/>
+              <a:defRPr sz="300"/>
             </a:lvl3pPr>
-            <a:lvl4pPr marL="1371600" indent="0">
-              <a:buNone/>
-              <a:defRPr sz="900"/>
+            <a:lvl4pPr marL="493532" indent="0">
+              <a:buNone/>
+              <a:defRPr sz="300"/>
             </a:lvl4pPr>
-            <a:lvl5pPr marL="1828800" indent="0">
-              <a:buNone/>
-              <a:defRPr sz="900"/>
+            <a:lvl5pPr marL="658043" indent="0">
+              <a:buNone/>
+              <a:defRPr sz="300"/>
             </a:lvl5pPr>
-            <a:lvl6pPr marL="2286000" indent="0">
-              <a:buNone/>
-              <a:defRPr sz="900"/>
+            <a:lvl6pPr marL="822553" indent="0">
+              <a:buNone/>
+              <a:defRPr sz="300"/>
             </a:lvl6pPr>
-            <a:lvl7pPr marL="2743200" indent="0">
-              <a:buNone/>
-              <a:defRPr sz="900"/>
+            <a:lvl7pPr marL="987064" indent="0">
+              <a:buNone/>
+              <a:defRPr sz="300"/>
             </a:lvl7pPr>
-            <a:lvl8pPr marL="3200400" indent="0">
-              <a:buNone/>
-              <a:defRPr sz="900"/>
+            <a:lvl8pPr marL="1151575" indent="0">
+              <a:buNone/>
+              <a:defRPr sz="300"/>
             </a:lvl8pPr>
-            <a:lvl9pPr marL="3657600" indent="0">
-              <a:buNone/>
-              <a:defRPr sz="900"/>
+            <a:lvl9pPr marL="1316086" indent="0">
+              <a:buNone/>
+              <a:defRPr sz="300"/>
             </a:lvl9pPr>
           </a:lstStyle>
           <a:p>
@@ -2254,7 +2274,8 @@
           <a:p>
             <a:fld id="{51B8AED7-6190-4D28-B91A-55C6DFF6AA70}" type="datetimeFigureOut">
               <a:rPr lang="en-AU" smtClean="0"/>
-              <a:t>16/09/2013</a:t>
+              <a:pPr/>
+              <a:t>17/09/2013</a:t>
             </a:fld>
             <a:endParaRPr lang="en-AU"/>
           </a:p>
@@ -2296,6 +2317,7 @@
           <a:p>
             <a:fld id="{EF7DD38E-AE8B-4C62-8EAE-3769809908FA}" type="slidenum">
               <a:rPr lang="en-AU" smtClean="0"/>
+              <a:pPr/>
               <a:t>‹#›</a:t>
             </a:fld>
             <a:endParaRPr lang="en-AU"/>
@@ -2305,7 +2327,7 @@
     </p:spTree>
     <p:extLst>
       <p:ext uri="{BB962C8B-B14F-4D97-AF65-F5344CB8AC3E}">
-        <p14:creationId xmlns:p14="http://schemas.microsoft.com/office/powerpoint/2010/main" val="2593434998"/>
+        <p14:creationId xmlns="" xmlns:p14="http://schemas.microsoft.com/office/powerpoint/2010/main" val="2593434998"/>
       </p:ext>
     </p:extLst>
   </p:cSld>
@@ -2344,15 +2366,15 @@
         </p:nvSpPr>
         <p:spPr>
           <a:xfrm>
-            <a:off x="1792288" y="4800600"/>
-            <a:ext cx="5486400" cy="566738"/>
+            <a:off x="564447" y="2015809"/>
+            <a:ext cx="1727835" cy="237977"/>
           </a:xfrm>
         </p:spPr>
         <p:txBody>
           <a:bodyPr anchor="b"/>
           <a:lstStyle>
             <a:lvl1pPr algn="l">
-              <a:defRPr sz="2000" b="1"/>
+              <a:defRPr sz="700" b="1"/>
             </a:lvl1pPr>
           </a:lstStyle>
           <a:p>
@@ -2376,8 +2398,8 @@
         </p:nvSpPr>
         <p:spPr>
           <a:xfrm>
-            <a:off x="1792288" y="612775"/>
-            <a:ext cx="5486400" cy="4114800"/>
+            <a:off x="564447" y="257310"/>
+            <a:ext cx="1727835" cy="1727835"/>
           </a:xfrm>
         </p:spPr>
         <p:txBody>
@@ -2385,39 +2407,39 @@
           <a:lstStyle>
             <a:lvl1pPr marL="0" indent="0">
               <a:buNone/>
-              <a:defRPr sz="3200"/>
+              <a:defRPr sz="1200"/>
             </a:lvl1pPr>
-            <a:lvl2pPr marL="457200" indent="0">
-              <a:buNone/>
-              <a:defRPr sz="2800"/>
+            <a:lvl2pPr marL="164511" indent="0">
+              <a:buNone/>
+              <a:defRPr sz="1000"/>
             </a:lvl2pPr>
-            <a:lvl3pPr marL="914400" indent="0">
-              <a:buNone/>
-              <a:defRPr sz="2400"/>
+            <a:lvl3pPr marL="329021" indent="0">
+              <a:buNone/>
+              <a:defRPr sz="800"/>
             </a:lvl3pPr>
-            <a:lvl4pPr marL="1371600" indent="0">
-              <a:buNone/>
-              <a:defRPr sz="2000"/>
+            <a:lvl4pPr marL="493532" indent="0">
+              <a:buNone/>
+              <a:defRPr sz="700"/>
             </a:lvl4pPr>
-            <a:lvl5pPr marL="1828800" indent="0">
-              <a:buNone/>
-              <a:defRPr sz="2000"/>
+            <a:lvl5pPr marL="658043" indent="0">
+              <a:buNone/>
+              <a:defRPr sz="700"/>
             </a:lvl5pPr>
-            <a:lvl6pPr marL="2286000" indent="0">
-              <a:buNone/>
-              <a:defRPr sz="2000"/>
+            <a:lvl6pPr marL="822553" indent="0">
+              <a:buNone/>
+              <a:defRPr sz="700"/>
             </a:lvl6pPr>
-            <a:lvl7pPr marL="2743200" indent="0">
-              <a:buNone/>
-              <a:defRPr sz="2000"/>
+            <a:lvl7pPr marL="987064" indent="0">
+              <a:buNone/>
+              <a:defRPr sz="700"/>
             </a:lvl7pPr>
-            <a:lvl8pPr marL="3200400" indent="0">
-              <a:buNone/>
-              <a:defRPr sz="2000"/>
+            <a:lvl8pPr marL="1151575" indent="0">
+              <a:buNone/>
+              <a:defRPr sz="700"/>
             </a:lvl8pPr>
-            <a:lvl9pPr marL="3657600" indent="0">
-              <a:buNone/>
-              <a:defRPr sz="2000"/>
+            <a:lvl9pPr marL="1316086" indent="0">
+              <a:buNone/>
+              <a:defRPr sz="700"/>
             </a:lvl9pPr>
           </a:lstStyle>
           <a:p>
@@ -2437,8 +2459,8 @@
         </p:nvSpPr>
         <p:spPr>
           <a:xfrm>
-            <a:off x="1792288" y="5367338"/>
-            <a:ext cx="5486400" cy="804862"/>
+            <a:off x="564447" y="2253786"/>
+            <a:ext cx="1727835" cy="337968"/>
           </a:xfrm>
         </p:spPr>
         <p:txBody>
@@ -2446,39 +2468,39 @@
           <a:lstStyle>
             <a:lvl1pPr marL="0" indent="0">
               <a:buNone/>
-              <a:defRPr sz="1400"/>
+              <a:defRPr sz="500"/>
             </a:lvl1pPr>
-            <a:lvl2pPr marL="457200" indent="0">
-              <a:buNone/>
-              <a:defRPr sz="1200"/>
+            <a:lvl2pPr marL="164511" indent="0">
+              <a:buNone/>
+              <a:defRPr sz="400"/>
             </a:lvl2pPr>
-            <a:lvl3pPr marL="914400" indent="0">
-              <a:buNone/>
-              <a:defRPr sz="1000"/>
+            <a:lvl3pPr marL="329021" indent="0">
+              <a:buNone/>
+              <a:defRPr sz="300"/>
             </a:lvl3pPr>
-            <a:lvl4pPr marL="1371600" indent="0">
-              <a:buNone/>
-              <a:defRPr sz="900"/>
+            <a:lvl4pPr marL="493532" indent="0">
+              <a:buNone/>
+              <a:defRPr sz="300"/>
             </a:lvl4pPr>
-            <a:lvl5pPr marL="1828800" indent="0">
-              <a:buNone/>
-              <a:defRPr sz="900"/>
+            <a:lvl5pPr marL="658043" indent="0">
+              <a:buNone/>
+              <a:defRPr sz="300"/>
             </a:lvl5pPr>
-            <a:lvl6pPr marL="2286000" indent="0">
-              <a:buNone/>
-              <a:defRPr sz="900"/>
+            <a:lvl6pPr marL="822553" indent="0">
+              <a:buNone/>
+              <a:defRPr sz="300"/>
             </a:lvl6pPr>
-            <a:lvl7pPr marL="2743200" indent="0">
-              <a:buNone/>
-              <a:defRPr sz="900"/>
+            <a:lvl7pPr marL="987064" indent="0">
+              <a:buNone/>
+              <a:defRPr sz="300"/>
             </a:lvl7pPr>
-            <a:lvl8pPr marL="3200400" indent="0">
-              <a:buNone/>
-              <a:defRPr sz="900"/>
+            <a:lvl8pPr marL="1151575" indent="0">
+              <a:buNone/>
+              <a:defRPr sz="300"/>
             </a:lvl8pPr>
-            <a:lvl9pPr marL="3657600" indent="0">
-              <a:buNone/>
-              <a:defRPr sz="900"/>
+            <a:lvl9pPr marL="1316086" indent="0">
+              <a:buNone/>
+              <a:defRPr sz="300"/>
             </a:lvl9pPr>
           </a:lstStyle>
           <a:p>
@@ -2507,7 +2529,8 @@
           <a:p>
             <a:fld id="{51B8AED7-6190-4D28-B91A-55C6DFF6AA70}" type="datetimeFigureOut">
               <a:rPr lang="en-AU" smtClean="0"/>
-              <a:t>16/09/2013</a:t>
+              <a:pPr/>
+              <a:t>17/09/2013</a:t>
             </a:fld>
             <a:endParaRPr lang="en-AU"/>
           </a:p>
@@ -2549,6 +2572,7 @@
           <a:p>
             <a:fld id="{EF7DD38E-AE8B-4C62-8EAE-3769809908FA}" type="slidenum">
               <a:rPr lang="en-AU" smtClean="0"/>
+              <a:pPr/>
               <a:t>‹#›</a:t>
             </a:fld>
             <a:endParaRPr lang="en-AU"/>
@@ -2558,7 +2582,7 @@
     </p:spTree>
     <p:extLst>
       <p:ext uri="{BB962C8B-B14F-4D97-AF65-F5344CB8AC3E}">
-        <p14:creationId xmlns:p14="http://schemas.microsoft.com/office/powerpoint/2010/main" val="2228732091"/>
+        <p14:creationId xmlns="" xmlns:p14="http://schemas.microsoft.com/office/powerpoint/2010/main" val="2228732091"/>
       </p:ext>
     </p:extLst>
   </p:cSld>
@@ -2602,15 +2626,15 @@
         </p:nvSpPr>
         <p:spPr>
           <a:xfrm>
-            <a:off x="457200" y="274638"/>
-            <a:ext cx="8229600" cy="1143000"/>
+            <a:off x="143987" y="115323"/>
+            <a:ext cx="2591753" cy="479954"/>
           </a:xfrm>
           <a:prstGeom prst="rect">
             <a:avLst/>
           </a:prstGeom>
         </p:spPr>
         <p:txBody>
-          <a:bodyPr vert="horz" lIns="91440" tIns="45720" rIns="91440" bIns="45720" rtlCol="0" anchor="ctr">
+          <a:bodyPr vert="horz" lIns="32902" tIns="16451" rIns="32902" bIns="16451" rtlCol="0" anchor="ctr">
             <a:normAutofit/>
           </a:bodyPr>
           <a:lstStyle/>
@@ -2635,15 +2659,15 @@
         </p:nvSpPr>
         <p:spPr>
           <a:xfrm>
-            <a:off x="457200" y="1600200"/>
-            <a:ext cx="8229600" cy="4525963"/>
+            <a:off x="143987" y="671937"/>
+            <a:ext cx="2591753" cy="1900485"/>
           </a:xfrm>
           <a:prstGeom prst="rect">
             <a:avLst/>
           </a:prstGeom>
         </p:spPr>
         <p:txBody>
-          <a:bodyPr vert="horz" lIns="91440" tIns="45720" rIns="91440" bIns="45720" rtlCol="0">
+          <a:bodyPr vert="horz" lIns="32902" tIns="16451" rIns="32902" bIns="16451" rtlCol="0">
             <a:normAutofit/>
           </a:bodyPr>
           <a:lstStyle/>
@@ -2697,18 +2721,18 @@
         </p:nvSpPr>
         <p:spPr>
           <a:xfrm>
-            <a:off x="457200" y="6356350"/>
-            <a:ext cx="2133600" cy="365125"/>
+            <a:off x="143986" y="2669080"/>
+            <a:ext cx="671937" cy="153319"/>
           </a:xfrm>
           <a:prstGeom prst="rect">
             <a:avLst/>
           </a:prstGeom>
         </p:spPr>
         <p:txBody>
-          <a:bodyPr vert="horz" lIns="91440" tIns="45720" rIns="91440" bIns="45720" rtlCol="0" anchor="ctr"/>
+          <a:bodyPr vert="horz" lIns="32902" tIns="16451" rIns="32902" bIns="16451" rtlCol="0" anchor="ctr"/>
           <a:lstStyle>
             <a:lvl1pPr algn="l">
-              <a:defRPr sz="1200">
+              <a:defRPr sz="400">
                 <a:solidFill>
                   <a:schemeClr val="tx1">
                     <a:tint val="75000"/>
@@ -2720,7 +2744,8 @@
           <a:p>
             <a:fld id="{51B8AED7-6190-4D28-B91A-55C6DFF6AA70}" type="datetimeFigureOut">
               <a:rPr lang="en-AU" smtClean="0"/>
-              <a:t>16/09/2013</a:t>
+              <a:pPr/>
+              <a:t>17/09/2013</a:t>
             </a:fld>
             <a:endParaRPr lang="en-AU"/>
           </a:p>
@@ -2738,18 +2763,18 @@
         </p:nvSpPr>
         <p:spPr>
           <a:xfrm>
-            <a:off x="3124200" y="6356350"/>
-            <a:ext cx="2895600" cy="365125"/>
+            <a:off x="983907" y="2669080"/>
+            <a:ext cx="911913" cy="153319"/>
           </a:xfrm>
           <a:prstGeom prst="rect">
             <a:avLst/>
           </a:prstGeom>
         </p:spPr>
         <p:txBody>
-          <a:bodyPr vert="horz" lIns="91440" tIns="45720" rIns="91440" bIns="45720" rtlCol="0" anchor="ctr"/>
+          <a:bodyPr vert="horz" lIns="32902" tIns="16451" rIns="32902" bIns="16451" rtlCol="0" anchor="ctr"/>
           <a:lstStyle>
             <a:lvl1pPr algn="ctr">
-              <a:defRPr sz="1200">
+              <a:defRPr sz="400">
                 <a:solidFill>
                   <a:schemeClr val="tx1">
                     <a:tint val="75000"/>
@@ -2775,18 +2800,18 @@
         </p:nvSpPr>
         <p:spPr>
           <a:xfrm>
-            <a:off x="6553200" y="6356350"/>
-            <a:ext cx="2133600" cy="365125"/>
+            <a:off x="2063803" y="2669080"/>
+            <a:ext cx="671937" cy="153319"/>
           </a:xfrm>
           <a:prstGeom prst="rect">
             <a:avLst/>
           </a:prstGeom>
         </p:spPr>
         <p:txBody>
-          <a:bodyPr vert="horz" lIns="91440" tIns="45720" rIns="91440" bIns="45720" rtlCol="0" anchor="ctr"/>
+          <a:bodyPr vert="horz" lIns="32902" tIns="16451" rIns="32902" bIns="16451" rtlCol="0" anchor="ctr"/>
           <a:lstStyle>
             <a:lvl1pPr algn="r">
-              <a:defRPr sz="1200">
+              <a:defRPr sz="400">
                 <a:solidFill>
                   <a:schemeClr val="tx1">
                     <a:tint val="75000"/>
@@ -2798,6 +2823,7 @@
           <a:p>
             <a:fld id="{EF7DD38E-AE8B-4C62-8EAE-3769809908FA}" type="slidenum">
               <a:rPr lang="en-AU" smtClean="0"/>
+              <a:pPr/>
               <a:t>‹#›</a:t>
             </a:fld>
             <a:endParaRPr lang="en-AU"/>
@@ -2807,7 +2833,7 @@
     </p:spTree>
     <p:extLst>
       <p:ext uri="{BB962C8B-B14F-4D97-AF65-F5344CB8AC3E}">
-        <p14:creationId xmlns:p14="http://schemas.microsoft.com/office/powerpoint/2010/main" val="1923439959"/>
+        <p14:creationId xmlns="" xmlns:p14="http://schemas.microsoft.com/office/powerpoint/2010/main" val="1923439959"/>
       </p:ext>
     </p:extLst>
   </p:cSld>
@@ -2827,12 +2853,12 @@
   </p:sldLayoutIdLst>
   <p:txStyles>
     <p:titleStyle>
-      <a:lvl1pPr algn="ctr" defTabSz="914400" rtl="0" eaLnBrk="1" latinLnBrk="0" hangingPunct="1">
+      <a:lvl1pPr algn="ctr" defTabSz="329021" rtl="0" eaLnBrk="1" latinLnBrk="0" hangingPunct="1">
         <a:spcBef>
           <a:spcPct val="0"/>
         </a:spcBef>
         <a:buNone/>
-        <a:defRPr sz="4400" kern="1200">
+        <a:defRPr sz="1600" kern="1200">
           <a:solidFill>
             <a:schemeClr val="tx1"/>
           </a:solidFill>
@@ -2843,13 +2869,13 @@
       </a:lvl1pPr>
     </p:titleStyle>
     <p:bodyStyle>
-      <a:lvl1pPr marL="342900" indent="-342900" algn="l" defTabSz="914400" rtl="0" eaLnBrk="1" latinLnBrk="0" hangingPunct="1">
+      <a:lvl1pPr marL="123383" indent="-123383" algn="l" defTabSz="329021" rtl="0" eaLnBrk="1" latinLnBrk="0" hangingPunct="1">
         <a:spcBef>
           <a:spcPct val="20000"/>
         </a:spcBef>
         <a:buFont typeface="Arial" pitchFamily="34" charset="0"/>
         <a:buChar char="•"/>
-        <a:defRPr sz="3200" kern="1200">
+        <a:defRPr sz="1200" kern="1200">
           <a:solidFill>
             <a:schemeClr val="tx1"/>
           </a:solidFill>
@@ -2858,13 +2884,13 @@
           <a:cs typeface="+mn-cs"/>
         </a:defRPr>
       </a:lvl1pPr>
-      <a:lvl2pPr marL="742950" indent="-285750" algn="l" defTabSz="914400" rtl="0" eaLnBrk="1" latinLnBrk="0" hangingPunct="1">
+      <a:lvl2pPr marL="267330" indent="-102819" algn="l" defTabSz="329021" rtl="0" eaLnBrk="1" latinLnBrk="0" hangingPunct="1">
         <a:spcBef>
           <a:spcPct val="20000"/>
         </a:spcBef>
         <a:buFont typeface="Arial" pitchFamily="34" charset="0"/>
         <a:buChar char="–"/>
-        <a:defRPr sz="2800" kern="1200">
+        <a:defRPr sz="1000" kern="1200">
           <a:solidFill>
             <a:schemeClr val="tx1"/>
           </a:solidFill>
@@ -2873,13 +2899,13 @@
           <a:cs typeface="+mn-cs"/>
         </a:defRPr>
       </a:lvl2pPr>
-      <a:lvl3pPr marL="1143000" indent="-228600" algn="l" defTabSz="914400" rtl="0" eaLnBrk="1" latinLnBrk="0" hangingPunct="1">
+      <a:lvl3pPr marL="411277" indent="-82255" algn="l" defTabSz="329021" rtl="0" eaLnBrk="1" latinLnBrk="0" hangingPunct="1">
         <a:spcBef>
           <a:spcPct val="20000"/>
         </a:spcBef>
         <a:buFont typeface="Arial" pitchFamily="34" charset="0"/>
         <a:buChar char="•"/>
-        <a:defRPr sz="2400" kern="1200">
+        <a:defRPr sz="800" kern="1200">
           <a:solidFill>
             <a:schemeClr val="tx1"/>
           </a:solidFill>
@@ -2888,13 +2914,13 @@
           <a:cs typeface="+mn-cs"/>
         </a:defRPr>
       </a:lvl3pPr>
-      <a:lvl4pPr marL="1600200" indent="-228600" algn="l" defTabSz="914400" rtl="0" eaLnBrk="1" latinLnBrk="0" hangingPunct="1">
+      <a:lvl4pPr marL="575787" indent="-82255" algn="l" defTabSz="329021" rtl="0" eaLnBrk="1" latinLnBrk="0" hangingPunct="1">
         <a:spcBef>
           <a:spcPct val="20000"/>
         </a:spcBef>
         <a:buFont typeface="Arial" pitchFamily="34" charset="0"/>
         <a:buChar char="–"/>
-        <a:defRPr sz="2000" kern="1200">
+        <a:defRPr sz="700" kern="1200">
           <a:solidFill>
             <a:schemeClr val="tx1"/>
           </a:solidFill>
@@ -2903,13 +2929,13 @@
           <a:cs typeface="+mn-cs"/>
         </a:defRPr>
       </a:lvl4pPr>
-      <a:lvl5pPr marL="2057400" indent="-228600" algn="l" defTabSz="914400" rtl="0" eaLnBrk="1" latinLnBrk="0" hangingPunct="1">
+      <a:lvl5pPr marL="740298" indent="-82255" algn="l" defTabSz="329021" rtl="0" eaLnBrk="1" latinLnBrk="0" hangingPunct="1">
         <a:spcBef>
           <a:spcPct val="20000"/>
         </a:spcBef>
         <a:buFont typeface="Arial" pitchFamily="34" charset="0"/>
         <a:buChar char="»"/>
-        <a:defRPr sz="2000" kern="1200">
+        <a:defRPr sz="700" kern="1200">
           <a:solidFill>
             <a:schemeClr val="tx1"/>
           </a:solidFill>
@@ -2918,13 +2944,13 @@
           <a:cs typeface="+mn-cs"/>
         </a:defRPr>
       </a:lvl5pPr>
-      <a:lvl6pPr marL="2514600" indent="-228600" algn="l" defTabSz="914400" rtl="0" eaLnBrk="1" latinLnBrk="0" hangingPunct="1">
+      <a:lvl6pPr marL="904809" indent="-82255" algn="l" defTabSz="329021" rtl="0" eaLnBrk="1" latinLnBrk="0" hangingPunct="1">
         <a:spcBef>
           <a:spcPct val="20000"/>
         </a:spcBef>
         <a:buFont typeface="Arial" pitchFamily="34" charset="0"/>
         <a:buChar char="•"/>
-        <a:defRPr sz="2000" kern="1200">
+        <a:defRPr sz="700" kern="1200">
           <a:solidFill>
             <a:schemeClr val="tx1"/>
           </a:solidFill>
@@ -2933,13 +2959,13 @@
           <a:cs typeface="+mn-cs"/>
         </a:defRPr>
       </a:lvl6pPr>
-      <a:lvl7pPr marL="2971800" indent="-228600" algn="l" defTabSz="914400" rtl="0" eaLnBrk="1" latinLnBrk="0" hangingPunct="1">
+      <a:lvl7pPr marL="1069319" indent="-82255" algn="l" defTabSz="329021" rtl="0" eaLnBrk="1" latinLnBrk="0" hangingPunct="1">
         <a:spcBef>
           <a:spcPct val="20000"/>
         </a:spcBef>
         <a:buFont typeface="Arial" pitchFamily="34" charset="0"/>
         <a:buChar char="•"/>
-        <a:defRPr sz="2000" kern="1200">
+        <a:defRPr sz="700" kern="1200">
           <a:solidFill>
             <a:schemeClr val="tx1"/>
           </a:solidFill>
@@ -2948,13 +2974,13 @@
           <a:cs typeface="+mn-cs"/>
         </a:defRPr>
       </a:lvl7pPr>
-      <a:lvl8pPr marL="3429000" indent="-228600" algn="l" defTabSz="914400" rtl="0" eaLnBrk="1" latinLnBrk="0" hangingPunct="1">
+      <a:lvl8pPr marL="1233830" indent="-82255" algn="l" defTabSz="329021" rtl="0" eaLnBrk="1" latinLnBrk="0" hangingPunct="1">
         <a:spcBef>
           <a:spcPct val="20000"/>
         </a:spcBef>
         <a:buFont typeface="Arial" pitchFamily="34" charset="0"/>
         <a:buChar char="•"/>
-        <a:defRPr sz="2000" kern="1200">
+        <a:defRPr sz="700" kern="1200">
           <a:solidFill>
             <a:schemeClr val="tx1"/>
           </a:solidFill>
@@ -2963,13 +2989,13 @@
           <a:cs typeface="+mn-cs"/>
         </a:defRPr>
       </a:lvl8pPr>
-      <a:lvl9pPr marL="3886200" indent="-228600" algn="l" defTabSz="914400" rtl="0" eaLnBrk="1" latinLnBrk="0" hangingPunct="1">
+      <a:lvl9pPr marL="1398341" indent="-82255" algn="l" defTabSz="329021" rtl="0" eaLnBrk="1" latinLnBrk="0" hangingPunct="1">
         <a:spcBef>
           <a:spcPct val="20000"/>
         </a:spcBef>
         <a:buFont typeface="Arial" pitchFamily="34" charset="0"/>
         <a:buChar char="•"/>
-        <a:defRPr sz="2000" kern="1200">
+        <a:defRPr sz="700" kern="1200">
           <a:solidFill>
             <a:schemeClr val="tx1"/>
           </a:solidFill>
@@ -2983,8 +3009,8 @@
       <a:defPPr>
         <a:defRPr lang="en-US"/>
       </a:defPPr>
-      <a:lvl1pPr marL="0" algn="l" defTabSz="914400" rtl="0" eaLnBrk="1" latinLnBrk="0" hangingPunct="1">
-        <a:defRPr sz="1800" kern="1200">
+      <a:lvl1pPr marL="0" algn="l" defTabSz="329021" rtl="0" eaLnBrk="1" latinLnBrk="0" hangingPunct="1">
+        <a:defRPr sz="600" kern="1200">
           <a:solidFill>
             <a:schemeClr val="tx1"/>
           </a:solidFill>
@@ -2993,8 +3019,8 @@
           <a:cs typeface="+mn-cs"/>
         </a:defRPr>
       </a:lvl1pPr>
-      <a:lvl2pPr marL="457200" algn="l" defTabSz="914400" rtl="0" eaLnBrk="1" latinLnBrk="0" hangingPunct="1">
-        <a:defRPr sz="1800" kern="1200">
+      <a:lvl2pPr marL="164511" algn="l" defTabSz="329021" rtl="0" eaLnBrk="1" latinLnBrk="0" hangingPunct="1">
+        <a:defRPr sz="600" kern="1200">
           <a:solidFill>
             <a:schemeClr val="tx1"/>
           </a:solidFill>
@@ -3003,8 +3029,8 @@
           <a:cs typeface="+mn-cs"/>
         </a:defRPr>
       </a:lvl2pPr>
-      <a:lvl3pPr marL="914400" algn="l" defTabSz="914400" rtl="0" eaLnBrk="1" latinLnBrk="0" hangingPunct="1">
-        <a:defRPr sz="1800" kern="1200">
+      <a:lvl3pPr marL="329021" algn="l" defTabSz="329021" rtl="0" eaLnBrk="1" latinLnBrk="0" hangingPunct="1">
+        <a:defRPr sz="600" kern="1200">
           <a:solidFill>
             <a:schemeClr val="tx1"/>
           </a:solidFill>
@@ -3013,8 +3039,8 @@
           <a:cs typeface="+mn-cs"/>
         </a:defRPr>
       </a:lvl3pPr>
-      <a:lvl4pPr marL="1371600" algn="l" defTabSz="914400" rtl="0" eaLnBrk="1" latinLnBrk="0" hangingPunct="1">
-        <a:defRPr sz="1800" kern="1200">
+      <a:lvl4pPr marL="493532" algn="l" defTabSz="329021" rtl="0" eaLnBrk="1" latinLnBrk="0" hangingPunct="1">
+        <a:defRPr sz="600" kern="1200">
           <a:solidFill>
             <a:schemeClr val="tx1"/>
           </a:solidFill>
@@ -3023,8 +3049,8 @@
           <a:cs typeface="+mn-cs"/>
         </a:defRPr>
       </a:lvl4pPr>
-      <a:lvl5pPr marL="1828800" algn="l" defTabSz="914400" rtl="0" eaLnBrk="1" latinLnBrk="0" hangingPunct="1">
-        <a:defRPr sz="1800" kern="1200">
+      <a:lvl5pPr marL="658043" algn="l" defTabSz="329021" rtl="0" eaLnBrk="1" latinLnBrk="0" hangingPunct="1">
+        <a:defRPr sz="600" kern="1200">
           <a:solidFill>
             <a:schemeClr val="tx1"/>
           </a:solidFill>
@@ -3033,8 +3059,8 @@
           <a:cs typeface="+mn-cs"/>
         </a:defRPr>
       </a:lvl5pPr>
-      <a:lvl6pPr marL="2286000" algn="l" defTabSz="914400" rtl="0" eaLnBrk="1" latinLnBrk="0" hangingPunct="1">
-        <a:defRPr sz="1800" kern="1200">
+      <a:lvl6pPr marL="822553" algn="l" defTabSz="329021" rtl="0" eaLnBrk="1" latinLnBrk="0" hangingPunct="1">
+        <a:defRPr sz="600" kern="1200">
           <a:solidFill>
             <a:schemeClr val="tx1"/>
           </a:solidFill>
@@ -3043,8 +3069,8 @@
           <a:cs typeface="+mn-cs"/>
         </a:defRPr>
       </a:lvl6pPr>
-      <a:lvl7pPr marL="2743200" algn="l" defTabSz="914400" rtl="0" eaLnBrk="1" latinLnBrk="0" hangingPunct="1">
-        <a:defRPr sz="1800" kern="1200">
+      <a:lvl7pPr marL="987064" algn="l" defTabSz="329021" rtl="0" eaLnBrk="1" latinLnBrk="0" hangingPunct="1">
+        <a:defRPr sz="600" kern="1200">
           <a:solidFill>
             <a:schemeClr val="tx1"/>
           </a:solidFill>
@@ -3053,8 +3079,8 @@
           <a:cs typeface="+mn-cs"/>
         </a:defRPr>
       </a:lvl7pPr>
-      <a:lvl8pPr marL="3200400" algn="l" defTabSz="914400" rtl="0" eaLnBrk="1" latinLnBrk="0" hangingPunct="1">
-        <a:defRPr sz="1800" kern="1200">
+      <a:lvl8pPr marL="1151575" algn="l" defTabSz="329021" rtl="0" eaLnBrk="1" latinLnBrk="0" hangingPunct="1">
+        <a:defRPr sz="600" kern="1200">
           <a:solidFill>
             <a:schemeClr val="tx1"/>
           </a:solidFill>
@@ -3063,8 +3089,8 @@
           <a:cs typeface="+mn-cs"/>
         </a:defRPr>
       </a:lvl8pPr>
-      <a:lvl9pPr marL="3657600" algn="l" defTabSz="914400" rtl="0" eaLnBrk="1" latinLnBrk="0" hangingPunct="1">
-        <a:defRPr sz="1800" kern="1200">
+      <a:lvl9pPr marL="1316086" algn="l" defTabSz="329021" rtl="0" eaLnBrk="1" latinLnBrk="0" hangingPunct="1">
+        <a:defRPr sz="600" kern="1200">
           <a:solidFill>
             <a:schemeClr val="tx1"/>
           </a:solidFill>
@@ -3105,8 +3131,8 @@
         </p:nvGrpSpPr>
         <p:grpSpPr>
           <a:xfrm>
-            <a:off x="3199977" y="420802"/>
-            <a:ext cx="1039966" cy="2880000"/>
+            <a:off x="1007772" y="176699"/>
+            <a:ext cx="327517" cy="1209333"/>
             <a:chOff x="6588224" y="1624337"/>
             <a:chExt cx="1144404" cy="3169224"/>
           </a:xfrm>
@@ -3514,7 +3540,7 @@
             <a:blip r:embed="rId3" cstate="print">
               <a:extLst>
                 <a:ext uri="{28A0092B-C50C-407E-A947-70E740481C1C}">
-                  <a14:useLocalDpi xmlns:a14="http://schemas.microsoft.com/office/drawing/2010/main" val="0"/>
+                  <a14:useLocalDpi xmlns="" xmlns:a14="http://schemas.microsoft.com/office/drawing/2010/main" val="0"/>
                 </a:ext>
               </a:extLst>
             </a:blip>
@@ -3648,8 +3674,8 @@
         </p:nvSpPr>
         <p:spPr>
           <a:xfrm>
-            <a:off x="3060152" y="404664"/>
-            <a:ext cx="2880000" cy="2880000"/>
+            <a:off x="963735" y="169923"/>
+            <a:ext cx="907000" cy="1209333"/>
           </a:xfrm>
           <a:prstGeom prst="rect">
             <a:avLst/>
@@ -3673,7 +3699,7 @@
           </a:fontRef>
         </p:style>
         <p:txBody>
-          <a:bodyPr rtlCol="0" anchor="ctr"/>
+          <a:bodyPr lIns="32902" tIns="16451" rIns="32902" bIns="16451" rtlCol="0" anchor="ctr"/>
           <a:lstStyle/>
           <a:p>
             <a:pPr algn="ctr"/>
@@ -3689,12 +3715,13 @@
         </p:nvSpPr>
         <p:spPr>
           <a:xfrm>
-            <a:off x="4222946" y="697030"/>
-            <a:ext cx="1656000" cy="1008000"/>
+            <a:off x="1329936" y="292689"/>
+            <a:ext cx="521525" cy="423267"/>
           </a:xfrm>
           <a:prstGeom prst="rect">
             <a:avLst/>
           </a:prstGeom>
+          <a:noFill/>
         </p:spPr>
         <p:style>
           <a:lnRef idx="2">
@@ -3713,7 +3740,7 @@
           </a:fontRef>
         </p:style>
         <p:txBody>
-          <a:bodyPr rtlCol="0" anchor="ctr"/>
+          <a:bodyPr lIns="32902" tIns="16451" rIns="32902" bIns="16451" rtlCol="0" anchor="ctr"/>
           <a:lstStyle/>
           <a:p>
             <a:pPr algn="ctr"/>
@@ -3723,20 +3750,14 @@
       </p:sp>
       <p:pic>
         <p:nvPicPr>
-          <p:cNvPr id="1027" name="Picture 3"/>
+          <p:cNvPr id="1026" name="Picture 2"/>
           <p:cNvPicPr>
             <a:picLocks noChangeAspect="1" noChangeArrowheads="1"/>
           </p:cNvPicPr>
           <p:nvPr/>
         </p:nvPicPr>
         <p:blipFill>
-          <a:blip r:embed="rId4">
-            <a:extLst>
-              <a:ext uri="{28A0092B-C50C-407E-A947-70E740481C1C}">
-                <a14:useLocalDpi xmlns:a14="http://schemas.microsoft.com/office/drawing/2010/main" val="0"/>
-              </a:ext>
-            </a:extLst>
-          </a:blip>
+          <a:blip r:embed="rId4" cstate="print"/>
           <a:srcRect/>
           <a:stretch>
             <a:fillRect/>
@@ -3744,53 +3765,1260 @@
         </p:blipFill>
         <p:spPr bwMode="auto">
           <a:xfrm>
-            <a:off x="4264893" y="1992635"/>
-            <a:ext cx="1657350" cy="1076325"/>
+            <a:off x="1235765" y="683946"/>
+            <a:ext cx="521950" cy="451957"/>
           </a:xfrm>
           <a:prstGeom prst="rect">
             <a:avLst/>
           </a:prstGeom>
           <a:noFill/>
-          <a:ln>
+          <a:ln w="9525">
             <a:noFill/>
+            <a:miter lim="800000"/>
+            <a:headEnd/>
+            <a:tailEnd/>
           </a:ln>
           <a:effectLst/>
-          <a:extLst>
-            <a:ext uri="{909E8E84-426E-40DD-AFC4-6F175D3DCCD1}">
-              <a14:hiddenFill xmlns:a14="http://schemas.microsoft.com/office/drawing/2010/main">
-                <a:solidFill>
-                  <a:schemeClr val="accent1"/>
-                </a:solidFill>
-              </a14:hiddenFill>
-            </a:ext>
-            <a:ext uri="{91240B29-F687-4F45-9708-019B960494DF}">
-              <a14:hiddenLine xmlns:a14="http://schemas.microsoft.com/office/drawing/2010/main" w="9525">
-                <a:solidFill>
-                  <a:schemeClr val="tx1"/>
-                </a:solidFill>
-                <a:miter lim="800000"/>
-                <a:headEnd/>
-                <a:tailEnd/>
-              </a14:hiddenLine>
-            </a:ext>
-            <a:ext uri="{AF507438-7753-43E0-B8FC-AC1667EBCBE1}">
-              <a14:hiddenEffects xmlns:a14="http://schemas.microsoft.com/office/drawing/2010/main">
-                <a:effectLst>
-                  <a:outerShdw dist="35921" dir="2700000" algn="ctr" rotWithShape="0">
-                    <a:schemeClr val="bg2"/>
-                  </a:outerShdw>
-                </a:effectLst>
-              </a14:hiddenEffects>
-            </a:ext>
-          </a:extLst>
         </p:spPr>
       </p:pic>
     </p:spTree>
     <p:extLst>
       <p:ext uri="{BB962C8B-B14F-4D97-AF65-F5344CB8AC3E}">
-        <p14:creationId xmlns:p14="http://schemas.microsoft.com/office/powerpoint/2010/main" val="2119511818"/>
+        <p14:creationId xmlns="" xmlns:p14="http://schemas.microsoft.com/office/powerpoint/2010/main" val="2119511818"/>
       </p:ext>
     </p:extLst>
+  </p:cSld>
+  <p:clrMapOvr>
+    <a:masterClrMapping/>
+  </p:clrMapOvr>
+</p:sld>
+</file>
+
+<file path=ppt/slides/slide2.xml><?xml version="1.0" encoding="utf-8"?>
+<p:sld xmlns:a="http://schemas.openxmlformats.org/drawingml/2006/main" xmlns:r="http://schemas.openxmlformats.org/officeDocument/2006/relationships" xmlns:p="http://schemas.openxmlformats.org/presentationml/2006/main">
+  <p:cSld>
+    <p:spTree>
+      <p:nvGrpSpPr>
+        <p:cNvPr id="1" name=""/>
+        <p:cNvGrpSpPr/>
+        <p:nvPr/>
+      </p:nvGrpSpPr>
+      <p:grpSpPr>
+        <a:xfrm>
+          <a:off x="0" y="0"/>
+          <a:ext cx="0" cy="0"/>
+          <a:chOff x="0" y="0"/>
+          <a:chExt cx="0" cy="0"/>
+        </a:xfrm>
+      </p:grpSpPr>
+      <p:grpSp>
+        <p:nvGrpSpPr>
+          <p:cNvPr id="21" name="Group 20"/>
+          <p:cNvGrpSpPr/>
+          <p:nvPr/>
+        </p:nvGrpSpPr>
+        <p:grpSpPr>
+          <a:xfrm>
+            <a:off x="1007771" y="176699"/>
+            <a:ext cx="817611" cy="1209333"/>
+            <a:chOff x="3199977" y="420802"/>
+            <a:chExt cx="2596159" cy="2880000"/>
+          </a:xfrm>
+        </p:grpSpPr>
+        <p:grpSp>
+          <p:nvGrpSpPr>
+            <p:cNvPr id="4" name="Group 3"/>
+            <p:cNvGrpSpPr>
+              <a:grpSpLocks noChangeAspect="1"/>
+            </p:cNvGrpSpPr>
+            <p:nvPr/>
+          </p:nvGrpSpPr>
+          <p:grpSpPr>
+            <a:xfrm>
+              <a:off x="3199977" y="420802"/>
+              <a:ext cx="1039966" cy="2880000"/>
+              <a:chOff x="6588224" y="1624337"/>
+              <a:chExt cx="1144404" cy="3169224"/>
+            </a:xfrm>
+          </p:grpSpPr>
+          <p:sp>
+            <p:nvSpPr>
+              <p:cNvPr id="5" name="Isosceles Triangle 4"/>
+              <p:cNvSpPr>
+                <a:spLocks noChangeAspect="1"/>
+              </p:cNvSpPr>
+              <p:nvPr/>
+            </p:nvSpPr>
+            <p:spPr>
+              <a:xfrm flipV="1">
+                <a:off x="6588224" y="2121765"/>
+                <a:ext cx="809793" cy="809793"/>
+              </a:xfrm>
+              <a:prstGeom prst="triangle">
+                <a:avLst/>
+              </a:prstGeom>
+              <a:noFill/>
+              <a:ln w="44450">
+                <a:solidFill>
+                  <a:schemeClr val="tx1"/>
+                </a:solidFill>
+              </a:ln>
+            </p:spPr>
+            <p:style>
+              <a:lnRef idx="2">
+                <a:schemeClr val="accent1">
+                  <a:shade val="50000"/>
+                </a:schemeClr>
+              </a:lnRef>
+              <a:fillRef idx="1">
+                <a:schemeClr val="accent1"/>
+              </a:fillRef>
+              <a:effectRef idx="0">
+                <a:schemeClr val="accent1"/>
+              </a:effectRef>
+              <a:fontRef idx="minor">
+                <a:schemeClr val="lt1"/>
+              </a:fontRef>
+            </p:style>
+            <p:txBody>
+              <a:bodyPr rtlCol="0" anchor="ctr"/>
+              <a:lstStyle/>
+              <a:p>
+                <a:pPr algn="ctr"/>
+                <a:endParaRPr lang="en-AU"/>
+              </a:p>
+            </p:txBody>
+          </p:sp>
+          <p:cxnSp>
+            <p:nvCxnSpPr>
+              <p:cNvPr id="6" name="Curved Connector 5"/>
+              <p:cNvCxnSpPr>
+                <a:cxnSpLocks noChangeAspect="1"/>
+              </p:cNvCxnSpPr>
+              <p:nvPr/>
+            </p:nvCxnSpPr>
+            <p:spPr>
+              <a:xfrm flipV="1">
+                <a:off x="6877436" y="2329998"/>
+                <a:ext cx="231369" cy="231369"/>
+              </a:xfrm>
+              <a:prstGeom prst="curvedConnector3">
+                <a:avLst/>
+              </a:prstGeom>
+              <a:ln w="44450"/>
+            </p:spPr>
+            <p:style>
+              <a:lnRef idx="2">
+                <a:schemeClr val="accent1"/>
+              </a:lnRef>
+              <a:fillRef idx="0">
+                <a:schemeClr val="accent1"/>
+              </a:fillRef>
+              <a:effectRef idx="1">
+                <a:schemeClr val="accent1"/>
+              </a:effectRef>
+              <a:fontRef idx="minor">
+                <a:schemeClr val="tx1"/>
+              </a:fontRef>
+            </p:style>
+          </p:cxnSp>
+          <p:cxnSp>
+            <p:nvCxnSpPr>
+              <p:cNvPr id="7" name="Straight Connector 6"/>
+              <p:cNvCxnSpPr>
+                <a:cxnSpLocks noChangeAspect="1"/>
+              </p:cNvCxnSpPr>
+              <p:nvPr/>
+            </p:nvCxnSpPr>
+            <p:spPr>
+              <a:xfrm>
+                <a:off x="6993120" y="1624337"/>
+                <a:ext cx="0" cy="474307"/>
+              </a:xfrm>
+              <a:prstGeom prst="line">
+                <a:avLst/>
+              </a:prstGeom>
+              <a:ln w="44450">
+                <a:solidFill>
+                  <a:schemeClr val="tx1"/>
+                </a:solidFill>
+              </a:ln>
+            </p:spPr>
+            <p:style>
+              <a:lnRef idx="1">
+                <a:schemeClr val="accent1"/>
+              </a:lnRef>
+              <a:fillRef idx="0">
+                <a:schemeClr val="accent1"/>
+              </a:fillRef>
+              <a:effectRef idx="0">
+                <a:schemeClr val="accent1"/>
+              </a:effectRef>
+              <a:fontRef idx="minor">
+                <a:schemeClr val="tx1"/>
+              </a:fontRef>
+            </p:style>
+          </p:cxnSp>
+          <p:cxnSp>
+            <p:nvCxnSpPr>
+              <p:cNvPr id="8" name="Straight Connector 7"/>
+              <p:cNvCxnSpPr>
+                <a:cxnSpLocks noChangeAspect="1"/>
+              </p:cNvCxnSpPr>
+              <p:nvPr/>
+            </p:nvCxnSpPr>
+            <p:spPr>
+              <a:xfrm flipV="1">
+                <a:off x="6994599" y="3594203"/>
+                <a:ext cx="0" cy="115685"/>
+              </a:xfrm>
+              <a:prstGeom prst="line">
+                <a:avLst/>
+              </a:prstGeom>
+              <a:ln w="44450">
+                <a:solidFill>
+                  <a:schemeClr val="tx1"/>
+                </a:solidFill>
+              </a:ln>
+            </p:spPr>
+            <p:style>
+              <a:lnRef idx="1">
+                <a:schemeClr val="accent1"/>
+              </a:lnRef>
+              <a:fillRef idx="0">
+                <a:schemeClr val="accent1"/>
+              </a:fillRef>
+              <a:effectRef idx="0">
+                <a:schemeClr val="accent1"/>
+              </a:effectRef>
+              <a:fontRef idx="minor">
+                <a:schemeClr val="tx1"/>
+              </a:fontRef>
+            </p:style>
+          </p:cxnSp>
+          <p:grpSp>
+            <p:nvGrpSpPr>
+              <p:cNvPr id="9" name="Group 34"/>
+              <p:cNvGrpSpPr>
+                <a:grpSpLocks noChangeAspect="1"/>
+              </p:cNvGrpSpPr>
+              <p:nvPr/>
+            </p:nvGrpSpPr>
+            <p:grpSpPr>
+              <a:xfrm>
+                <a:off x="6823057" y="3706613"/>
+                <a:ext cx="349879" cy="61114"/>
+                <a:chOff x="4724894" y="1611142"/>
+                <a:chExt cx="108879" cy="19018"/>
+              </a:xfrm>
+            </p:grpSpPr>
+            <p:cxnSp>
+              <p:nvCxnSpPr>
+                <p:cNvPr id="16" name="Straight Connector 15"/>
+                <p:cNvCxnSpPr/>
+                <p:nvPr/>
+              </p:nvCxnSpPr>
+              <p:spPr>
+                <a:xfrm>
+                  <a:off x="4725773" y="1612161"/>
+                  <a:ext cx="108000" cy="0"/>
+                </a:xfrm>
+                <a:prstGeom prst="line">
+                  <a:avLst/>
+                </a:prstGeom>
+                <a:ln w="44450"/>
+              </p:spPr>
+              <p:style>
+                <a:lnRef idx="1">
+                  <a:schemeClr val="accent1"/>
+                </a:lnRef>
+                <a:fillRef idx="0">
+                  <a:schemeClr val="accent1"/>
+                </a:fillRef>
+                <a:effectRef idx="0">
+                  <a:schemeClr val="accent1"/>
+                </a:effectRef>
+                <a:fontRef idx="minor">
+                  <a:schemeClr val="tx1"/>
+                </a:fontRef>
+              </p:style>
+            </p:cxnSp>
+            <p:cxnSp>
+              <p:nvCxnSpPr>
+                <p:cNvPr id="17" name="Straight Connector 16"/>
+                <p:cNvCxnSpPr/>
+                <p:nvPr/>
+              </p:nvCxnSpPr>
+              <p:spPr>
+                <a:xfrm>
+                  <a:off x="4724894" y="1612160"/>
+                  <a:ext cx="0" cy="18000"/>
+                </a:xfrm>
+                <a:prstGeom prst="line">
+                  <a:avLst/>
+                </a:prstGeom>
+                <a:ln w="44450"/>
+              </p:spPr>
+              <p:style>
+                <a:lnRef idx="1">
+                  <a:schemeClr val="accent1"/>
+                </a:lnRef>
+                <a:fillRef idx="0">
+                  <a:schemeClr val="accent1"/>
+                </a:fillRef>
+                <a:effectRef idx="0">
+                  <a:schemeClr val="accent1"/>
+                </a:effectRef>
+                <a:fontRef idx="minor">
+                  <a:schemeClr val="tx1"/>
+                </a:fontRef>
+              </p:style>
+            </p:cxnSp>
+            <p:cxnSp>
+              <p:nvCxnSpPr>
+                <p:cNvPr id="18" name="Straight Connector 17"/>
+                <p:cNvCxnSpPr/>
+                <p:nvPr/>
+              </p:nvCxnSpPr>
+              <p:spPr>
+                <a:xfrm>
+                  <a:off x="4832400" y="1611142"/>
+                  <a:ext cx="0" cy="18000"/>
+                </a:xfrm>
+                <a:prstGeom prst="line">
+                  <a:avLst/>
+                </a:prstGeom>
+                <a:ln w="44450"/>
+              </p:spPr>
+              <p:style>
+                <a:lnRef idx="1">
+                  <a:schemeClr val="accent1"/>
+                </a:lnRef>
+                <a:fillRef idx="0">
+                  <a:schemeClr val="accent1"/>
+                </a:fillRef>
+                <a:effectRef idx="0">
+                  <a:schemeClr val="accent1"/>
+                </a:effectRef>
+                <a:fontRef idx="minor">
+                  <a:schemeClr val="tx1"/>
+                </a:fontRef>
+              </p:style>
+            </p:cxnSp>
+          </p:grpSp>
+          <p:sp>
+            <p:nvSpPr>
+              <p:cNvPr id="10" name="Rectangle 9"/>
+              <p:cNvSpPr>
+                <a:spLocks noChangeAspect="1"/>
+              </p:cNvSpPr>
+              <p:nvPr/>
+            </p:nvSpPr>
+            <p:spPr>
+              <a:xfrm>
+                <a:off x="6865446" y="3773514"/>
+                <a:ext cx="277643" cy="277643"/>
+              </a:xfrm>
+              <a:prstGeom prst="rect">
+                <a:avLst/>
+              </a:prstGeom>
+              <a:solidFill>
+                <a:schemeClr val="accent1"/>
+              </a:solidFill>
+              <a:ln w="12700">
+                <a:noFill/>
+              </a:ln>
+            </p:spPr>
+            <p:style>
+              <a:lnRef idx="2">
+                <a:schemeClr val="accent1">
+                  <a:shade val="50000"/>
+                </a:schemeClr>
+              </a:lnRef>
+              <a:fillRef idx="1">
+                <a:schemeClr val="accent1"/>
+              </a:fillRef>
+              <a:effectRef idx="0">
+                <a:schemeClr val="accent1"/>
+              </a:effectRef>
+              <a:fontRef idx="minor">
+                <a:schemeClr val="lt1"/>
+              </a:fontRef>
+            </p:style>
+            <p:txBody>
+              <a:bodyPr rtlCol="0" anchor="ctr"/>
+              <a:lstStyle/>
+              <a:p>
+                <a:pPr algn="ctr"/>
+                <a:endParaRPr lang="en-AU"/>
+              </a:p>
+            </p:txBody>
+          </p:sp>
+          <p:cxnSp>
+            <p:nvCxnSpPr>
+              <p:cNvPr id="11" name="Straight Connector 10"/>
+              <p:cNvCxnSpPr>
+                <a:cxnSpLocks noChangeAspect="1"/>
+              </p:cNvCxnSpPr>
+              <p:nvPr/>
+            </p:nvCxnSpPr>
+            <p:spPr>
+              <a:xfrm flipV="1">
+                <a:off x="6996559" y="4051158"/>
+                <a:ext cx="0" cy="115685"/>
+              </a:xfrm>
+              <a:prstGeom prst="line">
+                <a:avLst/>
+              </a:prstGeom>
+              <a:ln w="44450">
+                <a:solidFill>
+                  <a:schemeClr val="tx1"/>
+                </a:solidFill>
+              </a:ln>
+            </p:spPr>
+            <p:style>
+              <a:lnRef idx="1">
+                <a:schemeClr val="accent1"/>
+              </a:lnRef>
+              <a:fillRef idx="0">
+                <a:schemeClr val="accent1"/>
+              </a:fillRef>
+              <a:effectRef idx="0">
+                <a:schemeClr val="accent1"/>
+              </a:effectRef>
+              <a:fontRef idx="minor">
+                <a:schemeClr val="tx1"/>
+              </a:fontRef>
+            </p:style>
+          </p:cxnSp>
+          <p:cxnSp>
+            <p:nvCxnSpPr>
+              <p:cNvPr id="12" name="Straight Connector 11"/>
+              <p:cNvCxnSpPr>
+                <a:cxnSpLocks noChangeAspect="1"/>
+              </p:cNvCxnSpPr>
+              <p:nvPr/>
+            </p:nvCxnSpPr>
+            <p:spPr>
+              <a:xfrm>
+                <a:off x="6989235" y="2938213"/>
+                <a:ext cx="7767" cy="659403"/>
+              </a:xfrm>
+              <a:prstGeom prst="line">
+                <a:avLst/>
+              </a:prstGeom>
+              <a:ln w="44450">
+                <a:solidFill>
+                  <a:schemeClr val="tx1"/>
+                </a:solidFill>
+              </a:ln>
+            </p:spPr>
+            <p:style>
+              <a:lnRef idx="1">
+                <a:schemeClr val="accent1"/>
+              </a:lnRef>
+              <a:fillRef idx="0">
+                <a:schemeClr val="accent1"/>
+              </a:fillRef>
+              <a:effectRef idx="0">
+                <a:schemeClr val="accent1"/>
+              </a:effectRef>
+              <a:fontRef idx="minor">
+                <a:schemeClr val="tx1"/>
+              </a:fontRef>
+            </p:style>
+          </p:cxnSp>
+          <p:cxnSp>
+            <p:nvCxnSpPr>
+              <p:cNvPr id="13" name="Straight Connector 12"/>
+              <p:cNvCxnSpPr>
+                <a:cxnSpLocks noChangeAspect="1"/>
+              </p:cNvCxnSpPr>
+              <p:nvPr/>
+            </p:nvCxnSpPr>
+            <p:spPr>
+              <a:xfrm>
+                <a:off x="6993831" y="4157295"/>
+                <a:ext cx="0" cy="636266"/>
+              </a:xfrm>
+              <a:prstGeom prst="line">
+                <a:avLst/>
+              </a:prstGeom>
+              <a:ln w="44450">
+                <a:solidFill>
+                  <a:schemeClr val="tx1"/>
+                </a:solidFill>
+              </a:ln>
+            </p:spPr>
+            <p:style>
+              <a:lnRef idx="1">
+                <a:schemeClr val="accent1"/>
+              </a:lnRef>
+              <a:fillRef idx="0">
+                <a:schemeClr val="accent1"/>
+              </a:fillRef>
+              <a:effectRef idx="0">
+                <a:schemeClr val="accent1"/>
+              </a:effectRef>
+              <a:fontRef idx="minor">
+                <a:schemeClr val="tx1"/>
+              </a:fontRef>
+            </p:style>
+          </p:cxnSp>
+          <p:cxnSp>
+            <p:nvCxnSpPr>
+              <p:cNvPr id="14" name="Straight Arrow Connector 13"/>
+              <p:cNvCxnSpPr>
+                <a:cxnSpLocks noChangeAspect="1"/>
+              </p:cNvCxnSpPr>
+              <p:nvPr/>
+            </p:nvCxnSpPr>
+            <p:spPr>
+              <a:xfrm>
+                <a:off x="7246277" y="2457822"/>
+                <a:ext cx="486351" cy="0"/>
+              </a:xfrm>
+              <a:prstGeom prst="straightConnector1">
+                <a:avLst/>
+              </a:prstGeom>
+              <a:ln w="44450">
+                <a:tailEnd type="arrow"/>
+              </a:ln>
+            </p:spPr>
+            <p:style>
+              <a:lnRef idx="1">
+                <a:schemeClr val="accent1"/>
+              </a:lnRef>
+              <a:fillRef idx="0">
+                <a:schemeClr val="accent1"/>
+              </a:fillRef>
+              <a:effectRef idx="0">
+                <a:schemeClr val="accent1"/>
+              </a:effectRef>
+              <a:fontRef idx="minor">
+                <a:schemeClr val="tx1"/>
+              </a:fontRef>
+            </p:style>
+          </p:cxnSp>
+          <p:cxnSp>
+            <p:nvCxnSpPr>
+              <p:cNvPr id="15" name="Straight Arrow Connector 14"/>
+              <p:cNvCxnSpPr>
+                <a:cxnSpLocks noChangeAspect="1"/>
+              </p:cNvCxnSpPr>
+              <p:nvPr/>
+            </p:nvCxnSpPr>
+            <p:spPr>
+              <a:xfrm>
+                <a:off x="7191439" y="3925705"/>
+                <a:ext cx="522485" cy="0"/>
+              </a:xfrm>
+              <a:prstGeom prst="straightConnector1">
+                <a:avLst/>
+              </a:prstGeom>
+              <a:ln w="44450">
+                <a:tailEnd type="arrow"/>
+              </a:ln>
+            </p:spPr>
+            <p:style>
+              <a:lnRef idx="1">
+                <a:schemeClr val="accent1"/>
+              </a:lnRef>
+              <a:fillRef idx="0">
+                <a:schemeClr val="accent1"/>
+              </a:fillRef>
+              <a:effectRef idx="0">
+                <a:schemeClr val="accent1"/>
+              </a:effectRef>
+              <a:fontRef idx="minor">
+                <a:schemeClr val="tx1"/>
+              </a:fontRef>
+            </p:style>
+          </p:cxnSp>
+        </p:grpSp>
+        <p:pic>
+          <p:nvPicPr>
+            <p:cNvPr id="19" name="Picture 2"/>
+            <p:cNvPicPr>
+              <a:picLocks noChangeAspect="1" noChangeArrowheads="1"/>
+            </p:cNvPicPr>
+            <p:nvPr/>
+          </p:nvPicPr>
+          <p:blipFill>
+            <a:blip r:embed="rId2" cstate="print"/>
+            <a:srcRect/>
+            <a:stretch>
+              <a:fillRect/>
+            </a:stretch>
+          </p:blipFill>
+          <p:spPr bwMode="auto">
+            <a:xfrm>
+              <a:off x="3851920" y="692696"/>
+              <a:ext cx="1657350" cy="1076325"/>
+            </a:xfrm>
+            <a:prstGeom prst="rect">
+              <a:avLst/>
+            </a:prstGeom>
+            <a:noFill/>
+            <a:ln w="9525">
+              <a:noFill/>
+              <a:miter lim="800000"/>
+              <a:headEnd/>
+              <a:tailEnd/>
+            </a:ln>
+            <a:effectLst/>
+          </p:spPr>
+        </p:pic>
+        <p:pic>
+          <p:nvPicPr>
+            <p:cNvPr id="20" name="Picture 3"/>
+            <p:cNvPicPr>
+              <a:picLocks noChangeAspect="1" noChangeArrowheads="1"/>
+            </p:cNvPicPr>
+            <p:nvPr/>
+          </p:nvPicPr>
+          <p:blipFill>
+            <a:blip r:embed="rId3" cstate="print"/>
+            <a:srcRect/>
+            <a:stretch>
+              <a:fillRect/>
+            </a:stretch>
+          </p:blipFill>
+          <p:spPr bwMode="auto">
+            <a:xfrm>
+              <a:off x="4138786" y="1988840"/>
+              <a:ext cx="1657350" cy="1076325"/>
+            </a:xfrm>
+            <a:prstGeom prst="rect">
+              <a:avLst/>
+            </a:prstGeom>
+            <a:noFill/>
+            <a:ln w="9525">
+              <a:noFill/>
+              <a:miter lim="800000"/>
+              <a:headEnd/>
+              <a:tailEnd/>
+            </a:ln>
+            <a:effectLst/>
+          </p:spPr>
+        </p:pic>
+      </p:grpSp>
+    </p:spTree>
+  </p:cSld>
+  <p:clrMapOvr>
+    <a:masterClrMapping/>
+  </p:clrMapOvr>
+</p:sld>
+</file>
+
+<file path=ppt/slides/slide3.xml><?xml version="1.0" encoding="utf-8"?>
+<p:sld xmlns:a="http://schemas.openxmlformats.org/drawingml/2006/main" xmlns:r="http://schemas.openxmlformats.org/officeDocument/2006/relationships" xmlns:p="http://schemas.openxmlformats.org/presentationml/2006/main">
+  <p:cSld>
+    <p:spTree>
+      <p:nvGrpSpPr>
+        <p:cNvPr id="1" name=""/>
+        <p:cNvGrpSpPr/>
+        <p:nvPr/>
+      </p:nvGrpSpPr>
+      <p:grpSpPr>
+        <a:xfrm>
+          <a:off x="0" y="0"/>
+          <a:ext cx="0" cy="0"/>
+          <a:chOff x="0" y="0"/>
+          <a:chExt cx="0" cy="0"/>
+        </a:xfrm>
+      </p:grpSpPr>
+      <p:grpSp>
+        <p:nvGrpSpPr>
+          <p:cNvPr id="19" name="Group 18"/>
+          <p:cNvGrpSpPr/>
+          <p:nvPr/>
+        </p:nvGrpSpPr>
+        <p:grpSpPr>
+          <a:xfrm>
+            <a:off x="71710" y="-274"/>
+            <a:ext cx="2717850" cy="2879999"/>
+            <a:chOff x="71710" y="-274"/>
+            <a:chExt cx="2717850" cy="2879999"/>
+          </a:xfrm>
+        </p:grpSpPr>
+        <p:pic>
+          <p:nvPicPr>
+            <p:cNvPr id="1031" name="Picture 7"/>
+            <p:cNvPicPr>
+              <a:picLocks noChangeAspect="1" noChangeArrowheads="1"/>
+            </p:cNvPicPr>
+            <p:nvPr/>
+          </p:nvPicPr>
+          <p:blipFill>
+            <a:blip r:embed="rId2" cstate="print"/>
+            <a:srcRect/>
+            <a:stretch>
+              <a:fillRect/>
+            </a:stretch>
+          </p:blipFill>
+          <p:spPr bwMode="auto">
+            <a:xfrm>
+              <a:off x="1007814" y="208408"/>
+              <a:ext cx="1330325" cy="1087438"/>
+            </a:xfrm>
+            <a:prstGeom prst="rect">
+              <a:avLst/>
+            </a:prstGeom>
+            <a:noFill/>
+            <a:ln w="9525">
+              <a:noFill/>
+              <a:miter lim="800000"/>
+              <a:headEnd/>
+              <a:tailEnd/>
+            </a:ln>
+          </p:spPr>
+        </p:pic>
+        <p:pic>
+          <p:nvPicPr>
+            <p:cNvPr id="1033" name="Picture 9"/>
+            <p:cNvPicPr>
+              <a:picLocks noChangeAspect="1" noChangeArrowheads="1"/>
+            </p:cNvPicPr>
+            <p:nvPr/>
+          </p:nvPicPr>
+          <p:blipFill>
+            <a:blip r:embed="rId3" cstate="print"/>
+            <a:srcRect/>
+            <a:stretch>
+              <a:fillRect/>
+            </a:stretch>
+          </p:blipFill>
+          <p:spPr bwMode="auto">
+            <a:xfrm>
+              <a:off x="1079822" y="1563290"/>
+              <a:ext cx="1709738" cy="1028700"/>
+            </a:xfrm>
+            <a:prstGeom prst="rect">
+              <a:avLst/>
+            </a:prstGeom>
+            <a:noFill/>
+            <a:ln w="9525">
+              <a:noFill/>
+              <a:miter lim="800000"/>
+              <a:headEnd/>
+              <a:tailEnd/>
+            </a:ln>
+          </p:spPr>
+        </p:pic>
+        <p:grpSp>
+          <p:nvGrpSpPr>
+            <p:cNvPr id="22" name="Group 3"/>
+            <p:cNvGrpSpPr>
+              <a:grpSpLocks noChangeAspect="1"/>
+            </p:cNvGrpSpPr>
+            <p:nvPr/>
+          </p:nvGrpSpPr>
+          <p:grpSpPr>
+            <a:xfrm>
+              <a:off x="71710" y="-274"/>
+              <a:ext cx="1039968" cy="2879999"/>
+              <a:chOff x="6588224" y="1624337"/>
+              <a:chExt cx="1144404" cy="3169224"/>
+            </a:xfrm>
+          </p:grpSpPr>
+          <p:sp>
+            <p:nvSpPr>
+              <p:cNvPr id="25" name="Isosceles Triangle 24"/>
+              <p:cNvSpPr>
+                <a:spLocks noChangeAspect="1"/>
+              </p:cNvSpPr>
+              <p:nvPr/>
+            </p:nvSpPr>
+            <p:spPr>
+              <a:xfrm flipV="1">
+                <a:off x="6588224" y="2121765"/>
+                <a:ext cx="809793" cy="809793"/>
+              </a:xfrm>
+              <a:prstGeom prst="triangle">
+                <a:avLst/>
+              </a:prstGeom>
+              <a:noFill/>
+              <a:ln w="44450">
+                <a:solidFill>
+                  <a:schemeClr val="tx1"/>
+                </a:solidFill>
+              </a:ln>
+            </p:spPr>
+            <p:style>
+              <a:lnRef idx="2">
+                <a:schemeClr val="accent1">
+                  <a:shade val="50000"/>
+                </a:schemeClr>
+              </a:lnRef>
+              <a:fillRef idx="1">
+                <a:schemeClr val="accent1"/>
+              </a:fillRef>
+              <a:effectRef idx="0">
+                <a:schemeClr val="accent1"/>
+              </a:effectRef>
+              <a:fontRef idx="minor">
+                <a:schemeClr val="lt1"/>
+              </a:fontRef>
+            </p:style>
+            <p:txBody>
+              <a:bodyPr rtlCol="0" anchor="ctr"/>
+              <a:lstStyle/>
+              <a:p>
+                <a:pPr algn="ctr"/>
+                <a:endParaRPr lang="en-AU"/>
+              </a:p>
+            </p:txBody>
+          </p:sp>
+          <p:cxnSp>
+            <p:nvCxnSpPr>
+              <p:cNvPr id="26" name="Curved Connector 25"/>
+              <p:cNvCxnSpPr>
+                <a:cxnSpLocks noChangeAspect="1"/>
+              </p:cNvCxnSpPr>
+              <p:nvPr/>
+            </p:nvCxnSpPr>
+            <p:spPr>
+              <a:xfrm flipV="1">
+                <a:off x="6877436" y="2329998"/>
+                <a:ext cx="231369" cy="231369"/>
+              </a:xfrm>
+              <a:prstGeom prst="curvedConnector3">
+                <a:avLst/>
+              </a:prstGeom>
+              <a:ln w="44450"/>
+            </p:spPr>
+            <p:style>
+              <a:lnRef idx="2">
+                <a:schemeClr val="accent1"/>
+              </a:lnRef>
+              <a:fillRef idx="0">
+                <a:schemeClr val="accent1"/>
+              </a:fillRef>
+              <a:effectRef idx="1">
+                <a:schemeClr val="accent1"/>
+              </a:effectRef>
+              <a:fontRef idx="minor">
+                <a:schemeClr val="tx1"/>
+              </a:fontRef>
+            </p:style>
+          </p:cxnSp>
+          <p:cxnSp>
+            <p:nvCxnSpPr>
+              <p:cNvPr id="27" name="Straight Connector 26"/>
+              <p:cNvCxnSpPr>
+                <a:cxnSpLocks noChangeAspect="1"/>
+              </p:cNvCxnSpPr>
+              <p:nvPr/>
+            </p:nvCxnSpPr>
+            <p:spPr>
+              <a:xfrm>
+                <a:off x="6993120" y="1624337"/>
+                <a:ext cx="0" cy="474307"/>
+              </a:xfrm>
+              <a:prstGeom prst="line">
+                <a:avLst/>
+              </a:prstGeom>
+              <a:ln w="44450">
+                <a:solidFill>
+                  <a:schemeClr val="tx1"/>
+                </a:solidFill>
+              </a:ln>
+            </p:spPr>
+            <p:style>
+              <a:lnRef idx="1">
+                <a:schemeClr val="accent1"/>
+              </a:lnRef>
+              <a:fillRef idx="0">
+                <a:schemeClr val="accent1"/>
+              </a:fillRef>
+              <a:effectRef idx="0">
+                <a:schemeClr val="accent1"/>
+              </a:effectRef>
+              <a:fontRef idx="minor">
+                <a:schemeClr val="tx1"/>
+              </a:fontRef>
+            </p:style>
+          </p:cxnSp>
+          <p:cxnSp>
+            <p:nvCxnSpPr>
+              <p:cNvPr id="28" name="Straight Connector 27"/>
+              <p:cNvCxnSpPr>
+                <a:cxnSpLocks noChangeAspect="1"/>
+              </p:cNvCxnSpPr>
+              <p:nvPr/>
+            </p:nvCxnSpPr>
+            <p:spPr>
+              <a:xfrm flipV="1">
+                <a:off x="6994599" y="3594203"/>
+                <a:ext cx="0" cy="115685"/>
+              </a:xfrm>
+              <a:prstGeom prst="line">
+                <a:avLst/>
+              </a:prstGeom>
+              <a:ln w="44450">
+                <a:solidFill>
+                  <a:schemeClr val="tx1"/>
+                </a:solidFill>
+              </a:ln>
+            </p:spPr>
+            <p:style>
+              <a:lnRef idx="1">
+                <a:schemeClr val="accent1"/>
+              </a:lnRef>
+              <a:fillRef idx="0">
+                <a:schemeClr val="accent1"/>
+              </a:fillRef>
+              <a:effectRef idx="0">
+                <a:schemeClr val="accent1"/>
+              </a:effectRef>
+              <a:fontRef idx="minor">
+                <a:schemeClr val="tx1"/>
+              </a:fontRef>
+            </p:style>
+          </p:cxnSp>
+          <p:grpSp>
+            <p:nvGrpSpPr>
+              <p:cNvPr id="29" name="Group 34"/>
+              <p:cNvGrpSpPr>
+                <a:grpSpLocks noChangeAspect="1"/>
+              </p:cNvGrpSpPr>
+              <p:nvPr/>
+            </p:nvGrpSpPr>
+            <p:grpSpPr>
+              <a:xfrm>
+                <a:off x="6823057" y="3706613"/>
+                <a:ext cx="349879" cy="61114"/>
+                <a:chOff x="4724894" y="1611142"/>
+                <a:chExt cx="108879" cy="19018"/>
+              </a:xfrm>
+            </p:grpSpPr>
+            <p:cxnSp>
+              <p:nvCxnSpPr>
+                <p:cNvPr id="36" name="Straight Connector 35"/>
+                <p:cNvCxnSpPr/>
+                <p:nvPr/>
+              </p:nvCxnSpPr>
+              <p:spPr>
+                <a:xfrm>
+                  <a:off x="4725773" y="1612161"/>
+                  <a:ext cx="108000" cy="0"/>
+                </a:xfrm>
+                <a:prstGeom prst="line">
+                  <a:avLst/>
+                </a:prstGeom>
+                <a:ln w="44450"/>
+              </p:spPr>
+              <p:style>
+                <a:lnRef idx="1">
+                  <a:schemeClr val="accent1"/>
+                </a:lnRef>
+                <a:fillRef idx="0">
+                  <a:schemeClr val="accent1"/>
+                </a:fillRef>
+                <a:effectRef idx="0">
+                  <a:schemeClr val="accent1"/>
+                </a:effectRef>
+                <a:fontRef idx="minor">
+                  <a:schemeClr val="tx1"/>
+                </a:fontRef>
+              </p:style>
+            </p:cxnSp>
+            <p:cxnSp>
+              <p:nvCxnSpPr>
+                <p:cNvPr id="37" name="Straight Connector 36"/>
+                <p:cNvCxnSpPr/>
+                <p:nvPr/>
+              </p:nvCxnSpPr>
+              <p:spPr>
+                <a:xfrm>
+                  <a:off x="4724894" y="1612160"/>
+                  <a:ext cx="0" cy="18000"/>
+                </a:xfrm>
+                <a:prstGeom prst="line">
+                  <a:avLst/>
+                </a:prstGeom>
+                <a:ln w="44450"/>
+              </p:spPr>
+              <p:style>
+                <a:lnRef idx="1">
+                  <a:schemeClr val="accent1"/>
+                </a:lnRef>
+                <a:fillRef idx="0">
+                  <a:schemeClr val="accent1"/>
+                </a:fillRef>
+                <a:effectRef idx="0">
+                  <a:schemeClr val="accent1"/>
+                </a:effectRef>
+                <a:fontRef idx="minor">
+                  <a:schemeClr val="tx1"/>
+                </a:fontRef>
+              </p:style>
+            </p:cxnSp>
+            <p:cxnSp>
+              <p:nvCxnSpPr>
+                <p:cNvPr id="38" name="Straight Connector 37"/>
+                <p:cNvCxnSpPr/>
+                <p:nvPr/>
+              </p:nvCxnSpPr>
+              <p:spPr>
+                <a:xfrm>
+                  <a:off x="4832400" y="1611142"/>
+                  <a:ext cx="0" cy="18000"/>
+                </a:xfrm>
+                <a:prstGeom prst="line">
+                  <a:avLst/>
+                </a:prstGeom>
+                <a:ln w="44450"/>
+              </p:spPr>
+              <p:style>
+                <a:lnRef idx="1">
+                  <a:schemeClr val="accent1"/>
+                </a:lnRef>
+                <a:fillRef idx="0">
+                  <a:schemeClr val="accent1"/>
+                </a:fillRef>
+                <a:effectRef idx="0">
+                  <a:schemeClr val="accent1"/>
+                </a:effectRef>
+                <a:fontRef idx="minor">
+                  <a:schemeClr val="tx1"/>
+                </a:fontRef>
+              </p:style>
+            </p:cxnSp>
+          </p:grpSp>
+          <p:sp>
+            <p:nvSpPr>
+              <p:cNvPr id="30" name="Rectangle 9"/>
+              <p:cNvSpPr>
+                <a:spLocks noChangeAspect="1"/>
+              </p:cNvSpPr>
+              <p:nvPr/>
+            </p:nvSpPr>
+            <p:spPr>
+              <a:xfrm>
+                <a:off x="6865446" y="3773514"/>
+                <a:ext cx="277643" cy="277643"/>
+              </a:xfrm>
+              <a:prstGeom prst="rect">
+                <a:avLst/>
+              </a:prstGeom>
+              <a:solidFill>
+                <a:schemeClr val="accent1"/>
+              </a:solidFill>
+              <a:ln w="12700">
+                <a:noFill/>
+              </a:ln>
+            </p:spPr>
+            <p:style>
+              <a:lnRef idx="2">
+                <a:schemeClr val="accent1">
+                  <a:shade val="50000"/>
+                </a:schemeClr>
+              </a:lnRef>
+              <a:fillRef idx="1">
+                <a:schemeClr val="accent1"/>
+              </a:fillRef>
+              <a:effectRef idx="0">
+                <a:schemeClr val="accent1"/>
+              </a:effectRef>
+              <a:fontRef idx="minor">
+                <a:schemeClr val="lt1"/>
+              </a:fontRef>
+            </p:style>
+            <p:txBody>
+              <a:bodyPr rtlCol="0" anchor="ctr"/>
+              <a:lstStyle/>
+              <a:p>
+                <a:pPr algn="ctr"/>
+                <a:endParaRPr lang="en-AU"/>
+              </a:p>
+            </p:txBody>
+          </p:sp>
+          <p:cxnSp>
+            <p:nvCxnSpPr>
+              <p:cNvPr id="31" name="Straight Connector 30"/>
+              <p:cNvCxnSpPr>
+                <a:cxnSpLocks noChangeAspect="1"/>
+              </p:cNvCxnSpPr>
+              <p:nvPr/>
+            </p:nvCxnSpPr>
+            <p:spPr>
+              <a:xfrm flipV="1">
+                <a:off x="6996559" y="4051158"/>
+                <a:ext cx="0" cy="115685"/>
+              </a:xfrm>
+              <a:prstGeom prst="line">
+                <a:avLst/>
+              </a:prstGeom>
+              <a:ln w="44450">
+                <a:solidFill>
+                  <a:schemeClr val="tx1"/>
+                </a:solidFill>
+              </a:ln>
+            </p:spPr>
+            <p:style>
+              <a:lnRef idx="1">
+                <a:schemeClr val="accent1"/>
+              </a:lnRef>
+              <a:fillRef idx="0">
+                <a:schemeClr val="accent1"/>
+              </a:fillRef>
+              <a:effectRef idx="0">
+                <a:schemeClr val="accent1"/>
+              </a:effectRef>
+              <a:fontRef idx="minor">
+                <a:schemeClr val="tx1"/>
+              </a:fontRef>
+            </p:style>
+          </p:cxnSp>
+          <p:cxnSp>
+            <p:nvCxnSpPr>
+              <p:cNvPr id="32" name="Straight Connector 31"/>
+              <p:cNvCxnSpPr>
+                <a:cxnSpLocks noChangeAspect="1"/>
+              </p:cNvCxnSpPr>
+              <p:nvPr/>
+            </p:nvCxnSpPr>
+            <p:spPr>
+              <a:xfrm>
+                <a:off x="6989235" y="2938213"/>
+                <a:ext cx="7767" cy="659403"/>
+              </a:xfrm>
+              <a:prstGeom prst="line">
+                <a:avLst/>
+              </a:prstGeom>
+              <a:ln w="44450">
+                <a:solidFill>
+                  <a:schemeClr val="tx1"/>
+                </a:solidFill>
+              </a:ln>
+            </p:spPr>
+            <p:style>
+              <a:lnRef idx="1">
+                <a:schemeClr val="accent1"/>
+              </a:lnRef>
+              <a:fillRef idx="0">
+                <a:schemeClr val="accent1"/>
+              </a:fillRef>
+              <a:effectRef idx="0">
+                <a:schemeClr val="accent1"/>
+              </a:effectRef>
+              <a:fontRef idx="minor">
+                <a:schemeClr val="tx1"/>
+              </a:fontRef>
+            </p:style>
+          </p:cxnSp>
+          <p:cxnSp>
+            <p:nvCxnSpPr>
+              <p:cNvPr id="33" name="Straight Connector 32"/>
+              <p:cNvCxnSpPr>
+                <a:cxnSpLocks noChangeAspect="1"/>
+              </p:cNvCxnSpPr>
+              <p:nvPr/>
+            </p:nvCxnSpPr>
+            <p:spPr>
+              <a:xfrm>
+                <a:off x="6993831" y="4157295"/>
+                <a:ext cx="0" cy="636266"/>
+              </a:xfrm>
+              <a:prstGeom prst="line">
+                <a:avLst/>
+              </a:prstGeom>
+              <a:ln w="44450">
+                <a:solidFill>
+                  <a:schemeClr val="tx1"/>
+                </a:solidFill>
+              </a:ln>
+            </p:spPr>
+            <p:style>
+              <a:lnRef idx="1">
+                <a:schemeClr val="accent1"/>
+              </a:lnRef>
+              <a:fillRef idx="0">
+                <a:schemeClr val="accent1"/>
+              </a:fillRef>
+              <a:effectRef idx="0">
+                <a:schemeClr val="accent1"/>
+              </a:effectRef>
+              <a:fontRef idx="minor">
+                <a:schemeClr val="tx1"/>
+              </a:fontRef>
+            </p:style>
+          </p:cxnSp>
+          <p:cxnSp>
+            <p:nvCxnSpPr>
+              <p:cNvPr id="34" name="Straight Arrow Connector 33"/>
+              <p:cNvCxnSpPr>
+                <a:cxnSpLocks noChangeAspect="1"/>
+              </p:cNvCxnSpPr>
+              <p:nvPr/>
+            </p:nvCxnSpPr>
+            <p:spPr>
+              <a:xfrm>
+                <a:off x="7246277" y="2457822"/>
+                <a:ext cx="486351" cy="0"/>
+              </a:xfrm>
+              <a:prstGeom prst="straightConnector1">
+                <a:avLst/>
+              </a:prstGeom>
+              <a:ln w="44450">
+                <a:tailEnd type="arrow"/>
+              </a:ln>
+            </p:spPr>
+            <p:style>
+              <a:lnRef idx="1">
+                <a:schemeClr val="accent1"/>
+              </a:lnRef>
+              <a:fillRef idx="0">
+                <a:schemeClr val="accent1"/>
+              </a:fillRef>
+              <a:effectRef idx="0">
+                <a:schemeClr val="accent1"/>
+              </a:effectRef>
+              <a:fontRef idx="minor">
+                <a:schemeClr val="tx1"/>
+              </a:fontRef>
+            </p:style>
+          </p:cxnSp>
+          <p:cxnSp>
+            <p:nvCxnSpPr>
+              <p:cNvPr id="35" name="Straight Arrow Connector 34"/>
+              <p:cNvCxnSpPr>
+                <a:cxnSpLocks noChangeAspect="1"/>
+              </p:cNvCxnSpPr>
+              <p:nvPr/>
+            </p:nvCxnSpPr>
+            <p:spPr>
+              <a:xfrm>
+                <a:off x="7191439" y="3925705"/>
+                <a:ext cx="522485" cy="0"/>
+              </a:xfrm>
+              <a:prstGeom prst="straightConnector1">
+                <a:avLst/>
+              </a:prstGeom>
+              <a:ln w="44450">
+                <a:tailEnd type="arrow"/>
+              </a:ln>
+            </p:spPr>
+            <p:style>
+              <a:lnRef idx="1">
+                <a:schemeClr val="accent1"/>
+              </a:lnRef>
+              <a:fillRef idx="0">
+                <a:schemeClr val="accent1"/>
+              </a:fillRef>
+              <a:effectRef idx="0">
+                <a:schemeClr val="accent1"/>
+              </a:effectRef>
+              <a:fontRef idx="minor">
+                <a:schemeClr val="tx1"/>
+              </a:fontRef>
+            </p:style>
+          </p:cxnSp>
+        </p:grpSp>
+      </p:grpSp>
+    </p:spTree>
   </p:cSld>
   <p:clrMapOvr>
     <a:masterClrMapping/>

</xml_diff>

<commit_message>
Simplified Bioliogical model added, figures imported from matlab to powerpoint need work
</commit_message>
<xml_diff>
--- a/fig/Biological_Response.pptx
+++ b/fig/Biological_Response.pptx
@@ -291,7 +291,7 @@
             <a:fld id="{51B8AED7-6190-4D28-B91A-55C6DFF6AA70}" type="datetimeFigureOut">
               <a:rPr lang="en-AU" smtClean="0"/>
               <a:pPr/>
-              <a:t>17/09/2013</a:t>
+              <a:t>18/09/2013</a:t>
             </a:fld>
             <a:endParaRPr lang="en-AU"/>
           </a:p>
@@ -343,7 +343,7 @@
     </p:spTree>
     <p:extLst>
       <p:ext uri="{BB962C8B-B14F-4D97-AF65-F5344CB8AC3E}">
-        <p14:creationId xmlns="" xmlns:p14="http://schemas.microsoft.com/office/powerpoint/2010/main" val="2894942220"/>
+        <p14:creationId xmlns:p14="http://schemas.microsoft.com/office/powerpoint/2010/main" val="2894942220"/>
       </p:ext>
     </p:extLst>
   </p:cSld>
@@ -463,7 +463,7 @@
             <a:fld id="{51B8AED7-6190-4D28-B91A-55C6DFF6AA70}" type="datetimeFigureOut">
               <a:rPr lang="en-AU" smtClean="0"/>
               <a:pPr/>
-              <a:t>17/09/2013</a:t>
+              <a:t>18/09/2013</a:t>
             </a:fld>
             <a:endParaRPr lang="en-AU"/>
           </a:p>
@@ -515,7 +515,7 @@
     </p:spTree>
     <p:extLst>
       <p:ext uri="{BB962C8B-B14F-4D97-AF65-F5344CB8AC3E}">
-        <p14:creationId xmlns="" xmlns:p14="http://schemas.microsoft.com/office/powerpoint/2010/main" val="1892426091"/>
+        <p14:creationId xmlns:p14="http://schemas.microsoft.com/office/powerpoint/2010/main" val="1892426091"/>
       </p:ext>
     </p:extLst>
   </p:cSld>
@@ -645,7 +645,7 @@
             <a:fld id="{51B8AED7-6190-4D28-B91A-55C6DFF6AA70}" type="datetimeFigureOut">
               <a:rPr lang="en-AU" smtClean="0"/>
               <a:pPr/>
-              <a:t>17/09/2013</a:t>
+              <a:t>18/09/2013</a:t>
             </a:fld>
             <a:endParaRPr lang="en-AU"/>
           </a:p>
@@ -697,7 +697,7 @@
     </p:spTree>
     <p:extLst>
       <p:ext uri="{BB962C8B-B14F-4D97-AF65-F5344CB8AC3E}">
-        <p14:creationId xmlns="" xmlns:p14="http://schemas.microsoft.com/office/powerpoint/2010/main" val="2673325322"/>
+        <p14:creationId xmlns:p14="http://schemas.microsoft.com/office/powerpoint/2010/main" val="2673325322"/>
       </p:ext>
     </p:extLst>
   </p:cSld>
@@ -817,7 +817,7 @@
             <a:fld id="{51B8AED7-6190-4D28-B91A-55C6DFF6AA70}" type="datetimeFigureOut">
               <a:rPr lang="en-AU" smtClean="0"/>
               <a:pPr/>
-              <a:t>17/09/2013</a:t>
+              <a:t>18/09/2013</a:t>
             </a:fld>
             <a:endParaRPr lang="en-AU"/>
           </a:p>
@@ -869,7 +869,7 @@
     </p:spTree>
     <p:extLst>
       <p:ext uri="{BB962C8B-B14F-4D97-AF65-F5344CB8AC3E}">
-        <p14:creationId xmlns="" xmlns:p14="http://schemas.microsoft.com/office/powerpoint/2010/main" val="2899241216"/>
+        <p14:creationId xmlns:p14="http://schemas.microsoft.com/office/powerpoint/2010/main" val="2899241216"/>
       </p:ext>
     </p:extLst>
   </p:cSld>
@@ -1065,7 +1065,7 @@
             <a:fld id="{51B8AED7-6190-4D28-B91A-55C6DFF6AA70}" type="datetimeFigureOut">
               <a:rPr lang="en-AU" smtClean="0"/>
               <a:pPr/>
-              <a:t>17/09/2013</a:t>
+              <a:t>18/09/2013</a:t>
             </a:fld>
             <a:endParaRPr lang="en-AU"/>
           </a:p>
@@ -1117,7 +1117,7 @@
     </p:spTree>
     <p:extLst>
       <p:ext uri="{BB962C8B-B14F-4D97-AF65-F5344CB8AC3E}">
-        <p14:creationId xmlns="" xmlns:p14="http://schemas.microsoft.com/office/powerpoint/2010/main" val="788024222"/>
+        <p14:creationId xmlns:p14="http://schemas.microsoft.com/office/powerpoint/2010/main" val="788024222"/>
       </p:ext>
     </p:extLst>
   </p:cSld>
@@ -1355,7 +1355,7 @@
             <a:fld id="{51B8AED7-6190-4D28-B91A-55C6DFF6AA70}" type="datetimeFigureOut">
               <a:rPr lang="en-AU" smtClean="0"/>
               <a:pPr/>
-              <a:t>17/09/2013</a:t>
+              <a:t>18/09/2013</a:t>
             </a:fld>
             <a:endParaRPr lang="en-AU"/>
           </a:p>
@@ -1407,7 +1407,7 @@
     </p:spTree>
     <p:extLst>
       <p:ext uri="{BB962C8B-B14F-4D97-AF65-F5344CB8AC3E}">
-        <p14:creationId xmlns="" xmlns:p14="http://schemas.microsoft.com/office/powerpoint/2010/main" val="2257451198"/>
+        <p14:creationId xmlns:p14="http://schemas.microsoft.com/office/powerpoint/2010/main" val="2257451198"/>
       </p:ext>
     </p:extLst>
   </p:cSld>
@@ -1779,7 +1779,7 @@
             <a:fld id="{51B8AED7-6190-4D28-B91A-55C6DFF6AA70}" type="datetimeFigureOut">
               <a:rPr lang="en-AU" smtClean="0"/>
               <a:pPr/>
-              <a:t>17/09/2013</a:t>
+              <a:t>18/09/2013</a:t>
             </a:fld>
             <a:endParaRPr lang="en-AU"/>
           </a:p>
@@ -1831,7 +1831,7 @@
     </p:spTree>
     <p:extLst>
       <p:ext uri="{BB962C8B-B14F-4D97-AF65-F5344CB8AC3E}">
-        <p14:creationId xmlns="" xmlns:p14="http://schemas.microsoft.com/office/powerpoint/2010/main" val="3452154003"/>
+        <p14:creationId xmlns:p14="http://schemas.microsoft.com/office/powerpoint/2010/main" val="3452154003"/>
       </p:ext>
     </p:extLst>
   </p:cSld>
@@ -1899,7 +1899,7 @@
             <a:fld id="{51B8AED7-6190-4D28-B91A-55C6DFF6AA70}" type="datetimeFigureOut">
               <a:rPr lang="en-AU" smtClean="0"/>
               <a:pPr/>
-              <a:t>17/09/2013</a:t>
+              <a:t>18/09/2013</a:t>
             </a:fld>
             <a:endParaRPr lang="en-AU"/>
           </a:p>
@@ -1951,7 +1951,7 @@
     </p:spTree>
     <p:extLst>
       <p:ext uri="{BB962C8B-B14F-4D97-AF65-F5344CB8AC3E}">
-        <p14:creationId xmlns="" xmlns:p14="http://schemas.microsoft.com/office/powerpoint/2010/main" val="2646042487"/>
+        <p14:creationId xmlns:p14="http://schemas.microsoft.com/office/powerpoint/2010/main" val="2646042487"/>
       </p:ext>
     </p:extLst>
   </p:cSld>
@@ -1996,7 +1996,7 @@
             <a:fld id="{51B8AED7-6190-4D28-B91A-55C6DFF6AA70}" type="datetimeFigureOut">
               <a:rPr lang="en-AU" smtClean="0"/>
               <a:pPr/>
-              <a:t>17/09/2013</a:t>
+              <a:t>18/09/2013</a:t>
             </a:fld>
             <a:endParaRPr lang="en-AU"/>
           </a:p>
@@ -2048,7 +2048,7 @@
     </p:spTree>
     <p:extLst>
       <p:ext uri="{BB962C8B-B14F-4D97-AF65-F5344CB8AC3E}">
-        <p14:creationId xmlns="" xmlns:p14="http://schemas.microsoft.com/office/powerpoint/2010/main" val="2031956758"/>
+        <p14:creationId xmlns:p14="http://schemas.microsoft.com/office/powerpoint/2010/main" val="2031956758"/>
       </p:ext>
     </p:extLst>
   </p:cSld>
@@ -2275,7 +2275,7 @@
             <a:fld id="{51B8AED7-6190-4D28-B91A-55C6DFF6AA70}" type="datetimeFigureOut">
               <a:rPr lang="en-AU" smtClean="0"/>
               <a:pPr/>
-              <a:t>17/09/2013</a:t>
+              <a:t>18/09/2013</a:t>
             </a:fld>
             <a:endParaRPr lang="en-AU"/>
           </a:p>
@@ -2327,7 +2327,7 @@
     </p:spTree>
     <p:extLst>
       <p:ext uri="{BB962C8B-B14F-4D97-AF65-F5344CB8AC3E}">
-        <p14:creationId xmlns="" xmlns:p14="http://schemas.microsoft.com/office/powerpoint/2010/main" val="2593434998"/>
+        <p14:creationId xmlns:p14="http://schemas.microsoft.com/office/powerpoint/2010/main" val="2593434998"/>
       </p:ext>
     </p:extLst>
   </p:cSld>
@@ -2530,7 +2530,7 @@
             <a:fld id="{51B8AED7-6190-4D28-B91A-55C6DFF6AA70}" type="datetimeFigureOut">
               <a:rPr lang="en-AU" smtClean="0"/>
               <a:pPr/>
-              <a:t>17/09/2013</a:t>
+              <a:t>18/09/2013</a:t>
             </a:fld>
             <a:endParaRPr lang="en-AU"/>
           </a:p>
@@ -2582,7 +2582,7 @@
     </p:spTree>
     <p:extLst>
       <p:ext uri="{BB962C8B-B14F-4D97-AF65-F5344CB8AC3E}">
-        <p14:creationId xmlns="" xmlns:p14="http://schemas.microsoft.com/office/powerpoint/2010/main" val="2228732091"/>
+        <p14:creationId xmlns:p14="http://schemas.microsoft.com/office/powerpoint/2010/main" val="2228732091"/>
       </p:ext>
     </p:extLst>
   </p:cSld>
@@ -2745,7 +2745,7 @@
             <a:fld id="{51B8AED7-6190-4D28-B91A-55C6DFF6AA70}" type="datetimeFigureOut">
               <a:rPr lang="en-AU" smtClean="0"/>
               <a:pPr/>
-              <a:t>17/09/2013</a:t>
+              <a:t>18/09/2013</a:t>
             </a:fld>
             <a:endParaRPr lang="en-AU"/>
           </a:p>
@@ -2833,7 +2833,7 @@
     </p:spTree>
     <p:extLst>
       <p:ext uri="{BB962C8B-B14F-4D97-AF65-F5344CB8AC3E}">
-        <p14:creationId xmlns="" xmlns:p14="http://schemas.microsoft.com/office/powerpoint/2010/main" val="1923439959"/>
+        <p14:creationId xmlns:p14="http://schemas.microsoft.com/office/powerpoint/2010/main" val="1923439959"/>
       </p:ext>
     </p:extLst>
   </p:cSld>
@@ -3121,9 +3121,64 @@
           <a:chExt cx="0" cy="0"/>
         </a:xfrm>
       </p:grpSpPr>
+    </p:spTree>
+    <p:extLst>
+      <p:ext uri="{BB962C8B-B14F-4D97-AF65-F5344CB8AC3E}">
+        <p14:creationId xmlns:p14="http://schemas.microsoft.com/office/powerpoint/2010/main" val="2119511818"/>
+      </p:ext>
+    </p:extLst>
+  </p:cSld>
+  <p:clrMapOvr>
+    <a:masterClrMapping/>
+  </p:clrMapOvr>
+</p:sld>
+</file>
+
+<file path=ppt/slides/slide2.xml><?xml version="1.0" encoding="utf-8"?>
+<p:sld xmlns:a="http://schemas.openxmlformats.org/drawingml/2006/main" xmlns:r="http://schemas.openxmlformats.org/officeDocument/2006/relationships" xmlns:p="http://schemas.openxmlformats.org/presentationml/2006/main">
+  <p:cSld>
+    <p:spTree>
+      <p:nvGrpSpPr>
+        <p:cNvPr id="1" name=""/>
+        <p:cNvGrpSpPr/>
+        <p:nvPr/>
+      </p:nvGrpSpPr>
+      <p:grpSpPr>
+        <a:xfrm>
+          <a:off x="0" y="0"/>
+          <a:ext cx="0" cy="0"/>
+          <a:chOff x="0" y="0"/>
+          <a:chExt cx="0" cy="0"/>
+        </a:xfrm>
+      </p:grpSpPr>
+    </p:spTree>
+  </p:cSld>
+  <p:clrMapOvr>
+    <a:masterClrMapping/>
+  </p:clrMapOvr>
+</p:sld>
+</file>
+
+<file path=ppt/slides/slide3.xml><?xml version="1.0" encoding="utf-8"?>
+<p:sld xmlns:a="http://schemas.openxmlformats.org/drawingml/2006/main" xmlns:r="http://schemas.openxmlformats.org/officeDocument/2006/relationships" xmlns:p="http://schemas.openxmlformats.org/presentationml/2006/main">
+  <p:cSld>
+    <p:spTree>
+      <p:nvGrpSpPr>
+        <p:cNvPr id="1" name=""/>
+        <p:cNvGrpSpPr/>
+        <p:nvPr/>
+      </p:nvGrpSpPr>
+      <p:grpSpPr>
+        <a:xfrm>
+          <a:off x="0" y="0"/>
+          <a:ext cx="0" cy="0"/>
+          <a:chOff x="0" y="0"/>
+          <a:chExt cx="0" cy="0"/>
+        </a:xfrm>
+      </p:grpSpPr>
       <p:grpSp>
         <p:nvGrpSpPr>
-          <p:cNvPr id="26" name="Group 25"/>
+          <p:cNvPr id="22" name="Group 3"/>
           <p:cNvGrpSpPr>
             <a:grpSpLocks noChangeAspect="1"/>
           </p:cNvGrpSpPr>
@@ -3131,15 +3186,15 @@
         </p:nvGrpSpPr>
         <p:grpSpPr>
           <a:xfrm>
-            <a:off x="1007772" y="176699"/>
-            <a:ext cx="327517" cy="1209333"/>
-            <a:chOff x="6588224" y="1624337"/>
-            <a:chExt cx="1144404" cy="3169224"/>
+            <a:off x="21115" y="-274"/>
+            <a:ext cx="735893" cy="2879999"/>
+            <a:chOff x="6584247" y="1624337"/>
+            <a:chExt cx="809793" cy="3169224"/>
           </a:xfrm>
         </p:grpSpPr>
         <p:sp>
           <p:nvSpPr>
-            <p:cNvPr id="27" name="Isosceles Triangle 26"/>
+            <p:cNvPr id="25" name="Isosceles Triangle 24"/>
             <p:cNvSpPr>
               <a:spLocks noChangeAspect="1"/>
             </p:cNvSpPr>
@@ -3147,7 +3202,7 @@
           </p:nvSpPr>
           <p:spPr>
             <a:xfrm flipV="1">
-              <a:off x="6588224" y="2121765"/>
+              <a:off x="6584247" y="2121764"/>
               <a:ext cx="809793" cy="809793"/>
             </a:xfrm>
             <a:prstGeom prst="triangle">
@@ -3187,7 +3242,7 @@
         </p:sp>
         <p:cxnSp>
           <p:nvCxnSpPr>
-            <p:cNvPr id="30" name="Curved Connector 29"/>
+            <p:cNvPr id="26" name="Curved Connector 25"/>
             <p:cNvCxnSpPr>
               <a:cxnSpLocks noChangeAspect="1"/>
             </p:cNvCxnSpPr>
@@ -3220,7 +3275,7 @@
         </p:cxnSp>
         <p:cxnSp>
           <p:nvCxnSpPr>
-            <p:cNvPr id="32" name="Straight Connector 31"/>
+            <p:cNvPr id="27" name="Straight Connector 26"/>
             <p:cNvCxnSpPr>
               <a:cxnSpLocks noChangeAspect="1"/>
             </p:cNvCxnSpPr>
@@ -3228,8 +3283,8 @@
           </p:nvCxnSpPr>
           <p:spPr>
             <a:xfrm>
-              <a:off x="6993120" y="1624337"/>
-              <a:ext cx="0" cy="474307"/>
+              <a:off x="6985166" y="1624337"/>
+              <a:ext cx="0" cy="474308"/>
             </a:xfrm>
             <a:prstGeom prst="line">
               <a:avLst/>
@@ -3257,7 +3312,7 @@
         </p:cxnSp>
         <p:cxnSp>
           <p:nvCxnSpPr>
-            <p:cNvPr id="34" name="Straight Connector 33"/>
+            <p:cNvPr id="28" name="Straight Connector 27"/>
             <p:cNvCxnSpPr>
               <a:cxnSpLocks noChangeAspect="1"/>
             </p:cNvCxnSpPr>
@@ -3294,7 +3349,7 @@
         </p:cxnSp>
         <p:grpSp>
           <p:nvGrpSpPr>
-            <p:cNvPr id="35" name="Group 34"/>
+            <p:cNvPr id="29" name="Group 34"/>
             <p:cNvGrpSpPr>
               <a:grpSpLocks noChangeAspect="1"/>
             </p:cNvGrpSpPr>
@@ -3310,7 +3365,7 @@
           </p:grpSpPr>
           <p:cxnSp>
             <p:nvCxnSpPr>
-              <p:cNvPr id="45" name="Straight Connector 44"/>
+              <p:cNvPr id="36" name="Straight Connector 35"/>
               <p:cNvCxnSpPr/>
               <p:nvPr/>
             </p:nvCxnSpPr>
@@ -3341,7 +3396,7 @@
           </p:cxnSp>
           <p:cxnSp>
             <p:nvCxnSpPr>
-              <p:cNvPr id="46" name="Straight Connector 45"/>
+              <p:cNvPr id="37" name="Straight Connector 36"/>
               <p:cNvCxnSpPr/>
               <p:nvPr/>
             </p:nvCxnSpPr>
@@ -3372,7 +3427,7 @@
           </p:cxnSp>
           <p:cxnSp>
             <p:nvCxnSpPr>
-              <p:cNvPr id="47" name="Straight Connector 46"/>
+              <p:cNvPr id="38" name="Straight Connector 37"/>
               <p:cNvCxnSpPr/>
               <p:nvPr/>
             </p:nvCxnSpPr>
@@ -3404,7 +3459,7 @@
         </p:grpSp>
         <p:sp>
           <p:nvSpPr>
-            <p:cNvPr id="37" name="Rectangle 36"/>
+            <p:cNvPr id="30" name="Rectangle 9"/>
             <p:cNvSpPr>
               <a:spLocks noChangeAspect="1"/>
             </p:cNvSpPr>
@@ -3452,7 +3507,7 @@
         </p:sp>
         <p:cxnSp>
           <p:nvCxnSpPr>
-            <p:cNvPr id="39" name="Straight Connector 38"/>
+            <p:cNvPr id="31" name="Straight Connector 30"/>
             <p:cNvCxnSpPr>
               <a:cxnSpLocks noChangeAspect="1"/>
             </p:cNvCxnSpPr>
@@ -3489,7 +3544,7 @@
         </p:cxnSp>
         <p:cxnSp>
           <p:nvCxnSpPr>
-            <p:cNvPr id="40" name="Straight Connector 39"/>
+            <p:cNvPr id="32" name="Straight Connector 31"/>
             <p:cNvCxnSpPr>
               <a:cxnSpLocks noChangeAspect="1"/>
             </p:cNvCxnSpPr>
@@ -3497,79 +3552,8 @@
           </p:nvCxnSpPr>
           <p:spPr>
             <a:xfrm>
-              <a:off x="6989235" y="2938213"/>
-              <a:ext cx="7767" cy="659403"/>
-            </a:xfrm>
-            <a:prstGeom prst="line">
-              <a:avLst/>
-            </a:prstGeom>
-            <a:ln w="44450">
-              <a:solidFill>
-                <a:schemeClr val="tx1"/>
-              </a:solidFill>
-            </a:ln>
-          </p:spPr>
-          <p:style>
-            <a:lnRef idx="1">
-              <a:schemeClr val="accent1"/>
-            </a:lnRef>
-            <a:fillRef idx="0">
-              <a:schemeClr val="accent1"/>
-            </a:fillRef>
-            <a:effectRef idx="0">
-              <a:schemeClr val="accent1"/>
-            </a:effectRef>
-            <a:fontRef idx="minor">
-              <a:schemeClr val="tx1"/>
-            </a:fontRef>
-          </p:style>
-        </p:cxnSp>
-        <p:pic>
-          <p:nvPicPr>
-            <p:cNvPr id="41" name="Picture 40"/>
-            <p:cNvPicPr>
-              <a:picLocks noChangeAspect="1"/>
-            </p:cNvPicPr>
-            <p:nvPr>
-              <p:custDataLst>
-                <p:tags r:id="rId1"/>
-              </p:custDataLst>
-            </p:nvPr>
-          </p:nvPicPr>
-          <p:blipFill>
-            <a:blip r:embed="rId3" cstate="print">
-              <a:extLst>
-                <a:ext uri="{28A0092B-C50C-407E-A947-70E740481C1C}">
-                  <a14:useLocalDpi xmlns="" xmlns:a14="http://schemas.microsoft.com/office/drawing/2010/main" val="0"/>
-                </a:ext>
-              </a:extLst>
-            </a:blip>
-            <a:stretch>
-              <a:fillRect/>
-            </a:stretch>
-          </p:blipFill>
-          <p:spPr>
-            <a:xfrm>
-              <a:off x="7024699" y="1816293"/>
-              <a:ext cx="265176" cy="224028"/>
-            </a:xfrm>
-            <a:prstGeom prst="rect">
-              <a:avLst/>
-            </a:prstGeom>
-          </p:spPr>
-        </p:pic>
-        <p:cxnSp>
-          <p:nvCxnSpPr>
-            <p:cNvPr id="42" name="Straight Connector 41"/>
-            <p:cNvCxnSpPr>
-              <a:cxnSpLocks noChangeAspect="1"/>
-            </p:cNvCxnSpPr>
-            <p:nvPr/>
-          </p:nvCxnSpPr>
-          <p:spPr>
-            <a:xfrm>
-              <a:off x="6993831" y="4157295"/>
-              <a:ext cx="0" cy="636266"/>
+              <a:off x="6985259" y="2938213"/>
+              <a:ext cx="7767" cy="659404"/>
             </a:xfrm>
             <a:prstGeom prst="line">
               <a:avLst/>
@@ -3597,7 +3581,7 @@
         </p:cxnSp>
         <p:cxnSp>
           <p:nvCxnSpPr>
-            <p:cNvPr id="43" name="Straight Arrow Connector 42"/>
+            <p:cNvPr id="33" name="Straight Connector 32"/>
             <p:cNvCxnSpPr>
               <a:cxnSpLocks noChangeAspect="1"/>
             </p:cNvCxnSpPr>
@@ -3605,49 +3589,16 @@
           </p:nvCxnSpPr>
           <p:spPr>
             <a:xfrm>
-              <a:off x="7246277" y="2457822"/>
-              <a:ext cx="486351" cy="0"/>
+              <a:off x="7000327" y="4157295"/>
+              <a:ext cx="0" cy="636266"/>
             </a:xfrm>
-            <a:prstGeom prst="straightConnector1">
+            <a:prstGeom prst="line">
               <a:avLst/>
             </a:prstGeom>
             <a:ln w="44450">
-              <a:tailEnd type="arrow"/>
-            </a:ln>
-          </p:spPr>
-          <p:style>
-            <a:lnRef idx="1">
-              <a:schemeClr val="accent1"/>
-            </a:lnRef>
-            <a:fillRef idx="0">
-              <a:schemeClr val="accent1"/>
-            </a:fillRef>
-            <a:effectRef idx="0">
-              <a:schemeClr val="accent1"/>
-            </a:effectRef>
-            <a:fontRef idx="minor">
-              <a:schemeClr val="tx1"/>
-            </a:fontRef>
-          </p:style>
-        </p:cxnSp>
-        <p:cxnSp>
-          <p:nvCxnSpPr>
-            <p:cNvPr id="44" name="Straight Arrow Connector 43"/>
-            <p:cNvCxnSpPr>
-              <a:cxnSpLocks noChangeAspect="1"/>
-            </p:cNvCxnSpPr>
-            <p:nvPr/>
-          </p:nvCxnSpPr>
-          <p:spPr>
-            <a:xfrm>
-              <a:off x="7191439" y="3925705"/>
-              <a:ext cx="522485" cy="0"/>
-            </a:xfrm>
-            <a:prstGeom prst="straightConnector1">
-              <a:avLst/>
-            </a:prstGeom>
-            <a:ln w="44450">
-              <a:tailEnd type="arrow"/>
+              <a:solidFill>
+                <a:schemeClr val="tx1"/>
+              </a:solidFill>
             </a:ln>
           </p:spPr>
           <p:style>
@@ -3666,1371 +3617,224 @@
           </p:style>
         </p:cxnSp>
       </p:grpSp>
-      <p:sp>
-        <p:nvSpPr>
-          <p:cNvPr id="3" name="Rectangle 2"/>
-          <p:cNvSpPr/>
+      <p:pic>
+        <p:nvPicPr>
+          <p:cNvPr id="1028" name="Picture 4"/>
+          <p:cNvPicPr>
+            <a:picLocks noChangeAspect="1" noChangeArrowheads="1"/>
+          </p:cNvPicPr>
+          <p:nvPr/>
+        </p:nvPicPr>
+        <p:blipFill rotWithShape="1">
+          <a:blip r:embed="rId2">
+            <a:extLst>
+              <a:ext uri="{28A0092B-C50C-407E-A947-70E740481C1C}">
+                <a14:useLocalDpi xmlns:a14="http://schemas.microsoft.com/office/drawing/2010/main" val="0"/>
+              </a:ext>
+            </a:extLst>
+          </a:blip>
+          <a:srcRect t="2654" r="3894" b="3"/>
+          <a:stretch/>
+        </p:blipFill>
+        <p:spPr bwMode="auto">
+          <a:xfrm>
+            <a:off x="921046" y="7046"/>
+            <a:ext cx="1958976" cy="1288800"/>
+          </a:xfrm>
+          <a:prstGeom prst="rect">
+            <a:avLst/>
+          </a:prstGeom>
+          <a:noFill/>
+          <a:ln>
+            <a:noFill/>
+          </a:ln>
+          <a:extLst>
+            <a:ext uri="{909E8E84-426E-40DD-AFC4-6F175D3DCCD1}">
+              <a14:hiddenFill xmlns:a14="http://schemas.microsoft.com/office/drawing/2010/main">
+                <a:solidFill>
+                  <a:schemeClr val="accent1"/>
+                </a:solidFill>
+              </a14:hiddenFill>
+            </a:ext>
+            <a:ext uri="{91240B29-F687-4F45-9708-019B960494DF}">
+              <a14:hiddenLine xmlns:a14="http://schemas.microsoft.com/office/drawing/2010/main" w="9525">
+                <a:solidFill>
+                  <a:schemeClr val="tx1"/>
+                </a:solidFill>
+                <a:miter lim="800000"/>
+                <a:headEnd/>
+                <a:tailEnd/>
+              </a14:hiddenLine>
+            </a:ext>
+          </a:extLst>
+        </p:spPr>
+      </p:pic>
+      <p:pic>
+        <p:nvPicPr>
+          <p:cNvPr id="1029" name="Picture 5"/>
+          <p:cNvPicPr>
+            <a:picLocks noChangeAspect="1" noChangeArrowheads="1"/>
+          </p:cNvPicPr>
+          <p:nvPr/>
+        </p:nvPicPr>
+        <p:blipFill rotWithShape="1">
+          <a:blip r:embed="rId3">
+            <a:extLst>
+              <a:ext uri="{28A0092B-C50C-407E-A947-70E740481C1C}">
+                <a14:useLocalDpi xmlns:a14="http://schemas.microsoft.com/office/drawing/2010/main" val="0"/>
+              </a:ext>
+            </a:extLst>
+          </a:blip>
+          <a:srcRect l="708" t="5897" r="3052" b="285"/>
+          <a:stretch/>
+        </p:blipFill>
+        <p:spPr bwMode="auto">
+          <a:xfrm>
+            <a:off x="899725" y="1620022"/>
+            <a:ext cx="1980000" cy="1260000"/>
+          </a:xfrm>
+          <a:prstGeom prst="rect">
+            <a:avLst/>
+          </a:prstGeom>
+          <a:noFill/>
+          <a:ln>
+            <a:noFill/>
+          </a:ln>
+          <a:extLst>
+            <a:ext uri="{909E8E84-426E-40DD-AFC4-6F175D3DCCD1}">
+              <a14:hiddenFill xmlns:a14="http://schemas.microsoft.com/office/drawing/2010/main">
+                <a:solidFill>
+                  <a:schemeClr val="accent1"/>
+                </a:solidFill>
+              </a14:hiddenFill>
+            </a:ext>
+            <a:ext uri="{91240B29-F687-4F45-9708-019B960494DF}">
+              <a14:hiddenLine xmlns:a14="http://schemas.microsoft.com/office/drawing/2010/main" w="9525">
+                <a:solidFill>
+                  <a:schemeClr val="tx1"/>
+                </a:solidFill>
+                <a:miter lim="800000"/>
+                <a:headEnd/>
+                <a:tailEnd/>
+              </a14:hiddenLine>
+            </a:ext>
+          </a:extLst>
+        </p:spPr>
+      </p:pic>
+      <p:sp>
+        <p:nvSpPr>
+          <p:cNvPr id="3" name="TextBox 2"/>
+          <p:cNvSpPr txBox="1"/>
           <p:nvPr/>
         </p:nvSpPr>
         <p:spPr>
           <a:xfrm>
-            <a:off x="963735" y="169923"/>
-            <a:ext cx="907000" cy="1209333"/>
+            <a:off x="-298" y="35846"/>
+            <a:ext cx="295274" cy="276999"/>
           </a:xfrm>
           <a:prstGeom prst="rect">
             <a:avLst/>
           </a:prstGeom>
           <a:noFill/>
         </p:spPr>
-        <p:style>
-          <a:lnRef idx="2">
-            <a:schemeClr val="accent1">
-              <a:shade val="50000"/>
-            </a:schemeClr>
-          </a:lnRef>
-          <a:fillRef idx="1">
-            <a:schemeClr val="accent1"/>
-          </a:fillRef>
-          <a:effectRef idx="0">
-            <a:schemeClr val="accent1"/>
-          </a:effectRef>
-          <a:fontRef idx="minor">
-            <a:schemeClr val="lt1"/>
-          </a:fontRef>
-        </p:style>
-        <p:txBody>
-          <a:bodyPr lIns="32902" tIns="16451" rIns="32902" bIns="16451" rtlCol="0" anchor="ctr"/>
-          <a:lstStyle/>
-          <a:p>
-            <a:pPr algn="ctr"/>
-            <a:endParaRPr lang="en-AU"/>
-          </a:p>
-        </p:txBody>
-      </p:sp>
-      <p:sp>
-        <p:nvSpPr>
-          <p:cNvPr id="6" name="Rectangle 5"/>
-          <p:cNvSpPr/>
+        <p:txBody>
+          <a:bodyPr wrap="none" rtlCol="0">
+            <a:spAutoFit/>
+          </a:bodyPr>
+          <a:lstStyle/>
+          <a:p>
+            <a:r>
+              <a:rPr lang="en-AU" sz="1200" b="1" dirty="0" smtClean="0">
+                <a:latin typeface="Arial" panose="020B0604020202020204" pitchFamily="34" charset="0"/>
+                <a:cs typeface="Arial" panose="020B0604020202020204" pitchFamily="34" charset="0"/>
+              </a:rPr>
+              <a:t>A</a:t>
+            </a:r>
+            <a:endParaRPr lang="en-AU" sz="1200" b="1" dirty="0">
+              <a:latin typeface="Arial" panose="020B0604020202020204" pitchFamily="34" charset="0"/>
+              <a:cs typeface="Arial" panose="020B0604020202020204" pitchFamily="34" charset="0"/>
+            </a:endParaRPr>
+          </a:p>
+        </p:txBody>
+      </p:sp>
+      <p:sp>
+        <p:nvSpPr>
+          <p:cNvPr id="40" name="TextBox 39"/>
+          <p:cNvSpPr txBox="1"/>
           <p:nvPr/>
         </p:nvSpPr>
         <p:spPr>
           <a:xfrm>
-            <a:off x="1329936" y="292689"/>
-            <a:ext cx="521525" cy="423267"/>
+            <a:off x="719782" y="1388900"/>
+            <a:ext cx="295274" cy="276999"/>
           </a:xfrm>
           <a:prstGeom prst="rect">
             <a:avLst/>
           </a:prstGeom>
           <a:noFill/>
         </p:spPr>
-        <p:style>
-          <a:lnRef idx="2">
-            <a:schemeClr val="accent1">
-              <a:shade val="50000"/>
-            </a:schemeClr>
-          </a:lnRef>
-          <a:fillRef idx="1">
-            <a:schemeClr val="accent1"/>
-          </a:fillRef>
-          <a:effectRef idx="0">
-            <a:schemeClr val="accent1"/>
-          </a:effectRef>
-          <a:fontRef idx="minor">
-            <a:schemeClr val="lt1"/>
-          </a:fontRef>
-        </p:style>
-        <p:txBody>
-          <a:bodyPr lIns="32902" tIns="16451" rIns="32902" bIns="16451" rtlCol="0" anchor="ctr"/>
-          <a:lstStyle/>
-          <a:p>
-            <a:pPr algn="ctr"/>
-            <a:endParaRPr lang="en-AU"/>
-          </a:p>
-        </p:txBody>
-      </p:sp>
-      <p:pic>
-        <p:nvPicPr>
-          <p:cNvPr id="1026" name="Picture 2"/>
-          <p:cNvPicPr>
-            <a:picLocks noChangeAspect="1" noChangeArrowheads="1"/>
-          </p:cNvPicPr>
+        <p:txBody>
+          <a:bodyPr wrap="none" rtlCol="0">
+            <a:spAutoFit/>
+          </a:bodyPr>
+          <a:lstStyle/>
+          <a:p>
+            <a:r>
+              <a:rPr lang="en-AU" sz="1200" b="1" dirty="0">
+                <a:latin typeface="Arial" panose="020B0604020202020204" pitchFamily="34" charset="0"/>
+                <a:cs typeface="Arial" panose="020B0604020202020204" pitchFamily="34" charset="0"/>
+              </a:rPr>
+              <a:t>C</a:t>
+            </a:r>
+            <a:endParaRPr lang="en-AU" sz="1200" b="1" dirty="0">
+              <a:latin typeface="Arial" panose="020B0604020202020204" pitchFamily="34" charset="0"/>
+              <a:cs typeface="Arial" panose="020B0604020202020204" pitchFamily="34" charset="0"/>
+            </a:endParaRPr>
+          </a:p>
+        </p:txBody>
+      </p:sp>
+      <p:sp>
+        <p:nvSpPr>
+          <p:cNvPr id="41" name="TextBox 40"/>
+          <p:cNvSpPr txBox="1"/>
           <p:nvPr/>
-        </p:nvPicPr>
-        <p:blipFill>
-          <a:blip r:embed="rId4" cstate="print"/>
-          <a:srcRect/>
-          <a:stretch>
-            <a:fillRect/>
-          </a:stretch>
-        </p:blipFill>
-        <p:spPr bwMode="auto">
+        </p:nvSpPr>
+        <p:spPr>
           <a:xfrm>
-            <a:off x="1235765" y="683946"/>
-            <a:ext cx="521950" cy="451957"/>
+            <a:off x="606375" y="35846"/>
+            <a:ext cx="295274" cy="276999"/>
           </a:xfrm>
           <a:prstGeom prst="rect">
             <a:avLst/>
           </a:prstGeom>
           <a:noFill/>
-          <a:ln w="9525">
-            <a:noFill/>
-            <a:miter lim="800000"/>
-            <a:headEnd/>
-            <a:tailEnd/>
-          </a:ln>
-          <a:effectLst/>
         </p:spPr>
-      </p:pic>
-    </p:spTree>
-    <p:extLst>
-      <p:ext uri="{BB962C8B-B14F-4D97-AF65-F5344CB8AC3E}">
-        <p14:creationId xmlns="" xmlns:p14="http://schemas.microsoft.com/office/powerpoint/2010/main" val="2119511818"/>
-      </p:ext>
-    </p:extLst>
-  </p:cSld>
-  <p:clrMapOvr>
-    <a:masterClrMapping/>
-  </p:clrMapOvr>
-</p:sld>
-</file>
-
-<file path=ppt/slides/slide2.xml><?xml version="1.0" encoding="utf-8"?>
-<p:sld xmlns:a="http://schemas.openxmlformats.org/drawingml/2006/main" xmlns:r="http://schemas.openxmlformats.org/officeDocument/2006/relationships" xmlns:p="http://schemas.openxmlformats.org/presentationml/2006/main">
-  <p:cSld>
-    <p:spTree>
-      <p:nvGrpSpPr>
-        <p:cNvPr id="1" name=""/>
-        <p:cNvGrpSpPr/>
-        <p:nvPr/>
-      </p:nvGrpSpPr>
-      <p:grpSpPr>
-        <a:xfrm>
-          <a:off x="0" y="0"/>
-          <a:ext cx="0" cy="0"/>
-          <a:chOff x="0" y="0"/>
-          <a:chExt cx="0" cy="0"/>
-        </a:xfrm>
-      </p:grpSpPr>
-      <p:grpSp>
-        <p:nvGrpSpPr>
-          <p:cNvPr id="21" name="Group 20"/>
-          <p:cNvGrpSpPr/>
-          <p:nvPr/>
-        </p:nvGrpSpPr>
-        <p:grpSpPr>
-          <a:xfrm>
-            <a:off x="1007771" y="176699"/>
-            <a:ext cx="817611" cy="1209333"/>
-            <a:chOff x="3199977" y="420802"/>
-            <a:chExt cx="2596159" cy="2880000"/>
-          </a:xfrm>
-        </p:grpSpPr>
-        <p:grpSp>
-          <p:nvGrpSpPr>
-            <p:cNvPr id="4" name="Group 3"/>
-            <p:cNvGrpSpPr>
-              <a:grpSpLocks noChangeAspect="1"/>
-            </p:cNvGrpSpPr>
-            <p:nvPr/>
-          </p:nvGrpSpPr>
-          <p:grpSpPr>
-            <a:xfrm>
-              <a:off x="3199977" y="420802"/>
-              <a:ext cx="1039966" cy="2880000"/>
-              <a:chOff x="6588224" y="1624337"/>
-              <a:chExt cx="1144404" cy="3169224"/>
-            </a:xfrm>
-          </p:grpSpPr>
-          <p:sp>
-            <p:nvSpPr>
-              <p:cNvPr id="5" name="Isosceles Triangle 4"/>
-              <p:cNvSpPr>
-                <a:spLocks noChangeAspect="1"/>
-              </p:cNvSpPr>
-              <p:nvPr/>
-            </p:nvSpPr>
-            <p:spPr>
-              <a:xfrm flipV="1">
-                <a:off x="6588224" y="2121765"/>
-                <a:ext cx="809793" cy="809793"/>
-              </a:xfrm>
-              <a:prstGeom prst="triangle">
-                <a:avLst/>
-              </a:prstGeom>
-              <a:noFill/>
-              <a:ln w="44450">
-                <a:solidFill>
-                  <a:schemeClr val="tx1"/>
-                </a:solidFill>
-              </a:ln>
-            </p:spPr>
-            <p:style>
-              <a:lnRef idx="2">
-                <a:schemeClr val="accent1">
-                  <a:shade val="50000"/>
-                </a:schemeClr>
-              </a:lnRef>
-              <a:fillRef idx="1">
-                <a:schemeClr val="accent1"/>
-              </a:fillRef>
-              <a:effectRef idx="0">
-                <a:schemeClr val="accent1"/>
-              </a:effectRef>
-              <a:fontRef idx="minor">
-                <a:schemeClr val="lt1"/>
-              </a:fontRef>
-            </p:style>
-            <p:txBody>
-              <a:bodyPr rtlCol="0" anchor="ctr"/>
-              <a:lstStyle/>
-              <a:p>
-                <a:pPr algn="ctr"/>
-                <a:endParaRPr lang="en-AU"/>
-              </a:p>
-            </p:txBody>
-          </p:sp>
-          <p:cxnSp>
-            <p:nvCxnSpPr>
-              <p:cNvPr id="6" name="Curved Connector 5"/>
-              <p:cNvCxnSpPr>
-                <a:cxnSpLocks noChangeAspect="1"/>
-              </p:cNvCxnSpPr>
-              <p:nvPr/>
-            </p:nvCxnSpPr>
-            <p:spPr>
-              <a:xfrm flipV="1">
-                <a:off x="6877436" y="2329998"/>
-                <a:ext cx="231369" cy="231369"/>
-              </a:xfrm>
-              <a:prstGeom prst="curvedConnector3">
-                <a:avLst/>
-              </a:prstGeom>
-              <a:ln w="44450"/>
-            </p:spPr>
-            <p:style>
-              <a:lnRef idx="2">
-                <a:schemeClr val="accent1"/>
-              </a:lnRef>
-              <a:fillRef idx="0">
-                <a:schemeClr val="accent1"/>
-              </a:fillRef>
-              <a:effectRef idx="1">
-                <a:schemeClr val="accent1"/>
-              </a:effectRef>
-              <a:fontRef idx="minor">
-                <a:schemeClr val="tx1"/>
-              </a:fontRef>
-            </p:style>
-          </p:cxnSp>
-          <p:cxnSp>
-            <p:nvCxnSpPr>
-              <p:cNvPr id="7" name="Straight Connector 6"/>
-              <p:cNvCxnSpPr>
-                <a:cxnSpLocks noChangeAspect="1"/>
-              </p:cNvCxnSpPr>
-              <p:nvPr/>
-            </p:nvCxnSpPr>
-            <p:spPr>
-              <a:xfrm>
-                <a:off x="6993120" y="1624337"/>
-                <a:ext cx="0" cy="474307"/>
-              </a:xfrm>
-              <a:prstGeom prst="line">
-                <a:avLst/>
-              </a:prstGeom>
-              <a:ln w="44450">
-                <a:solidFill>
-                  <a:schemeClr val="tx1"/>
-                </a:solidFill>
-              </a:ln>
-            </p:spPr>
-            <p:style>
-              <a:lnRef idx="1">
-                <a:schemeClr val="accent1"/>
-              </a:lnRef>
-              <a:fillRef idx="0">
-                <a:schemeClr val="accent1"/>
-              </a:fillRef>
-              <a:effectRef idx="0">
-                <a:schemeClr val="accent1"/>
-              </a:effectRef>
-              <a:fontRef idx="minor">
-                <a:schemeClr val="tx1"/>
-              </a:fontRef>
-            </p:style>
-          </p:cxnSp>
-          <p:cxnSp>
-            <p:nvCxnSpPr>
-              <p:cNvPr id="8" name="Straight Connector 7"/>
-              <p:cNvCxnSpPr>
-                <a:cxnSpLocks noChangeAspect="1"/>
-              </p:cNvCxnSpPr>
-              <p:nvPr/>
-            </p:nvCxnSpPr>
-            <p:spPr>
-              <a:xfrm flipV="1">
-                <a:off x="6994599" y="3594203"/>
-                <a:ext cx="0" cy="115685"/>
-              </a:xfrm>
-              <a:prstGeom prst="line">
-                <a:avLst/>
-              </a:prstGeom>
-              <a:ln w="44450">
-                <a:solidFill>
-                  <a:schemeClr val="tx1"/>
-                </a:solidFill>
-              </a:ln>
-            </p:spPr>
-            <p:style>
-              <a:lnRef idx="1">
-                <a:schemeClr val="accent1"/>
-              </a:lnRef>
-              <a:fillRef idx="0">
-                <a:schemeClr val="accent1"/>
-              </a:fillRef>
-              <a:effectRef idx="0">
-                <a:schemeClr val="accent1"/>
-              </a:effectRef>
-              <a:fontRef idx="minor">
-                <a:schemeClr val="tx1"/>
-              </a:fontRef>
-            </p:style>
-          </p:cxnSp>
-          <p:grpSp>
-            <p:nvGrpSpPr>
-              <p:cNvPr id="9" name="Group 34"/>
-              <p:cNvGrpSpPr>
-                <a:grpSpLocks noChangeAspect="1"/>
-              </p:cNvGrpSpPr>
-              <p:nvPr/>
-            </p:nvGrpSpPr>
-            <p:grpSpPr>
-              <a:xfrm>
-                <a:off x="6823057" y="3706613"/>
-                <a:ext cx="349879" cy="61114"/>
-                <a:chOff x="4724894" y="1611142"/>
-                <a:chExt cx="108879" cy="19018"/>
-              </a:xfrm>
-            </p:grpSpPr>
-            <p:cxnSp>
-              <p:nvCxnSpPr>
-                <p:cNvPr id="16" name="Straight Connector 15"/>
-                <p:cNvCxnSpPr/>
-                <p:nvPr/>
-              </p:nvCxnSpPr>
-              <p:spPr>
-                <a:xfrm>
-                  <a:off x="4725773" y="1612161"/>
-                  <a:ext cx="108000" cy="0"/>
-                </a:xfrm>
-                <a:prstGeom prst="line">
-                  <a:avLst/>
-                </a:prstGeom>
-                <a:ln w="44450"/>
-              </p:spPr>
-              <p:style>
-                <a:lnRef idx="1">
-                  <a:schemeClr val="accent1"/>
-                </a:lnRef>
-                <a:fillRef idx="0">
-                  <a:schemeClr val="accent1"/>
-                </a:fillRef>
-                <a:effectRef idx="0">
-                  <a:schemeClr val="accent1"/>
-                </a:effectRef>
-                <a:fontRef idx="minor">
-                  <a:schemeClr val="tx1"/>
-                </a:fontRef>
-              </p:style>
-            </p:cxnSp>
-            <p:cxnSp>
-              <p:nvCxnSpPr>
-                <p:cNvPr id="17" name="Straight Connector 16"/>
-                <p:cNvCxnSpPr/>
-                <p:nvPr/>
-              </p:nvCxnSpPr>
-              <p:spPr>
-                <a:xfrm>
-                  <a:off x="4724894" y="1612160"/>
-                  <a:ext cx="0" cy="18000"/>
-                </a:xfrm>
-                <a:prstGeom prst="line">
-                  <a:avLst/>
-                </a:prstGeom>
-                <a:ln w="44450"/>
-              </p:spPr>
-              <p:style>
-                <a:lnRef idx="1">
-                  <a:schemeClr val="accent1"/>
-                </a:lnRef>
-                <a:fillRef idx="0">
-                  <a:schemeClr val="accent1"/>
-                </a:fillRef>
-                <a:effectRef idx="0">
-                  <a:schemeClr val="accent1"/>
-                </a:effectRef>
-                <a:fontRef idx="minor">
-                  <a:schemeClr val="tx1"/>
-                </a:fontRef>
-              </p:style>
-            </p:cxnSp>
-            <p:cxnSp>
-              <p:nvCxnSpPr>
-                <p:cNvPr id="18" name="Straight Connector 17"/>
-                <p:cNvCxnSpPr/>
-                <p:nvPr/>
-              </p:nvCxnSpPr>
-              <p:spPr>
-                <a:xfrm>
-                  <a:off x="4832400" y="1611142"/>
-                  <a:ext cx="0" cy="18000"/>
-                </a:xfrm>
-                <a:prstGeom prst="line">
-                  <a:avLst/>
-                </a:prstGeom>
-                <a:ln w="44450"/>
-              </p:spPr>
-              <p:style>
-                <a:lnRef idx="1">
-                  <a:schemeClr val="accent1"/>
-                </a:lnRef>
-                <a:fillRef idx="0">
-                  <a:schemeClr val="accent1"/>
-                </a:fillRef>
-                <a:effectRef idx="0">
-                  <a:schemeClr val="accent1"/>
-                </a:effectRef>
-                <a:fontRef idx="minor">
-                  <a:schemeClr val="tx1"/>
-                </a:fontRef>
-              </p:style>
-            </p:cxnSp>
-          </p:grpSp>
-          <p:sp>
-            <p:nvSpPr>
-              <p:cNvPr id="10" name="Rectangle 9"/>
-              <p:cNvSpPr>
-                <a:spLocks noChangeAspect="1"/>
-              </p:cNvSpPr>
-              <p:nvPr/>
-            </p:nvSpPr>
-            <p:spPr>
-              <a:xfrm>
-                <a:off x="6865446" y="3773514"/>
-                <a:ext cx="277643" cy="277643"/>
-              </a:xfrm>
-              <a:prstGeom prst="rect">
-                <a:avLst/>
-              </a:prstGeom>
-              <a:solidFill>
-                <a:schemeClr val="accent1"/>
-              </a:solidFill>
-              <a:ln w="12700">
-                <a:noFill/>
-              </a:ln>
-            </p:spPr>
-            <p:style>
-              <a:lnRef idx="2">
-                <a:schemeClr val="accent1">
-                  <a:shade val="50000"/>
-                </a:schemeClr>
-              </a:lnRef>
-              <a:fillRef idx="1">
-                <a:schemeClr val="accent1"/>
-              </a:fillRef>
-              <a:effectRef idx="0">
-                <a:schemeClr val="accent1"/>
-              </a:effectRef>
-              <a:fontRef idx="minor">
-                <a:schemeClr val="lt1"/>
-              </a:fontRef>
-            </p:style>
-            <p:txBody>
-              <a:bodyPr rtlCol="0" anchor="ctr"/>
-              <a:lstStyle/>
-              <a:p>
-                <a:pPr algn="ctr"/>
-                <a:endParaRPr lang="en-AU"/>
-              </a:p>
-            </p:txBody>
-          </p:sp>
-          <p:cxnSp>
-            <p:nvCxnSpPr>
-              <p:cNvPr id="11" name="Straight Connector 10"/>
-              <p:cNvCxnSpPr>
-                <a:cxnSpLocks noChangeAspect="1"/>
-              </p:cNvCxnSpPr>
-              <p:nvPr/>
-            </p:nvCxnSpPr>
-            <p:spPr>
-              <a:xfrm flipV="1">
-                <a:off x="6996559" y="4051158"/>
-                <a:ext cx="0" cy="115685"/>
-              </a:xfrm>
-              <a:prstGeom prst="line">
-                <a:avLst/>
-              </a:prstGeom>
-              <a:ln w="44450">
-                <a:solidFill>
-                  <a:schemeClr val="tx1"/>
-                </a:solidFill>
-              </a:ln>
-            </p:spPr>
-            <p:style>
-              <a:lnRef idx="1">
-                <a:schemeClr val="accent1"/>
-              </a:lnRef>
-              <a:fillRef idx="0">
-                <a:schemeClr val="accent1"/>
-              </a:fillRef>
-              <a:effectRef idx="0">
-                <a:schemeClr val="accent1"/>
-              </a:effectRef>
-              <a:fontRef idx="minor">
-                <a:schemeClr val="tx1"/>
-              </a:fontRef>
-            </p:style>
-          </p:cxnSp>
-          <p:cxnSp>
-            <p:nvCxnSpPr>
-              <p:cNvPr id="12" name="Straight Connector 11"/>
-              <p:cNvCxnSpPr>
-                <a:cxnSpLocks noChangeAspect="1"/>
-              </p:cNvCxnSpPr>
-              <p:nvPr/>
-            </p:nvCxnSpPr>
-            <p:spPr>
-              <a:xfrm>
-                <a:off x="6989235" y="2938213"/>
-                <a:ext cx="7767" cy="659403"/>
-              </a:xfrm>
-              <a:prstGeom prst="line">
-                <a:avLst/>
-              </a:prstGeom>
-              <a:ln w="44450">
-                <a:solidFill>
-                  <a:schemeClr val="tx1"/>
-                </a:solidFill>
-              </a:ln>
-            </p:spPr>
-            <p:style>
-              <a:lnRef idx="1">
-                <a:schemeClr val="accent1"/>
-              </a:lnRef>
-              <a:fillRef idx="0">
-                <a:schemeClr val="accent1"/>
-              </a:fillRef>
-              <a:effectRef idx="0">
-                <a:schemeClr val="accent1"/>
-              </a:effectRef>
-              <a:fontRef idx="minor">
-                <a:schemeClr val="tx1"/>
-              </a:fontRef>
-            </p:style>
-          </p:cxnSp>
-          <p:cxnSp>
-            <p:nvCxnSpPr>
-              <p:cNvPr id="13" name="Straight Connector 12"/>
-              <p:cNvCxnSpPr>
-                <a:cxnSpLocks noChangeAspect="1"/>
-              </p:cNvCxnSpPr>
-              <p:nvPr/>
-            </p:nvCxnSpPr>
-            <p:spPr>
-              <a:xfrm>
-                <a:off x="6993831" y="4157295"/>
-                <a:ext cx="0" cy="636266"/>
-              </a:xfrm>
-              <a:prstGeom prst="line">
-                <a:avLst/>
-              </a:prstGeom>
-              <a:ln w="44450">
-                <a:solidFill>
-                  <a:schemeClr val="tx1"/>
-                </a:solidFill>
-              </a:ln>
-            </p:spPr>
-            <p:style>
-              <a:lnRef idx="1">
-                <a:schemeClr val="accent1"/>
-              </a:lnRef>
-              <a:fillRef idx="0">
-                <a:schemeClr val="accent1"/>
-              </a:fillRef>
-              <a:effectRef idx="0">
-                <a:schemeClr val="accent1"/>
-              </a:effectRef>
-              <a:fontRef idx="minor">
-                <a:schemeClr val="tx1"/>
-              </a:fontRef>
-            </p:style>
-          </p:cxnSp>
-          <p:cxnSp>
-            <p:nvCxnSpPr>
-              <p:cNvPr id="14" name="Straight Arrow Connector 13"/>
-              <p:cNvCxnSpPr>
-                <a:cxnSpLocks noChangeAspect="1"/>
-              </p:cNvCxnSpPr>
-              <p:nvPr/>
-            </p:nvCxnSpPr>
-            <p:spPr>
-              <a:xfrm>
-                <a:off x="7246277" y="2457822"/>
-                <a:ext cx="486351" cy="0"/>
-              </a:xfrm>
-              <a:prstGeom prst="straightConnector1">
-                <a:avLst/>
-              </a:prstGeom>
-              <a:ln w="44450">
-                <a:tailEnd type="arrow"/>
-              </a:ln>
-            </p:spPr>
-            <p:style>
-              <a:lnRef idx="1">
-                <a:schemeClr val="accent1"/>
-              </a:lnRef>
-              <a:fillRef idx="0">
-                <a:schemeClr val="accent1"/>
-              </a:fillRef>
-              <a:effectRef idx="0">
-                <a:schemeClr val="accent1"/>
-              </a:effectRef>
-              <a:fontRef idx="minor">
-                <a:schemeClr val="tx1"/>
-              </a:fontRef>
-            </p:style>
-          </p:cxnSp>
-          <p:cxnSp>
-            <p:nvCxnSpPr>
-              <p:cNvPr id="15" name="Straight Arrow Connector 14"/>
-              <p:cNvCxnSpPr>
-                <a:cxnSpLocks noChangeAspect="1"/>
-              </p:cNvCxnSpPr>
-              <p:nvPr/>
-            </p:nvCxnSpPr>
-            <p:spPr>
-              <a:xfrm>
-                <a:off x="7191439" y="3925705"/>
-                <a:ext cx="522485" cy="0"/>
-              </a:xfrm>
-              <a:prstGeom prst="straightConnector1">
-                <a:avLst/>
-              </a:prstGeom>
-              <a:ln w="44450">
-                <a:tailEnd type="arrow"/>
-              </a:ln>
-            </p:spPr>
-            <p:style>
-              <a:lnRef idx="1">
-                <a:schemeClr val="accent1"/>
-              </a:lnRef>
-              <a:fillRef idx="0">
-                <a:schemeClr val="accent1"/>
-              </a:fillRef>
-              <a:effectRef idx="0">
-                <a:schemeClr val="accent1"/>
-              </a:effectRef>
-              <a:fontRef idx="minor">
-                <a:schemeClr val="tx1"/>
-              </a:fontRef>
-            </p:style>
-          </p:cxnSp>
-        </p:grpSp>
-        <p:pic>
-          <p:nvPicPr>
-            <p:cNvPr id="19" name="Picture 2"/>
-            <p:cNvPicPr>
-              <a:picLocks noChangeAspect="1" noChangeArrowheads="1"/>
-            </p:cNvPicPr>
-            <p:nvPr/>
-          </p:nvPicPr>
-          <p:blipFill>
-            <a:blip r:embed="rId2" cstate="print"/>
-            <a:srcRect/>
-            <a:stretch>
-              <a:fillRect/>
-            </a:stretch>
-          </p:blipFill>
-          <p:spPr bwMode="auto">
-            <a:xfrm>
-              <a:off x="3851920" y="692696"/>
-              <a:ext cx="1657350" cy="1076325"/>
-            </a:xfrm>
-            <a:prstGeom prst="rect">
-              <a:avLst/>
-            </a:prstGeom>
-            <a:noFill/>
-            <a:ln w="9525">
-              <a:noFill/>
-              <a:miter lim="800000"/>
-              <a:headEnd/>
-              <a:tailEnd/>
-            </a:ln>
-            <a:effectLst/>
-          </p:spPr>
-        </p:pic>
-        <p:pic>
-          <p:nvPicPr>
-            <p:cNvPr id="20" name="Picture 3"/>
-            <p:cNvPicPr>
-              <a:picLocks noChangeAspect="1" noChangeArrowheads="1"/>
-            </p:cNvPicPr>
-            <p:nvPr/>
-          </p:nvPicPr>
-          <p:blipFill>
-            <a:blip r:embed="rId3" cstate="print"/>
-            <a:srcRect/>
-            <a:stretch>
-              <a:fillRect/>
-            </a:stretch>
-          </p:blipFill>
-          <p:spPr bwMode="auto">
-            <a:xfrm>
-              <a:off x="4138786" y="1988840"/>
-              <a:ext cx="1657350" cy="1076325"/>
-            </a:xfrm>
-            <a:prstGeom prst="rect">
-              <a:avLst/>
-            </a:prstGeom>
-            <a:noFill/>
-            <a:ln w="9525">
-              <a:noFill/>
-              <a:miter lim="800000"/>
-              <a:headEnd/>
-              <a:tailEnd/>
-            </a:ln>
-            <a:effectLst/>
-          </p:spPr>
-        </p:pic>
-      </p:grpSp>
+        <p:txBody>
+          <a:bodyPr wrap="none" rtlCol="0">
+            <a:spAutoFit/>
+          </a:bodyPr>
+          <a:lstStyle/>
+          <a:p>
+            <a:r>
+              <a:rPr lang="en-AU" sz="1200" b="1" dirty="0">
+                <a:latin typeface="Arial" panose="020B0604020202020204" pitchFamily="34" charset="0"/>
+                <a:cs typeface="Arial" panose="020B0604020202020204" pitchFamily="34" charset="0"/>
+              </a:rPr>
+              <a:t>B</a:t>
+            </a:r>
+            <a:endParaRPr lang="en-AU" sz="1200" b="1" dirty="0">
+              <a:latin typeface="Arial" panose="020B0604020202020204" pitchFamily="34" charset="0"/>
+              <a:cs typeface="Arial" panose="020B0604020202020204" pitchFamily="34" charset="0"/>
+            </a:endParaRPr>
+          </a:p>
+        </p:txBody>
+      </p:sp>
     </p:spTree>
   </p:cSld>
   <p:clrMapOvr>
     <a:masterClrMapping/>
   </p:clrMapOvr>
 </p:sld>
-</file>
-
-<file path=ppt/slides/slide3.xml><?xml version="1.0" encoding="utf-8"?>
-<p:sld xmlns:a="http://schemas.openxmlformats.org/drawingml/2006/main" xmlns:r="http://schemas.openxmlformats.org/officeDocument/2006/relationships" xmlns:p="http://schemas.openxmlformats.org/presentationml/2006/main">
-  <p:cSld>
-    <p:spTree>
-      <p:nvGrpSpPr>
-        <p:cNvPr id="1" name=""/>
-        <p:cNvGrpSpPr/>
-        <p:nvPr/>
-      </p:nvGrpSpPr>
-      <p:grpSpPr>
-        <a:xfrm>
-          <a:off x="0" y="0"/>
-          <a:ext cx="0" cy="0"/>
-          <a:chOff x="0" y="0"/>
-          <a:chExt cx="0" cy="0"/>
-        </a:xfrm>
-      </p:grpSpPr>
-      <p:grpSp>
-        <p:nvGrpSpPr>
-          <p:cNvPr id="19" name="Group 18"/>
-          <p:cNvGrpSpPr/>
-          <p:nvPr/>
-        </p:nvGrpSpPr>
-        <p:grpSpPr>
-          <a:xfrm>
-            <a:off x="71710" y="-274"/>
-            <a:ext cx="2717850" cy="2879999"/>
-            <a:chOff x="71710" y="-274"/>
-            <a:chExt cx="2717850" cy="2879999"/>
-          </a:xfrm>
-        </p:grpSpPr>
-        <p:pic>
-          <p:nvPicPr>
-            <p:cNvPr id="1031" name="Picture 7"/>
-            <p:cNvPicPr>
-              <a:picLocks noChangeAspect="1" noChangeArrowheads="1"/>
-            </p:cNvPicPr>
-            <p:nvPr/>
-          </p:nvPicPr>
-          <p:blipFill>
-            <a:blip r:embed="rId2" cstate="print"/>
-            <a:srcRect/>
-            <a:stretch>
-              <a:fillRect/>
-            </a:stretch>
-          </p:blipFill>
-          <p:spPr bwMode="auto">
-            <a:xfrm>
-              <a:off x="1007814" y="208408"/>
-              <a:ext cx="1330325" cy="1087438"/>
-            </a:xfrm>
-            <a:prstGeom prst="rect">
-              <a:avLst/>
-            </a:prstGeom>
-            <a:noFill/>
-            <a:ln w="9525">
-              <a:noFill/>
-              <a:miter lim="800000"/>
-              <a:headEnd/>
-              <a:tailEnd/>
-            </a:ln>
-          </p:spPr>
-        </p:pic>
-        <p:pic>
-          <p:nvPicPr>
-            <p:cNvPr id="1033" name="Picture 9"/>
-            <p:cNvPicPr>
-              <a:picLocks noChangeAspect="1" noChangeArrowheads="1"/>
-            </p:cNvPicPr>
-            <p:nvPr/>
-          </p:nvPicPr>
-          <p:blipFill>
-            <a:blip r:embed="rId3" cstate="print"/>
-            <a:srcRect/>
-            <a:stretch>
-              <a:fillRect/>
-            </a:stretch>
-          </p:blipFill>
-          <p:spPr bwMode="auto">
-            <a:xfrm>
-              <a:off x="1079822" y="1563290"/>
-              <a:ext cx="1709738" cy="1028700"/>
-            </a:xfrm>
-            <a:prstGeom prst="rect">
-              <a:avLst/>
-            </a:prstGeom>
-            <a:noFill/>
-            <a:ln w="9525">
-              <a:noFill/>
-              <a:miter lim="800000"/>
-              <a:headEnd/>
-              <a:tailEnd/>
-            </a:ln>
-          </p:spPr>
-        </p:pic>
-        <p:grpSp>
-          <p:nvGrpSpPr>
-            <p:cNvPr id="22" name="Group 3"/>
-            <p:cNvGrpSpPr>
-              <a:grpSpLocks noChangeAspect="1"/>
-            </p:cNvGrpSpPr>
-            <p:nvPr/>
-          </p:nvGrpSpPr>
-          <p:grpSpPr>
-            <a:xfrm>
-              <a:off x="71710" y="-274"/>
-              <a:ext cx="1039968" cy="2879999"/>
-              <a:chOff x="6588224" y="1624337"/>
-              <a:chExt cx="1144404" cy="3169224"/>
-            </a:xfrm>
-          </p:grpSpPr>
-          <p:sp>
-            <p:nvSpPr>
-              <p:cNvPr id="25" name="Isosceles Triangle 24"/>
-              <p:cNvSpPr>
-                <a:spLocks noChangeAspect="1"/>
-              </p:cNvSpPr>
-              <p:nvPr/>
-            </p:nvSpPr>
-            <p:spPr>
-              <a:xfrm flipV="1">
-                <a:off x="6588224" y="2121765"/>
-                <a:ext cx="809793" cy="809793"/>
-              </a:xfrm>
-              <a:prstGeom prst="triangle">
-                <a:avLst/>
-              </a:prstGeom>
-              <a:noFill/>
-              <a:ln w="44450">
-                <a:solidFill>
-                  <a:schemeClr val="tx1"/>
-                </a:solidFill>
-              </a:ln>
-            </p:spPr>
-            <p:style>
-              <a:lnRef idx="2">
-                <a:schemeClr val="accent1">
-                  <a:shade val="50000"/>
-                </a:schemeClr>
-              </a:lnRef>
-              <a:fillRef idx="1">
-                <a:schemeClr val="accent1"/>
-              </a:fillRef>
-              <a:effectRef idx="0">
-                <a:schemeClr val="accent1"/>
-              </a:effectRef>
-              <a:fontRef idx="minor">
-                <a:schemeClr val="lt1"/>
-              </a:fontRef>
-            </p:style>
-            <p:txBody>
-              <a:bodyPr rtlCol="0" anchor="ctr"/>
-              <a:lstStyle/>
-              <a:p>
-                <a:pPr algn="ctr"/>
-                <a:endParaRPr lang="en-AU"/>
-              </a:p>
-            </p:txBody>
-          </p:sp>
-          <p:cxnSp>
-            <p:nvCxnSpPr>
-              <p:cNvPr id="26" name="Curved Connector 25"/>
-              <p:cNvCxnSpPr>
-                <a:cxnSpLocks noChangeAspect="1"/>
-              </p:cNvCxnSpPr>
-              <p:nvPr/>
-            </p:nvCxnSpPr>
-            <p:spPr>
-              <a:xfrm flipV="1">
-                <a:off x="6877436" y="2329998"/>
-                <a:ext cx="231369" cy="231369"/>
-              </a:xfrm>
-              <a:prstGeom prst="curvedConnector3">
-                <a:avLst/>
-              </a:prstGeom>
-              <a:ln w="44450"/>
-            </p:spPr>
-            <p:style>
-              <a:lnRef idx="2">
-                <a:schemeClr val="accent1"/>
-              </a:lnRef>
-              <a:fillRef idx="0">
-                <a:schemeClr val="accent1"/>
-              </a:fillRef>
-              <a:effectRef idx="1">
-                <a:schemeClr val="accent1"/>
-              </a:effectRef>
-              <a:fontRef idx="minor">
-                <a:schemeClr val="tx1"/>
-              </a:fontRef>
-            </p:style>
-          </p:cxnSp>
-          <p:cxnSp>
-            <p:nvCxnSpPr>
-              <p:cNvPr id="27" name="Straight Connector 26"/>
-              <p:cNvCxnSpPr>
-                <a:cxnSpLocks noChangeAspect="1"/>
-              </p:cNvCxnSpPr>
-              <p:nvPr/>
-            </p:nvCxnSpPr>
-            <p:spPr>
-              <a:xfrm>
-                <a:off x="6993120" y="1624337"/>
-                <a:ext cx="0" cy="474307"/>
-              </a:xfrm>
-              <a:prstGeom prst="line">
-                <a:avLst/>
-              </a:prstGeom>
-              <a:ln w="44450">
-                <a:solidFill>
-                  <a:schemeClr val="tx1"/>
-                </a:solidFill>
-              </a:ln>
-            </p:spPr>
-            <p:style>
-              <a:lnRef idx="1">
-                <a:schemeClr val="accent1"/>
-              </a:lnRef>
-              <a:fillRef idx="0">
-                <a:schemeClr val="accent1"/>
-              </a:fillRef>
-              <a:effectRef idx="0">
-                <a:schemeClr val="accent1"/>
-              </a:effectRef>
-              <a:fontRef idx="minor">
-                <a:schemeClr val="tx1"/>
-              </a:fontRef>
-            </p:style>
-          </p:cxnSp>
-          <p:cxnSp>
-            <p:nvCxnSpPr>
-              <p:cNvPr id="28" name="Straight Connector 27"/>
-              <p:cNvCxnSpPr>
-                <a:cxnSpLocks noChangeAspect="1"/>
-              </p:cNvCxnSpPr>
-              <p:nvPr/>
-            </p:nvCxnSpPr>
-            <p:spPr>
-              <a:xfrm flipV="1">
-                <a:off x="6994599" y="3594203"/>
-                <a:ext cx="0" cy="115685"/>
-              </a:xfrm>
-              <a:prstGeom prst="line">
-                <a:avLst/>
-              </a:prstGeom>
-              <a:ln w="44450">
-                <a:solidFill>
-                  <a:schemeClr val="tx1"/>
-                </a:solidFill>
-              </a:ln>
-            </p:spPr>
-            <p:style>
-              <a:lnRef idx="1">
-                <a:schemeClr val="accent1"/>
-              </a:lnRef>
-              <a:fillRef idx="0">
-                <a:schemeClr val="accent1"/>
-              </a:fillRef>
-              <a:effectRef idx="0">
-                <a:schemeClr val="accent1"/>
-              </a:effectRef>
-              <a:fontRef idx="minor">
-                <a:schemeClr val="tx1"/>
-              </a:fontRef>
-            </p:style>
-          </p:cxnSp>
-          <p:grpSp>
-            <p:nvGrpSpPr>
-              <p:cNvPr id="29" name="Group 34"/>
-              <p:cNvGrpSpPr>
-                <a:grpSpLocks noChangeAspect="1"/>
-              </p:cNvGrpSpPr>
-              <p:nvPr/>
-            </p:nvGrpSpPr>
-            <p:grpSpPr>
-              <a:xfrm>
-                <a:off x="6823057" y="3706613"/>
-                <a:ext cx="349879" cy="61114"/>
-                <a:chOff x="4724894" y="1611142"/>
-                <a:chExt cx="108879" cy="19018"/>
-              </a:xfrm>
-            </p:grpSpPr>
-            <p:cxnSp>
-              <p:nvCxnSpPr>
-                <p:cNvPr id="36" name="Straight Connector 35"/>
-                <p:cNvCxnSpPr/>
-                <p:nvPr/>
-              </p:nvCxnSpPr>
-              <p:spPr>
-                <a:xfrm>
-                  <a:off x="4725773" y="1612161"/>
-                  <a:ext cx="108000" cy="0"/>
-                </a:xfrm>
-                <a:prstGeom prst="line">
-                  <a:avLst/>
-                </a:prstGeom>
-                <a:ln w="44450"/>
-              </p:spPr>
-              <p:style>
-                <a:lnRef idx="1">
-                  <a:schemeClr val="accent1"/>
-                </a:lnRef>
-                <a:fillRef idx="0">
-                  <a:schemeClr val="accent1"/>
-                </a:fillRef>
-                <a:effectRef idx="0">
-                  <a:schemeClr val="accent1"/>
-                </a:effectRef>
-                <a:fontRef idx="minor">
-                  <a:schemeClr val="tx1"/>
-                </a:fontRef>
-              </p:style>
-            </p:cxnSp>
-            <p:cxnSp>
-              <p:nvCxnSpPr>
-                <p:cNvPr id="37" name="Straight Connector 36"/>
-                <p:cNvCxnSpPr/>
-                <p:nvPr/>
-              </p:nvCxnSpPr>
-              <p:spPr>
-                <a:xfrm>
-                  <a:off x="4724894" y="1612160"/>
-                  <a:ext cx="0" cy="18000"/>
-                </a:xfrm>
-                <a:prstGeom prst="line">
-                  <a:avLst/>
-                </a:prstGeom>
-                <a:ln w="44450"/>
-              </p:spPr>
-              <p:style>
-                <a:lnRef idx="1">
-                  <a:schemeClr val="accent1"/>
-                </a:lnRef>
-                <a:fillRef idx="0">
-                  <a:schemeClr val="accent1"/>
-                </a:fillRef>
-                <a:effectRef idx="0">
-                  <a:schemeClr val="accent1"/>
-                </a:effectRef>
-                <a:fontRef idx="minor">
-                  <a:schemeClr val="tx1"/>
-                </a:fontRef>
-              </p:style>
-            </p:cxnSp>
-            <p:cxnSp>
-              <p:nvCxnSpPr>
-                <p:cNvPr id="38" name="Straight Connector 37"/>
-                <p:cNvCxnSpPr/>
-                <p:nvPr/>
-              </p:nvCxnSpPr>
-              <p:spPr>
-                <a:xfrm>
-                  <a:off x="4832400" y="1611142"/>
-                  <a:ext cx="0" cy="18000"/>
-                </a:xfrm>
-                <a:prstGeom prst="line">
-                  <a:avLst/>
-                </a:prstGeom>
-                <a:ln w="44450"/>
-              </p:spPr>
-              <p:style>
-                <a:lnRef idx="1">
-                  <a:schemeClr val="accent1"/>
-                </a:lnRef>
-                <a:fillRef idx="0">
-                  <a:schemeClr val="accent1"/>
-                </a:fillRef>
-                <a:effectRef idx="0">
-                  <a:schemeClr val="accent1"/>
-                </a:effectRef>
-                <a:fontRef idx="minor">
-                  <a:schemeClr val="tx1"/>
-                </a:fontRef>
-              </p:style>
-            </p:cxnSp>
-          </p:grpSp>
-          <p:sp>
-            <p:nvSpPr>
-              <p:cNvPr id="30" name="Rectangle 9"/>
-              <p:cNvSpPr>
-                <a:spLocks noChangeAspect="1"/>
-              </p:cNvSpPr>
-              <p:nvPr/>
-            </p:nvSpPr>
-            <p:spPr>
-              <a:xfrm>
-                <a:off x="6865446" y="3773514"/>
-                <a:ext cx="277643" cy="277643"/>
-              </a:xfrm>
-              <a:prstGeom prst="rect">
-                <a:avLst/>
-              </a:prstGeom>
-              <a:solidFill>
-                <a:schemeClr val="accent1"/>
-              </a:solidFill>
-              <a:ln w="12700">
-                <a:noFill/>
-              </a:ln>
-            </p:spPr>
-            <p:style>
-              <a:lnRef idx="2">
-                <a:schemeClr val="accent1">
-                  <a:shade val="50000"/>
-                </a:schemeClr>
-              </a:lnRef>
-              <a:fillRef idx="1">
-                <a:schemeClr val="accent1"/>
-              </a:fillRef>
-              <a:effectRef idx="0">
-                <a:schemeClr val="accent1"/>
-              </a:effectRef>
-              <a:fontRef idx="minor">
-                <a:schemeClr val="lt1"/>
-              </a:fontRef>
-            </p:style>
-            <p:txBody>
-              <a:bodyPr rtlCol="0" anchor="ctr"/>
-              <a:lstStyle/>
-              <a:p>
-                <a:pPr algn="ctr"/>
-                <a:endParaRPr lang="en-AU"/>
-              </a:p>
-            </p:txBody>
-          </p:sp>
-          <p:cxnSp>
-            <p:nvCxnSpPr>
-              <p:cNvPr id="31" name="Straight Connector 30"/>
-              <p:cNvCxnSpPr>
-                <a:cxnSpLocks noChangeAspect="1"/>
-              </p:cNvCxnSpPr>
-              <p:nvPr/>
-            </p:nvCxnSpPr>
-            <p:spPr>
-              <a:xfrm flipV="1">
-                <a:off x="6996559" y="4051158"/>
-                <a:ext cx="0" cy="115685"/>
-              </a:xfrm>
-              <a:prstGeom prst="line">
-                <a:avLst/>
-              </a:prstGeom>
-              <a:ln w="44450">
-                <a:solidFill>
-                  <a:schemeClr val="tx1"/>
-                </a:solidFill>
-              </a:ln>
-            </p:spPr>
-            <p:style>
-              <a:lnRef idx="1">
-                <a:schemeClr val="accent1"/>
-              </a:lnRef>
-              <a:fillRef idx="0">
-                <a:schemeClr val="accent1"/>
-              </a:fillRef>
-              <a:effectRef idx="0">
-                <a:schemeClr val="accent1"/>
-              </a:effectRef>
-              <a:fontRef idx="minor">
-                <a:schemeClr val="tx1"/>
-              </a:fontRef>
-            </p:style>
-          </p:cxnSp>
-          <p:cxnSp>
-            <p:nvCxnSpPr>
-              <p:cNvPr id="32" name="Straight Connector 31"/>
-              <p:cNvCxnSpPr>
-                <a:cxnSpLocks noChangeAspect="1"/>
-              </p:cNvCxnSpPr>
-              <p:nvPr/>
-            </p:nvCxnSpPr>
-            <p:spPr>
-              <a:xfrm>
-                <a:off x="6989235" y="2938213"/>
-                <a:ext cx="7767" cy="659403"/>
-              </a:xfrm>
-              <a:prstGeom prst="line">
-                <a:avLst/>
-              </a:prstGeom>
-              <a:ln w="44450">
-                <a:solidFill>
-                  <a:schemeClr val="tx1"/>
-                </a:solidFill>
-              </a:ln>
-            </p:spPr>
-            <p:style>
-              <a:lnRef idx="1">
-                <a:schemeClr val="accent1"/>
-              </a:lnRef>
-              <a:fillRef idx="0">
-                <a:schemeClr val="accent1"/>
-              </a:fillRef>
-              <a:effectRef idx="0">
-                <a:schemeClr val="accent1"/>
-              </a:effectRef>
-              <a:fontRef idx="minor">
-                <a:schemeClr val="tx1"/>
-              </a:fontRef>
-            </p:style>
-          </p:cxnSp>
-          <p:cxnSp>
-            <p:nvCxnSpPr>
-              <p:cNvPr id="33" name="Straight Connector 32"/>
-              <p:cNvCxnSpPr>
-                <a:cxnSpLocks noChangeAspect="1"/>
-              </p:cNvCxnSpPr>
-              <p:nvPr/>
-            </p:nvCxnSpPr>
-            <p:spPr>
-              <a:xfrm>
-                <a:off x="6993831" y="4157295"/>
-                <a:ext cx="0" cy="636266"/>
-              </a:xfrm>
-              <a:prstGeom prst="line">
-                <a:avLst/>
-              </a:prstGeom>
-              <a:ln w="44450">
-                <a:solidFill>
-                  <a:schemeClr val="tx1"/>
-                </a:solidFill>
-              </a:ln>
-            </p:spPr>
-            <p:style>
-              <a:lnRef idx="1">
-                <a:schemeClr val="accent1"/>
-              </a:lnRef>
-              <a:fillRef idx="0">
-                <a:schemeClr val="accent1"/>
-              </a:fillRef>
-              <a:effectRef idx="0">
-                <a:schemeClr val="accent1"/>
-              </a:effectRef>
-              <a:fontRef idx="minor">
-                <a:schemeClr val="tx1"/>
-              </a:fontRef>
-            </p:style>
-          </p:cxnSp>
-          <p:cxnSp>
-            <p:nvCxnSpPr>
-              <p:cNvPr id="34" name="Straight Arrow Connector 33"/>
-              <p:cNvCxnSpPr>
-                <a:cxnSpLocks noChangeAspect="1"/>
-              </p:cNvCxnSpPr>
-              <p:nvPr/>
-            </p:nvCxnSpPr>
-            <p:spPr>
-              <a:xfrm>
-                <a:off x="7246277" y="2457822"/>
-                <a:ext cx="486351" cy="0"/>
-              </a:xfrm>
-              <a:prstGeom prst="straightConnector1">
-                <a:avLst/>
-              </a:prstGeom>
-              <a:ln w="44450">
-                <a:tailEnd type="arrow"/>
-              </a:ln>
-            </p:spPr>
-            <p:style>
-              <a:lnRef idx="1">
-                <a:schemeClr val="accent1"/>
-              </a:lnRef>
-              <a:fillRef idx="0">
-                <a:schemeClr val="accent1"/>
-              </a:fillRef>
-              <a:effectRef idx="0">
-                <a:schemeClr val="accent1"/>
-              </a:effectRef>
-              <a:fontRef idx="minor">
-                <a:schemeClr val="tx1"/>
-              </a:fontRef>
-            </p:style>
-          </p:cxnSp>
-          <p:cxnSp>
-            <p:nvCxnSpPr>
-              <p:cNvPr id="35" name="Straight Arrow Connector 34"/>
-              <p:cNvCxnSpPr>
-                <a:cxnSpLocks noChangeAspect="1"/>
-              </p:cNvCxnSpPr>
-              <p:nvPr/>
-            </p:nvCxnSpPr>
-            <p:spPr>
-              <a:xfrm>
-                <a:off x="7191439" y="3925705"/>
-                <a:ext cx="522485" cy="0"/>
-              </a:xfrm>
-              <a:prstGeom prst="straightConnector1">
-                <a:avLst/>
-              </a:prstGeom>
-              <a:ln w="44450">
-                <a:tailEnd type="arrow"/>
-              </a:ln>
-            </p:spPr>
-            <p:style>
-              <a:lnRef idx="1">
-                <a:schemeClr val="accent1"/>
-              </a:lnRef>
-              <a:fillRef idx="0">
-                <a:schemeClr val="accent1"/>
-              </a:fillRef>
-              <a:effectRef idx="0">
-                <a:schemeClr val="accent1"/>
-              </a:effectRef>
-              <a:fontRef idx="minor">
-                <a:schemeClr val="tx1"/>
-              </a:fontRef>
-            </p:style>
-          </p:cxnSp>
-        </p:grpSp>
-      </p:grpSp>
-    </p:spTree>
-  </p:cSld>
-  <p:clrMapOvr>
-    <a:masterClrMapping/>
-  </p:clrMapOvr>
-</p:sld>
-</file>
-
-<file path=ppt/tags/tag1.xml><?xml version="1.0" encoding="utf-8"?>
-<p:tagLst xmlns:a="http://schemas.openxmlformats.org/drawingml/2006/main" xmlns:r="http://schemas.openxmlformats.org/officeDocument/2006/relationships" xmlns:p="http://schemas.openxmlformats.org/presentationml/2006/main">
-  <p:tag name="LATEXADDIN" val="\documentclass{article}&#10;\usepackage{amsmath}&#10;\pagestyle{empty}&#10;\begin{document}&#10;&#10;$v_{\mathrm{p}}$&#10;&#10;&#10;\end{document}"/>
-  <p:tag name="IGUANATEXSIZE" val="30"/>
-</p:tagLst>
 </file>
 
 <file path=ppt/theme/theme1.xml><?xml version="1.0" encoding="utf-8"?>

</xml_diff>

<commit_message>
Figures updated with correct notation.
</commit_message>
<xml_diff>
--- a/fig/Biological_Response.pptx
+++ b/fig/Biological_Response.pptx
@@ -5,9 +5,7 @@
     <p:sldMasterId id="2147483648" r:id="rId1"/>
   </p:sldMasterIdLst>
   <p:sldIdLst>
-    <p:sldId id="256" r:id="rId2"/>
-    <p:sldId id="257" r:id="rId3"/>
-    <p:sldId id="258" r:id="rId4"/>
+    <p:sldId id="258" r:id="rId2"/>
   </p:sldIdLst>
   <p:sldSz cx="2879725" cy="2879725"/>
   <p:notesSz cx="7315200" cy="9601200"/>
@@ -3121,95 +3119,240 @@
           <a:chExt cx="0" cy="0"/>
         </a:xfrm>
       </p:grpSpPr>
-    </p:spTree>
-    <p:extLst>
-      <p:ext uri="{BB962C8B-B14F-4D97-AF65-F5344CB8AC3E}">
-        <p14:creationId xmlns:p14="http://schemas.microsoft.com/office/powerpoint/2010/main" val="2119511818"/>
-      </p:ext>
-    </p:extLst>
-  </p:cSld>
-  <p:clrMapOvr>
-    <a:masterClrMapping/>
-  </p:clrMapOvr>
-</p:sld>
-</file>
-
-<file path=ppt/slides/slide2.xml><?xml version="1.0" encoding="utf-8"?>
-<p:sld xmlns:a="http://schemas.openxmlformats.org/drawingml/2006/main" xmlns:r="http://schemas.openxmlformats.org/officeDocument/2006/relationships" xmlns:p="http://schemas.openxmlformats.org/presentationml/2006/main">
-  <p:cSld>
-    <p:spTree>
-      <p:nvGrpSpPr>
-        <p:cNvPr id="1" name=""/>
-        <p:cNvGrpSpPr/>
-        <p:nvPr/>
-      </p:nvGrpSpPr>
-      <p:grpSpPr>
-        <a:xfrm>
-          <a:off x="0" y="0"/>
-          <a:ext cx="0" cy="0"/>
-          <a:chOff x="0" y="0"/>
-          <a:chExt cx="0" cy="0"/>
-        </a:xfrm>
-      </p:grpSpPr>
-    </p:spTree>
-  </p:cSld>
-  <p:clrMapOvr>
-    <a:masterClrMapping/>
-  </p:clrMapOvr>
-</p:sld>
-</file>
-
-<file path=ppt/slides/slide3.xml><?xml version="1.0" encoding="utf-8"?>
-<p:sld xmlns:a="http://schemas.openxmlformats.org/drawingml/2006/main" xmlns:r="http://schemas.openxmlformats.org/officeDocument/2006/relationships" xmlns:p="http://schemas.openxmlformats.org/presentationml/2006/main">
-  <p:cSld>
-    <p:spTree>
-      <p:nvGrpSpPr>
-        <p:cNvPr id="1" name=""/>
-        <p:cNvGrpSpPr/>
-        <p:nvPr/>
-      </p:nvGrpSpPr>
-      <p:grpSpPr>
-        <a:xfrm>
-          <a:off x="0" y="0"/>
-          <a:ext cx="0" cy="0"/>
-          <a:chOff x="0" y="0"/>
-          <a:chExt cx="0" cy="0"/>
-        </a:xfrm>
-      </p:grpSpPr>
+      <p:sp>
+        <p:nvSpPr>
+          <p:cNvPr id="3" name="TextBox 2"/>
+          <p:cNvSpPr txBox="1"/>
+          <p:nvPr/>
+        </p:nvSpPr>
+        <p:spPr>
+          <a:xfrm>
+            <a:off x="-298" y="35846"/>
+            <a:ext cx="295274" cy="276999"/>
+          </a:xfrm>
+          <a:prstGeom prst="rect">
+            <a:avLst/>
+          </a:prstGeom>
+          <a:noFill/>
+        </p:spPr>
+        <p:txBody>
+          <a:bodyPr wrap="none" rtlCol="0">
+            <a:spAutoFit/>
+          </a:bodyPr>
+          <a:lstStyle/>
+          <a:p>
+            <a:r>
+              <a:rPr lang="en-AU" sz="1200" b="1" dirty="0" smtClean="0">
+                <a:latin typeface="Arial" panose="020B0604020202020204" pitchFamily="34" charset="0"/>
+                <a:cs typeface="Arial" panose="020B0604020202020204" pitchFamily="34" charset="0"/>
+              </a:rPr>
+              <a:t>A</a:t>
+            </a:r>
+            <a:endParaRPr lang="en-AU" sz="1200" b="1" dirty="0">
+              <a:latin typeface="Arial" panose="020B0604020202020204" pitchFamily="34" charset="0"/>
+              <a:cs typeface="Arial" panose="020B0604020202020204" pitchFamily="34" charset="0"/>
+            </a:endParaRPr>
+          </a:p>
+        </p:txBody>
+      </p:sp>
+      <p:sp>
+        <p:nvSpPr>
+          <p:cNvPr id="40" name="TextBox 39"/>
+          <p:cNvSpPr txBox="1"/>
+          <p:nvPr/>
+        </p:nvSpPr>
+        <p:spPr>
+          <a:xfrm>
+            <a:off x="719782" y="1388900"/>
+            <a:ext cx="295274" cy="276999"/>
+          </a:xfrm>
+          <a:prstGeom prst="rect">
+            <a:avLst/>
+          </a:prstGeom>
+          <a:noFill/>
+        </p:spPr>
+        <p:txBody>
+          <a:bodyPr wrap="none" rtlCol="0">
+            <a:spAutoFit/>
+          </a:bodyPr>
+          <a:lstStyle/>
+          <a:p>
+            <a:r>
+              <a:rPr lang="en-AU" sz="1200" b="1" dirty="0">
+                <a:latin typeface="Arial" panose="020B0604020202020204" pitchFamily="34" charset="0"/>
+                <a:cs typeface="Arial" panose="020B0604020202020204" pitchFamily="34" charset="0"/>
+              </a:rPr>
+              <a:t>C</a:t>
+            </a:r>
+          </a:p>
+        </p:txBody>
+      </p:sp>
+      <p:sp>
+        <p:nvSpPr>
+          <p:cNvPr id="41" name="TextBox 40"/>
+          <p:cNvSpPr txBox="1"/>
+          <p:nvPr/>
+        </p:nvSpPr>
+        <p:spPr>
+          <a:xfrm>
+            <a:off x="606375" y="35846"/>
+            <a:ext cx="295274" cy="276999"/>
+          </a:xfrm>
+          <a:prstGeom prst="rect">
+            <a:avLst/>
+          </a:prstGeom>
+          <a:noFill/>
+        </p:spPr>
+        <p:txBody>
+          <a:bodyPr wrap="none" rtlCol="0">
+            <a:spAutoFit/>
+          </a:bodyPr>
+          <a:lstStyle/>
+          <a:p>
+            <a:r>
+              <a:rPr lang="en-AU" sz="1200" b="1" dirty="0">
+                <a:latin typeface="Arial" panose="020B0604020202020204" pitchFamily="34" charset="0"/>
+                <a:cs typeface="Arial" panose="020B0604020202020204" pitchFamily="34" charset="0"/>
+              </a:rPr>
+              <a:t>B</a:t>
+            </a:r>
+          </a:p>
+        </p:txBody>
+      </p:sp>
+      <p:pic>
+        <p:nvPicPr>
+          <p:cNvPr id="1034" name="Picture 10"/>
+          <p:cNvPicPr>
+            <a:picLocks noChangeAspect="1" noChangeArrowheads="1"/>
+          </p:cNvPicPr>
+          <p:nvPr/>
+        </p:nvPicPr>
+        <p:blipFill rotWithShape="1">
+          <a:blip r:embed="rId2" cstate="print">
+            <a:extLst>
+              <a:ext uri="{28A0092B-C50C-407E-A947-70E740481C1C}">
+                <a14:useLocalDpi xmlns:a14="http://schemas.microsoft.com/office/drawing/2010/main" val="0"/>
+              </a:ext>
+            </a:extLst>
+          </a:blip>
+          <a:srcRect l="690" t="6649" r="3805" b="1789"/>
+          <a:stretch/>
+        </p:blipFill>
+        <p:spPr bwMode="auto">
+          <a:xfrm>
+            <a:off x="1101600" y="1810800"/>
+            <a:ext cx="1710000" cy="1054800"/>
+          </a:xfrm>
+          <a:prstGeom prst="rect">
+            <a:avLst/>
+          </a:prstGeom>
+          <a:noFill/>
+          <a:ln>
+            <a:noFill/>
+          </a:ln>
+          <a:extLst>
+            <a:ext uri="{909E8E84-426E-40DD-AFC4-6F175D3DCCD1}">
+              <a14:hiddenFill xmlns:a14="http://schemas.microsoft.com/office/drawing/2010/main">
+                <a:solidFill>
+                  <a:schemeClr val="accent1"/>
+                </a:solidFill>
+              </a14:hiddenFill>
+            </a:ext>
+            <a:ext uri="{91240B29-F687-4F45-9708-019B960494DF}">
+              <a14:hiddenLine xmlns:a14="http://schemas.microsoft.com/office/drawing/2010/main" w="9525">
+                <a:solidFill>
+                  <a:schemeClr val="tx1"/>
+                </a:solidFill>
+                <a:miter lim="800000"/>
+                <a:headEnd/>
+                <a:tailEnd/>
+              </a14:hiddenLine>
+            </a:ext>
+          </a:extLst>
+        </p:spPr>
+      </p:pic>
+      <p:pic>
+        <p:nvPicPr>
+          <p:cNvPr id="1035" name="Picture 11"/>
+          <p:cNvPicPr>
+            <a:picLocks noChangeAspect="1" noChangeArrowheads="1"/>
+          </p:cNvPicPr>
+          <p:nvPr/>
+        </p:nvPicPr>
+        <p:blipFill rotWithShape="1">
+          <a:blip r:embed="rId3" cstate="print">
+            <a:extLst>
+              <a:ext uri="{28A0092B-C50C-407E-A947-70E740481C1C}">
+                <a14:useLocalDpi xmlns:a14="http://schemas.microsoft.com/office/drawing/2010/main" val="0"/>
+              </a:ext>
+            </a:extLst>
+          </a:blip>
+          <a:srcRect l="927" t="5327" r="4769" b="2488"/>
+          <a:stretch/>
+        </p:blipFill>
+        <p:spPr bwMode="auto">
+          <a:xfrm>
+            <a:off x="1182664" y="236900"/>
+            <a:ext cx="1674000" cy="1062000"/>
+          </a:xfrm>
+          <a:prstGeom prst="rect">
+            <a:avLst/>
+          </a:prstGeom>
+          <a:noFill/>
+          <a:ln>
+            <a:noFill/>
+          </a:ln>
+          <a:extLst>
+            <a:ext uri="{909E8E84-426E-40DD-AFC4-6F175D3DCCD1}">
+              <a14:hiddenFill xmlns:a14="http://schemas.microsoft.com/office/drawing/2010/main">
+                <a:solidFill>
+                  <a:schemeClr val="accent1"/>
+                </a:solidFill>
+              </a14:hiddenFill>
+            </a:ext>
+            <a:ext uri="{91240B29-F687-4F45-9708-019B960494DF}">
+              <a14:hiddenLine xmlns:a14="http://schemas.microsoft.com/office/drawing/2010/main" w="9525">
+                <a:solidFill>
+                  <a:schemeClr val="tx1"/>
+                </a:solidFill>
+                <a:miter lim="800000"/>
+                <a:headEnd/>
+                <a:tailEnd/>
+              </a14:hiddenLine>
+            </a:ext>
+          </a:extLst>
+        </p:spPr>
+      </p:pic>
       <p:grpSp>
         <p:nvGrpSpPr>
-          <p:cNvPr id="22" name="Group 3"/>
-          <p:cNvGrpSpPr>
-            <a:grpSpLocks noChangeAspect="1"/>
-          </p:cNvGrpSpPr>
+          <p:cNvPr id="10" name="Group 9"/>
+          <p:cNvGrpSpPr/>
           <p:nvPr/>
         </p:nvGrpSpPr>
         <p:grpSpPr>
           <a:xfrm>
-            <a:off x="21115" y="-274"/>
-            <a:ext cx="735893" cy="2879999"/>
-            <a:chOff x="6584247" y="1624337"/>
-            <a:chExt cx="809793" cy="3169224"/>
+            <a:off x="234000" y="1847080"/>
+            <a:ext cx="252000" cy="252000"/>
+            <a:chOff x="296225" y="1283034"/>
+            <a:chExt cx="252000" cy="252000"/>
           </a:xfrm>
         </p:grpSpPr>
         <p:sp>
           <p:nvSpPr>
-            <p:cNvPr id="25" name="Isosceles Triangle 24"/>
-            <p:cNvSpPr>
-              <a:spLocks noChangeAspect="1"/>
-            </p:cNvSpPr>
+            <p:cNvPr id="34" name="Isosceles Triangle 33"/>
+            <p:cNvSpPr/>
             <p:nvPr/>
           </p:nvSpPr>
           <p:spPr>
             <a:xfrm flipV="1">
-              <a:off x="6584247" y="2121764"/>
-              <a:ext cx="809793" cy="809793"/>
+              <a:off x="296225" y="1283034"/>
+              <a:ext cx="252000" cy="252000"/>
             </a:xfrm>
             <a:prstGeom prst="triangle">
               <a:avLst/>
             </a:prstGeom>
             <a:noFill/>
-            <a:ln w="44450">
+            <a:ln w="12700">
               <a:solidFill>
                 <a:schemeClr val="tx1"/>
               </a:solidFill>
@@ -3242,21 +3385,24 @@
         </p:sp>
         <p:cxnSp>
           <p:nvCxnSpPr>
-            <p:cNvPr id="26" name="Curved Connector 25"/>
-            <p:cNvCxnSpPr>
-              <a:cxnSpLocks noChangeAspect="1"/>
-            </p:cNvCxnSpPr>
+            <p:cNvPr id="35" name="Curved Connector 34"/>
+            <p:cNvCxnSpPr/>
             <p:nvPr/>
           </p:nvCxnSpPr>
           <p:spPr>
             <a:xfrm flipV="1">
-              <a:off x="6877436" y="2329998"/>
-              <a:ext cx="231369" cy="231369"/>
+              <a:off x="389400" y="1347834"/>
+              <a:ext cx="72000" cy="72000"/>
             </a:xfrm>
             <a:prstGeom prst="curvedConnector3">
               <a:avLst/>
             </a:prstGeom>
-            <a:ln w="44450"/>
+            <a:ln w="12700">
+              <a:solidFill>
+                <a:schemeClr val="tx1"/>
+              </a:solidFill>
+            </a:ln>
+            <a:effectLst/>
           </p:spPr>
           <p:style>
             <a:lnRef idx="2">
@@ -3273,60 +3419,36 @@
             </a:fontRef>
           </p:style>
         </p:cxnSp>
+      </p:grpSp>
+      <p:grpSp>
+        <p:nvGrpSpPr>
+          <p:cNvPr id="9" name="Group 8"/>
+          <p:cNvGrpSpPr/>
+          <p:nvPr/>
+        </p:nvGrpSpPr>
+        <p:grpSpPr>
+          <a:xfrm>
+            <a:off x="366957" y="770004"/>
+            <a:ext cx="108879" cy="178200"/>
+            <a:chOff x="372478" y="1414218"/>
+            <a:chExt cx="108879" cy="178200"/>
+          </a:xfrm>
+        </p:grpSpPr>
         <p:cxnSp>
           <p:nvCxnSpPr>
-            <p:cNvPr id="27" name="Straight Connector 26"/>
-            <p:cNvCxnSpPr>
-              <a:cxnSpLocks noChangeAspect="1"/>
-            </p:cNvCxnSpPr>
+            <p:cNvPr id="39" name="Straight Connector 38"/>
+            <p:cNvCxnSpPr/>
             <p:nvPr/>
           </p:nvCxnSpPr>
           <p:spPr>
-            <a:xfrm>
-              <a:off x="6985166" y="1624337"/>
-              <a:ext cx="0" cy="474308"/>
+            <a:xfrm flipV="1">
+              <a:off x="425860" y="1414218"/>
+              <a:ext cx="0" cy="36000"/>
             </a:xfrm>
             <a:prstGeom prst="line">
               <a:avLst/>
             </a:prstGeom>
-            <a:ln w="44450">
-              <a:solidFill>
-                <a:schemeClr val="tx1"/>
-              </a:solidFill>
-            </a:ln>
-          </p:spPr>
-          <p:style>
-            <a:lnRef idx="1">
-              <a:schemeClr val="accent1"/>
-            </a:lnRef>
-            <a:fillRef idx="0">
-              <a:schemeClr val="accent1"/>
-            </a:fillRef>
-            <a:effectRef idx="0">
-              <a:schemeClr val="accent1"/>
-            </a:effectRef>
-            <a:fontRef idx="minor">
-              <a:schemeClr val="tx1"/>
-            </a:fontRef>
-          </p:style>
-        </p:cxnSp>
-        <p:cxnSp>
-          <p:nvCxnSpPr>
-            <p:cNvPr id="28" name="Straight Connector 27"/>
-            <p:cNvCxnSpPr>
-              <a:cxnSpLocks noChangeAspect="1"/>
-            </p:cNvCxnSpPr>
-            <p:nvPr/>
-          </p:nvCxnSpPr>
-          <p:spPr>
-            <a:xfrm flipV="1">
-              <a:off x="6994599" y="3594203"/>
-              <a:ext cx="0" cy="115685"/>
-            </a:xfrm>
-            <a:prstGeom prst="line">
-              <a:avLst/>
-            </a:prstGeom>
-            <a:ln w="44450">
+            <a:ln w="12700">
               <a:solidFill>
                 <a:schemeClr val="tx1"/>
               </a:solidFill>
@@ -3349,23 +3471,21 @@
         </p:cxnSp>
         <p:grpSp>
           <p:nvGrpSpPr>
-            <p:cNvPr id="29" name="Group 34"/>
-            <p:cNvGrpSpPr>
-              <a:grpSpLocks noChangeAspect="1"/>
-            </p:cNvGrpSpPr>
+            <p:cNvPr id="42" name="Group 41"/>
+            <p:cNvGrpSpPr/>
             <p:nvPr/>
           </p:nvGrpSpPr>
           <p:grpSpPr>
             <a:xfrm>
-              <a:off x="6823057" y="3706613"/>
-              <a:ext cx="349879" cy="61114"/>
+              <a:off x="372478" y="1449199"/>
+              <a:ext cx="108879" cy="19018"/>
               <a:chOff x="4724894" y="1611142"/>
               <a:chExt cx="108879" cy="19018"/>
             </a:xfrm>
           </p:grpSpPr>
           <p:cxnSp>
             <p:nvCxnSpPr>
-              <p:cNvPr id="36" name="Straight Connector 35"/>
+              <p:cNvPr id="43" name="Straight Connector 42"/>
               <p:cNvCxnSpPr/>
               <p:nvPr/>
             </p:nvCxnSpPr>
@@ -3377,7 +3497,11 @@
               <a:prstGeom prst="line">
                 <a:avLst/>
               </a:prstGeom>
-              <a:ln w="44450"/>
+              <a:ln w="12700">
+                <a:solidFill>
+                  <a:schemeClr val="tx1"/>
+                </a:solidFill>
+              </a:ln>
             </p:spPr>
             <p:style>
               <a:lnRef idx="1">
@@ -3396,7 +3520,7 @@
           </p:cxnSp>
           <p:cxnSp>
             <p:nvCxnSpPr>
-              <p:cNvPr id="37" name="Straight Connector 36"/>
+              <p:cNvPr id="44" name="Straight Connector 43"/>
               <p:cNvCxnSpPr/>
               <p:nvPr/>
             </p:nvCxnSpPr>
@@ -3408,7 +3532,11 @@
               <a:prstGeom prst="line">
                 <a:avLst/>
               </a:prstGeom>
-              <a:ln w="44450"/>
+              <a:ln w="12700">
+                <a:solidFill>
+                  <a:schemeClr val="tx1"/>
+                </a:solidFill>
+              </a:ln>
             </p:spPr>
             <p:style>
               <a:lnRef idx="1">
@@ -3427,7 +3555,7 @@
           </p:cxnSp>
           <p:cxnSp>
             <p:nvCxnSpPr>
-              <p:cNvPr id="38" name="Straight Connector 37"/>
+              <p:cNvPr id="45" name="Straight Connector 44"/>
               <p:cNvCxnSpPr/>
               <p:nvPr/>
             </p:nvCxnSpPr>
@@ -3439,7 +3567,11 @@
               <a:prstGeom prst="line">
                 <a:avLst/>
               </a:prstGeom>
-              <a:ln w="44450"/>
+              <a:ln w="12700">
+                <a:solidFill>
+                  <a:schemeClr val="tx1"/>
+                </a:solidFill>
+              </a:ln>
             </p:spPr>
             <p:style>
               <a:lnRef idx="1">
@@ -3459,22 +3591,20 @@
         </p:grpSp>
         <p:sp>
           <p:nvSpPr>
-            <p:cNvPr id="30" name="Rectangle 9"/>
-            <p:cNvSpPr>
-              <a:spLocks noChangeAspect="1"/>
-            </p:cNvSpPr>
+            <p:cNvPr id="46" name="Rectangle 45"/>
+            <p:cNvSpPr/>
             <p:nvPr/>
           </p:nvSpPr>
           <p:spPr>
             <a:xfrm>
-              <a:off x="6865446" y="3773514"/>
-              <a:ext cx="277643" cy="277643"/>
+              <a:off x="383270" y="1470018"/>
+              <a:ext cx="86400" cy="86400"/>
             </a:xfrm>
             <a:prstGeom prst="rect">
               <a:avLst/>
             </a:prstGeom>
             <a:solidFill>
-              <a:schemeClr val="accent1"/>
+              <a:schemeClr val="tx1"/>
             </a:solidFill>
             <a:ln w="12700">
               <a:noFill/>
@@ -3507,95 +3637,19 @@
         </p:sp>
         <p:cxnSp>
           <p:nvCxnSpPr>
-            <p:cNvPr id="31" name="Straight Connector 30"/>
-            <p:cNvCxnSpPr>
-              <a:cxnSpLocks noChangeAspect="1"/>
-            </p:cNvCxnSpPr>
+            <p:cNvPr id="47" name="Straight Connector 46"/>
+            <p:cNvCxnSpPr/>
             <p:nvPr/>
           </p:nvCxnSpPr>
           <p:spPr>
             <a:xfrm flipV="1">
-              <a:off x="6996559" y="4051158"/>
-              <a:ext cx="0" cy="115685"/>
+              <a:off x="426470" y="1556418"/>
+              <a:ext cx="0" cy="36000"/>
             </a:xfrm>
             <a:prstGeom prst="line">
               <a:avLst/>
             </a:prstGeom>
-            <a:ln w="44450">
-              <a:solidFill>
-                <a:schemeClr val="tx1"/>
-              </a:solidFill>
-            </a:ln>
-          </p:spPr>
-          <p:style>
-            <a:lnRef idx="1">
-              <a:schemeClr val="accent1"/>
-            </a:lnRef>
-            <a:fillRef idx="0">
-              <a:schemeClr val="accent1"/>
-            </a:fillRef>
-            <a:effectRef idx="0">
-              <a:schemeClr val="accent1"/>
-            </a:effectRef>
-            <a:fontRef idx="minor">
-              <a:schemeClr val="tx1"/>
-            </a:fontRef>
-          </p:style>
-        </p:cxnSp>
-        <p:cxnSp>
-          <p:nvCxnSpPr>
-            <p:cNvPr id="32" name="Straight Connector 31"/>
-            <p:cNvCxnSpPr>
-              <a:cxnSpLocks noChangeAspect="1"/>
-            </p:cNvCxnSpPr>
-            <p:nvPr/>
-          </p:nvCxnSpPr>
-          <p:spPr>
-            <a:xfrm>
-              <a:off x="6985259" y="2938213"/>
-              <a:ext cx="7767" cy="659404"/>
-            </a:xfrm>
-            <a:prstGeom prst="line">
-              <a:avLst/>
-            </a:prstGeom>
-            <a:ln w="44450">
-              <a:solidFill>
-                <a:schemeClr val="tx1"/>
-              </a:solidFill>
-            </a:ln>
-          </p:spPr>
-          <p:style>
-            <a:lnRef idx="1">
-              <a:schemeClr val="accent1"/>
-            </a:lnRef>
-            <a:fillRef idx="0">
-              <a:schemeClr val="accent1"/>
-            </a:fillRef>
-            <a:effectRef idx="0">
-              <a:schemeClr val="accent1"/>
-            </a:effectRef>
-            <a:fontRef idx="minor">
-              <a:schemeClr val="tx1"/>
-            </a:fontRef>
-          </p:style>
-        </p:cxnSp>
-        <p:cxnSp>
-          <p:nvCxnSpPr>
-            <p:cNvPr id="33" name="Straight Connector 32"/>
-            <p:cNvCxnSpPr>
-              <a:cxnSpLocks noChangeAspect="1"/>
-            </p:cNvCxnSpPr>
-            <p:nvPr/>
-          </p:nvCxnSpPr>
-          <p:spPr>
-            <a:xfrm>
-              <a:off x="7000327" y="4157295"/>
-              <a:ext cx="0" cy="636266"/>
-            </a:xfrm>
-            <a:prstGeom prst="line">
-              <a:avLst/>
-            </a:prstGeom>
-            <a:ln w="44450">
+            <a:ln w="12700">
               <a:solidFill>
                 <a:schemeClr val="tx1"/>
               </a:solidFill>
@@ -3617,120 +3671,86 @@
           </p:style>
         </p:cxnSp>
       </p:grpSp>
-      <p:pic>
-        <p:nvPicPr>
-          <p:cNvPr id="1028" name="Picture 4"/>
-          <p:cNvPicPr>
-            <a:picLocks noChangeAspect="1" noChangeArrowheads="1"/>
-          </p:cNvPicPr>
+      <p:cxnSp>
+        <p:nvCxnSpPr>
+          <p:cNvPr id="48" name="Straight Connector 47"/>
+          <p:cNvCxnSpPr/>
           <p:nvPr/>
-        </p:nvPicPr>
-        <p:blipFill rotWithShape="1">
-          <a:blip r:embed="rId2">
-            <a:extLst>
-              <a:ext uri="{28A0092B-C50C-407E-A947-70E740481C1C}">
-                <a14:useLocalDpi xmlns:a14="http://schemas.microsoft.com/office/drawing/2010/main" val="0"/>
-              </a:ext>
-            </a:extLst>
-          </a:blip>
-          <a:srcRect t="2654" r="3894" b="3"/>
-          <a:stretch/>
-        </p:blipFill>
-        <p:spPr bwMode="auto">
+        </p:nvCxnSpPr>
+        <p:spPr>
           <a:xfrm>
-            <a:off x="921046" y="7046"/>
-            <a:ext cx="1958976" cy="1288800"/>
+            <a:off x="360000" y="2099080"/>
+            <a:ext cx="2417" cy="205200"/>
           </a:xfrm>
-          <a:prstGeom prst="rect">
+          <a:prstGeom prst="line">
             <a:avLst/>
           </a:prstGeom>
-          <a:noFill/>
-          <a:ln>
-            <a:noFill/>
+          <a:ln w="12700">
+            <a:solidFill>
+              <a:schemeClr val="tx1"/>
+            </a:solidFill>
           </a:ln>
-          <a:extLst>
-            <a:ext uri="{909E8E84-426E-40DD-AFC4-6F175D3DCCD1}">
-              <a14:hiddenFill xmlns:a14="http://schemas.microsoft.com/office/drawing/2010/main">
-                <a:solidFill>
-                  <a:schemeClr val="accent1"/>
-                </a:solidFill>
-              </a14:hiddenFill>
-            </a:ext>
-            <a:ext uri="{91240B29-F687-4F45-9708-019B960494DF}">
-              <a14:hiddenLine xmlns:a14="http://schemas.microsoft.com/office/drawing/2010/main" w="9525">
-                <a:solidFill>
-                  <a:schemeClr val="tx1"/>
-                </a:solidFill>
-                <a:miter lim="800000"/>
-                <a:headEnd/>
-                <a:tailEnd/>
-              </a14:hiddenLine>
-            </a:ext>
-          </a:extLst>
         </p:spPr>
-      </p:pic>
-      <p:pic>
-        <p:nvPicPr>
-          <p:cNvPr id="1029" name="Picture 5"/>
-          <p:cNvPicPr>
-            <a:picLocks noChangeAspect="1" noChangeArrowheads="1"/>
-          </p:cNvPicPr>
+        <p:style>
+          <a:lnRef idx="1">
+            <a:schemeClr val="accent1"/>
+          </a:lnRef>
+          <a:fillRef idx="0">
+            <a:schemeClr val="accent1"/>
+          </a:fillRef>
+          <a:effectRef idx="0">
+            <a:schemeClr val="accent1"/>
+          </a:effectRef>
+          <a:fontRef idx="minor">
+            <a:schemeClr val="tx1"/>
+          </a:fontRef>
+        </p:style>
+      </p:cxnSp>
+      <p:cxnSp>
+        <p:nvCxnSpPr>
+          <p:cNvPr id="49" name="Straight Connector 48"/>
+          <p:cNvCxnSpPr/>
           <p:nvPr/>
-        </p:nvPicPr>
-        <p:blipFill rotWithShape="1">
-          <a:blip r:embed="rId3">
-            <a:extLst>
-              <a:ext uri="{28A0092B-C50C-407E-A947-70E740481C1C}">
-                <a14:useLocalDpi xmlns:a14="http://schemas.microsoft.com/office/drawing/2010/main" val="0"/>
-              </a:ext>
-            </a:extLst>
-          </a:blip>
-          <a:srcRect l="708" t="5897" r="3052" b="285"/>
-          <a:stretch/>
-        </p:blipFill>
-        <p:spPr bwMode="auto">
-          <a:xfrm>
-            <a:off x="899725" y="1620022"/>
-            <a:ext cx="1980000" cy="1260000"/>
+        </p:nvCxnSpPr>
+        <p:spPr>
+          <a:xfrm flipH="1">
+            <a:off x="360000" y="945029"/>
+            <a:ext cx="0" cy="899980"/>
           </a:xfrm>
-          <a:prstGeom prst="rect">
+          <a:prstGeom prst="line">
             <a:avLst/>
           </a:prstGeom>
-          <a:noFill/>
-          <a:ln>
-            <a:noFill/>
+          <a:ln w="12700">
+            <a:solidFill>
+              <a:schemeClr val="tx1"/>
+            </a:solidFill>
           </a:ln>
-          <a:extLst>
-            <a:ext uri="{909E8E84-426E-40DD-AFC4-6F175D3DCCD1}">
-              <a14:hiddenFill xmlns:a14="http://schemas.microsoft.com/office/drawing/2010/main">
-                <a:solidFill>
-                  <a:schemeClr val="accent1"/>
-                </a:solidFill>
-              </a14:hiddenFill>
-            </a:ext>
-            <a:ext uri="{91240B29-F687-4F45-9708-019B960494DF}">
-              <a14:hiddenLine xmlns:a14="http://schemas.microsoft.com/office/drawing/2010/main" w="9525">
-                <a:solidFill>
-                  <a:schemeClr val="tx1"/>
-                </a:solidFill>
-                <a:miter lim="800000"/>
-                <a:headEnd/>
-                <a:tailEnd/>
-              </a14:hiddenLine>
-            </a:ext>
-          </a:extLst>
         </p:spPr>
-      </p:pic>
-      <p:sp>
-        <p:nvSpPr>
-          <p:cNvPr id="3" name="TextBox 2"/>
+        <p:style>
+          <a:lnRef idx="1">
+            <a:schemeClr val="accent1"/>
+          </a:lnRef>
+          <a:fillRef idx="0">
+            <a:schemeClr val="accent1"/>
+          </a:fillRef>
+          <a:effectRef idx="0">
+            <a:schemeClr val="accent1"/>
+          </a:effectRef>
+          <a:fontRef idx="minor">
+            <a:schemeClr val="tx1"/>
+          </a:fontRef>
+        </p:style>
+      </p:cxnSp>
+      <p:sp>
+        <p:nvSpPr>
+          <p:cNvPr id="11" name="TextBox 10"/>
           <p:cNvSpPr txBox="1"/>
           <p:nvPr/>
         </p:nvSpPr>
         <p:spPr>
           <a:xfrm>
-            <a:off x="-298" y="35846"/>
-            <a:ext cx="295274" cy="276999"/>
+            <a:off x="216850" y="361950"/>
+            <a:ext cx="415498" cy="215444"/>
           </a:xfrm>
           <a:prstGeom prst="rect">
             <a:avLst/>
@@ -3744,13 +3764,13 @@
           <a:lstStyle/>
           <a:p>
             <a:r>
-              <a:rPr lang="en-AU" sz="1200" b="1" dirty="0" smtClean="0">
+              <a:rPr lang="en-AU" sz="800" dirty="0" smtClean="0">
                 <a:latin typeface="Arial" panose="020B0604020202020204" pitchFamily="34" charset="0"/>
                 <a:cs typeface="Arial" panose="020B0604020202020204" pitchFamily="34" charset="0"/>
               </a:rPr>
-              <a:t>A</a:t>
-            </a:r>
-            <a:endParaRPr lang="en-AU" sz="1200" b="1" dirty="0">
+              <a:t>Input</a:t>
+            </a:r>
+            <a:endParaRPr lang="en-AU" sz="800" dirty="0">
               <a:latin typeface="Arial" panose="020B0604020202020204" pitchFamily="34" charset="0"/>
               <a:cs typeface="Arial" panose="020B0604020202020204" pitchFamily="34" charset="0"/>
             </a:endParaRPr>
@@ -3759,14 +3779,14 @@
       </p:sp>
       <p:sp>
         <p:nvSpPr>
-          <p:cNvPr id="40" name="TextBox 39"/>
+          <p:cNvPr id="50" name="TextBox 49"/>
           <p:cNvSpPr txBox="1"/>
           <p:nvPr/>
         </p:nvSpPr>
         <p:spPr>
           <a:xfrm>
-            <a:off x="719782" y="1388900"/>
-            <a:ext cx="295274" cy="276999"/>
+            <a:off x="175608" y="2374900"/>
+            <a:ext cx="495649" cy="215444"/>
           </a:xfrm>
           <a:prstGeom prst="rect">
             <a:avLst/>
@@ -3780,52 +3800,177 @@
           <a:lstStyle/>
           <a:p>
             <a:r>
-              <a:rPr lang="en-AU" sz="1200" b="1" dirty="0">
+              <a:rPr lang="en-AU" sz="800" dirty="0" smtClean="0">
                 <a:latin typeface="Arial" panose="020B0604020202020204" pitchFamily="34" charset="0"/>
                 <a:cs typeface="Arial" panose="020B0604020202020204" pitchFamily="34" charset="0"/>
               </a:rPr>
-              <a:t>C</a:t>
-            </a:r>
-            <a:endParaRPr lang="en-AU" sz="1200" b="1" dirty="0">
+              <a:t>Output</a:t>
+            </a:r>
+            <a:endParaRPr lang="en-AU" sz="800" dirty="0">
               <a:latin typeface="Arial" panose="020B0604020202020204" pitchFamily="34" charset="0"/>
               <a:cs typeface="Arial" panose="020B0604020202020204" pitchFamily="34" charset="0"/>
             </a:endParaRPr>
           </a:p>
         </p:txBody>
       </p:sp>
-      <p:sp>
-        <p:nvSpPr>
-          <p:cNvPr id="41" name="TextBox 40"/>
-          <p:cNvSpPr txBox="1"/>
+      <p:cxnSp>
+        <p:nvCxnSpPr>
+          <p:cNvPr id="51" name="Straight Connector 50"/>
+          <p:cNvCxnSpPr/>
           <p:nvPr/>
-        </p:nvSpPr>
+        </p:nvCxnSpPr>
         <p:spPr>
           <a:xfrm>
-            <a:off x="606375" y="35846"/>
-            <a:ext cx="295274" cy="276999"/>
+            <a:off x="360000" y="564804"/>
+            <a:ext cx="2417" cy="205200"/>
+          </a:xfrm>
+          <a:prstGeom prst="line">
+            <a:avLst/>
+          </a:prstGeom>
+          <a:ln w="12700">
+            <a:solidFill>
+              <a:schemeClr val="tx1"/>
+            </a:solidFill>
+          </a:ln>
+        </p:spPr>
+        <p:style>
+          <a:lnRef idx="1">
+            <a:schemeClr val="accent1"/>
+          </a:lnRef>
+          <a:fillRef idx="0">
+            <a:schemeClr val="accent1"/>
+          </a:fillRef>
+          <a:effectRef idx="0">
+            <a:schemeClr val="accent1"/>
+          </a:effectRef>
+          <a:fontRef idx="minor">
+            <a:schemeClr val="tx1"/>
+          </a:fontRef>
+        </p:style>
+      </p:cxnSp>
+      <p:sp>
+        <p:nvSpPr>
+          <p:cNvPr id="14" name="Rectangle 13"/>
+          <p:cNvSpPr/>
+          <p:nvPr/>
+        </p:nvSpPr>
+        <p:spPr>
+          <a:xfrm>
+            <a:off x="0" y="0"/>
+            <a:ext cx="2879725" cy="2879725"/>
           </a:xfrm>
           <a:prstGeom prst="rect">
             <a:avLst/>
           </a:prstGeom>
           <a:noFill/>
+          <a:ln w="9525"/>
         </p:spPr>
-        <p:txBody>
-          <a:bodyPr wrap="none" rtlCol="0">
-            <a:spAutoFit/>
-          </a:bodyPr>
-          <a:lstStyle/>
-          <a:p>
-            <a:r>
-              <a:rPr lang="en-AU" sz="1200" b="1" dirty="0">
-                <a:latin typeface="Arial" panose="020B0604020202020204" pitchFamily="34" charset="0"/>
-                <a:cs typeface="Arial" panose="020B0604020202020204" pitchFamily="34" charset="0"/>
-              </a:rPr>
-              <a:t>B</a:t>
-            </a:r>
-            <a:endParaRPr lang="en-AU" sz="1200" b="1" dirty="0">
-              <a:latin typeface="Arial" panose="020B0604020202020204" pitchFamily="34" charset="0"/>
-              <a:cs typeface="Arial" panose="020B0604020202020204" pitchFamily="34" charset="0"/>
-            </a:endParaRPr>
+        <p:style>
+          <a:lnRef idx="2">
+            <a:schemeClr val="accent1">
+              <a:shade val="50000"/>
+            </a:schemeClr>
+          </a:lnRef>
+          <a:fillRef idx="1">
+            <a:schemeClr val="accent1"/>
+          </a:fillRef>
+          <a:effectRef idx="0">
+            <a:schemeClr val="accent1"/>
+          </a:effectRef>
+          <a:fontRef idx="minor">
+            <a:schemeClr val="lt1"/>
+          </a:fontRef>
+        </p:style>
+        <p:txBody>
+          <a:bodyPr rtlCol="0" anchor="ctr"/>
+          <a:lstStyle/>
+          <a:p>
+            <a:pPr algn="ctr"/>
+            <a:endParaRPr lang="en-AU"/>
+          </a:p>
+        </p:txBody>
+      </p:sp>
+      <p:sp>
+        <p:nvSpPr>
+          <p:cNvPr id="15" name="Rectangle 14"/>
+          <p:cNvSpPr/>
+          <p:nvPr/>
+        </p:nvSpPr>
+        <p:spPr>
+          <a:xfrm>
+            <a:off x="0" y="0"/>
+            <a:ext cx="2879725" cy="1440000"/>
+          </a:xfrm>
+          <a:prstGeom prst="rect">
+            <a:avLst/>
+          </a:prstGeom>
+          <a:noFill/>
+          <a:ln w="9525"/>
+        </p:spPr>
+        <p:style>
+          <a:lnRef idx="2">
+            <a:schemeClr val="accent1">
+              <a:shade val="50000"/>
+            </a:schemeClr>
+          </a:lnRef>
+          <a:fillRef idx="1">
+            <a:schemeClr val="accent1"/>
+          </a:fillRef>
+          <a:effectRef idx="0">
+            <a:schemeClr val="accent1"/>
+          </a:effectRef>
+          <a:fontRef idx="minor">
+            <a:schemeClr val="lt1"/>
+          </a:fontRef>
+        </p:style>
+        <p:txBody>
+          <a:bodyPr rtlCol="0" anchor="ctr"/>
+          <a:lstStyle/>
+          <a:p>
+            <a:pPr algn="ctr"/>
+            <a:endParaRPr lang="en-AU"/>
+          </a:p>
+        </p:txBody>
+      </p:sp>
+      <p:sp>
+        <p:nvSpPr>
+          <p:cNvPr id="16" name="Rectangle 15"/>
+          <p:cNvSpPr/>
+          <p:nvPr/>
+        </p:nvSpPr>
+        <p:spPr>
+          <a:xfrm>
+            <a:off x="720000" y="0"/>
+            <a:ext cx="2160000" cy="2880000"/>
+          </a:xfrm>
+          <a:prstGeom prst="rect">
+            <a:avLst/>
+          </a:prstGeom>
+          <a:noFill/>
+          <a:ln w="9525"/>
+        </p:spPr>
+        <p:style>
+          <a:lnRef idx="2">
+            <a:schemeClr val="accent1">
+              <a:shade val="50000"/>
+            </a:schemeClr>
+          </a:lnRef>
+          <a:fillRef idx="1">
+            <a:schemeClr val="accent1"/>
+          </a:fillRef>
+          <a:effectRef idx="0">
+            <a:schemeClr val="accent1"/>
+          </a:effectRef>
+          <a:fontRef idx="minor">
+            <a:schemeClr val="lt1"/>
+          </a:fontRef>
+        </p:style>
+        <p:txBody>
+          <a:bodyPr rtlCol="0" anchor="ctr"/>
+          <a:lstStyle/>
+          <a:p>
+            <a:pPr algn="ctr"/>
+            <a:endParaRPr lang="en-AU"/>
           </a:p>
         </p:txBody>
       </p:sp>

</xml_diff>